<commit_message>
PPP Week 2, Meeting 1 updated with slide division
</commit_message>
<xml_diff>
--- a/Documentation/PPP, Week 2, Meeting 1.pptx
+++ b/Documentation/PPP, Week 2, Meeting 1.pptx
@@ -5,7 +5,7 @@
     <p:sldMasterId id="2147483672" r:id="rId1"/>
   </p:sldMasterIdLst>
   <p:notesMasterIdLst>
-    <p:notesMasterId r:id="rId12"/>
+    <p:notesMasterId r:id="rId13"/>
   </p:notesMasterIdLst>
   <p:sldIdLst>
     <p:sldId id="256" r:id="rId2"/>
@@ -17,7 +17,8 @@
     <p:sldId id="267" r:id="rId8"/>
     <p:sldId id="271" r:id="rId9"/>
     <p:sldId id="269" r:id="rId10"/>
-    <p:sldId id="265" r:id="rId11"/>
+    <p:sldId id="273" r:id="rId11"/>
+    <p:sldId id="265" r:id="rId12"/>
   </p:sldIdLst>
   <p:sldSz cx="12192000" cy="6858000"/>
   <p:notesSz cx="6858000" cy="9144000"/>
@@ -3568,6 +3569,164 @@
           <p:cNvPr id="2" name="Titel 1">
             <a:extLst>
               <a:ext uri="{FF2B5EF4-FFF2-40B4-BE49-F238E27FC236}">
+                <a16:creationId xmlns:a16="http://schemas.microsoft.com/office/drawing/2014/main" id="{5174C44D-C4DB-C046-8C22-0504A1BEC542}"/>
+              </a:ext>
+            </a:extLst>
+          </p:cNvPr>
+          <p:cNvSpPr>
+            <a:spLocks noGrp="1"/>
+          </p:cNvSpPr>
+          <p:nvPr>
+            <p:ph type="title"/>
+          </p:nvPr>
+        </p:nvSpPr>
+        <p:spPr/>
+        <p:txBody>
+          <a:bodyPr/>
+          <a:lstStyle/>
+          <a:p>
+            <a:r>
+              <a:rPr lang="en-GB" dirty="0"/>
+              <a:t>Future: </a:t>
+            </a:r>
+          </a:p>
+        </p:txBody>
+      </p:sp>
+      <p:sp>
+        <p:nvSpPr>
+          <p:cNvPr id="3" name="Tijdelijke aanduiding voor inhoud 2">
+            <a:extLst>
+              <a:ext uri="{FF2B5EF4-FFF2-40B4-BE49-F238E27FC236}">
+                <a16:creationId xmlns:a16="http://schemas.microsoft.com/office/drawing/2014/main" id="{E1082D90-0845-5944-814F-31A506E1E0F2}"/>
+              </a:ext>
+            </a:extLst>
+          </p:cNvPr>
+          <p:cNvSpPr>
+            <a:spLocks noGrp="1"/>
+          </p:cNvSpPr>
+          <p:nvPr>
+            <p:ph sz="half" idx="1"/>
+          </p:nvPr>
+        </p:nvSpPr>
+        <p:spPr/>
+        <p:txBody>
+          <a:bodyPr/>
+          <a:lstStyle/>
+          <a:p>
+            <a:r>
+              <a:rPr lang="en-GB" dirty="0" err="1"/>
+              <a:t>Welke</a:t>
+            </a:r>
+            <a:r>
+              <a:rPr lang="en-GB" dirty="0"/>
+              <a:t> </a:t>
+            </a:r>
+            <a:r>
+              <a:rPr lang="en-GB" dirty="0" err="1"/>
+              <a:t>heuristieken</a:t>
+            </a:r>
+            <a:r>
+              <a:rPr lang="en-GB" dirty="0"/>
+              <a:t> </a:t>
+            </a:r>
+            <a:r>
+              <a:rPr lang="en-GB" dirty="0" err="1"/>
+              <a:t>gaan</a:t>
+            </a:r>
+            <a:r>
+              <a:rPr lang="en-GB" dirty="0"/>
+              <a:t> we </a:t>
+            </a:r>
+            <a:r>
+              <a:rPr lang="en-GB" dirty="0" err="1"/>
+              <a:t>komende</a:t>
+            </a:r>
+            <a:r>
+              <a:rPr lang="en-GB" dirty="0"/>
+              <a:t> week </a:t>
+            </a:r>
+            <a:r>
+              <a:rPr lang="en-GB" dirty="0" err="1"/>
+              <a:t>aan</a:t>
+            </a:r>
+            <a:r>
+              <a:rPr lang="en-GB" dirty="0"/>
+              <a:t> </a:t>
+            </a:r>
+            <a:r>
+              <a:rPr lang="en-GB" dirty="0" err="1"/>
+              <a:t>werken</a:t>
+            </a:r>
+            <a:r>
+              <a:rPr lang="en-GB" dirty="0"/>
+              <a:t>.</a:t>
+            </a:r>
+          </a:p>
+          <a:p>
+            <a:endParaRPr lang="en-GB" dirty="0"/>
+          </a:p>
+        </p:txBody>
+      </p:sp>
+      <p:sp>
+        <p:nvSpPr>
+          <p:cNvPr id="4" name="Tijdelijke aanduiding voor inhoud 3">
+            <a:extLst>
+              <a:ext uri="{FF2B5EF4-FFF2-40B4-BE49-F238E27FC236}">
+                <a16:creationId xmlns:a16="http://schemas.microsoft.com/office/drawing/2014/main" id="{7D861EC5-852D-834C-B001-4FF9DDDBC62F}"/>
+              </a:ext>
+            </a:extLst>
+          </p:cNvPr>
+          <p:cNvSpPr>
+            <a:spLocks noGrp="1"/>
+          </p:cNvSpPr>
+          <p:nvPr>
+            <p:ph sz="half" idx="2"/>
+          </p:nvPr>
+        </p:nvSpPr>
+        <p:spPr/>
+        <p:txBody>
+          <a:bodyPr/>
+          <a:lstStyle/>
+          <a:p>
+            <a:endParaRPr lang="en-GB"/>
+          </a:p>
+        </p:txBody>
+      </p:sp>
+    </p:spTree>
+    <p:extLst>
+      <p:ext uri="{BB962C8B-B14F-4D97-AF65-F5344CB8AC3E}">
+        <p14:creationId xmlns:p14="http://schemas.microsoft.com/office/powerpoint/2010/main" val="1963639422"/>
+      </p:ext>
+    </p:extLst>
+  </p:cSld>
+  <p:clrMapOvr>
+    <a:masterClrMapping/>
+  </p:clrMapOvr>
+</p:sld>
+</file>
+
+<file path=ppt/slides/slide11.xml><?xml version="1.0" encoding="utf-8"?>
+<p:sld xmlns:a="http://schemas.openxmlformats.org/drawingml/2006/main" xmlns:r="http://schemas.openxmlformats.org/officeDocument/2006/relationships" xmlns:p="http://schemas.openxmlformats.org/presentationml/2006/main">
+  <p:cSld>
+    <p:spTree>
+      <p:nvGrpSpPr>
+        <p:cNvPr id="1" name=""/>
+        <p:cNvGrpSpPr/>
+        <p:nvPr/>
+      </p:nvGrpSpPr>
+      <p:grpSpPr>
+        <a:xfrm>
+          <a:off x="0" y="0"/>
+          <a:ext cx="0" cy="0"/>
+          <a:chOff x="0" y="0"/>
+          <a:chExt cx="0" cy="0"/>
+        </a:xfrm>
+      </p:grpSpPr>
+      <p:sp>
+        <p:nvSpPr>
+          <p:cNvPr id="2" name="Titel 1">
+            <a:extLst>
+              <a:ext uri="{FF2B5EF4-FFF2-40B4-BE49-F238E27FC236}">
                 <a16:creationId xmlns:a16="http://schemas.microsoft.com/office/drawing/2014/main" id="{A40D14D6-C616-7346-AB1F-E0B3C6F3B4F5}"/>
               </a:ext>
             </a:extLst>
@@ -3734,7 +3893,9 @@
           </a:xfrm>
         </p:spPr>
         <p:txBody>
-          <a:bodyPr/>
+          <a:bodyPr>
+            <a:normAutofit fontScale="92500" lnSpcReduction="10000"/>
+          </a:bodyPr>
           <a:lstStyle/>
           <a:p>
             <a:r>
@@ -3746,7 +3907,7 @@
             <a:pPr lvl="1"/>
             <a:r>
               <a:rPr lang="en-GB" dirty="0"/>
-              <a:t>State Space of the problem</a:t>
+              <a:t>State Space of the problem (Mark)</a:t>
             </a:r>
           </a:p>
           <a:p>
@@ -3758,7 +3919,34 @@
               <a:rPr lang="en-GB" dirty="0" err="1"/>
               <a:t>Datastructures</a:t>
             </a:r>
-            <a:endParaRPr lang="en-GB" dirty="0"/>
+            <a:r>
+              <a:rPr lang="en-GB" dirty="0"/>
+              <a:t> (</a:t>
+            </a:r>
+            <a:r>
+              <a:rPr lang="en-GB" dirty="0" err="1"/>
+              <a:t>Terugblik</a:t>
+            </a:r>
+            <a:r>
+              <a:rPr lang="en-GB" dirty="0"/>
+              <a:t> </a:t>
+            </a:r>
+            <a:r>
+              <a:rPr lang="en-GB" dirty="0" err="1"/>
+              <a:t>vorige</a:t>
+            </a:r>
+            <a:r>
+              <a:rPr lang="en-GB" dirty="0"/>
+              <a:t> week) (</a:t>
+            </a:r>
+            <a:r>
+              <a:rPr lang="en-GB" dirty="0" err="1"/>
+              <a:t>Loek</a:t>
+            </a:r>
+            <a:r>
+              <a:rPr lang="en-GB" dirty="0"/>
+              <a:t>)</a:t>
+            </a:r>
           </a:p>
           <a:p>
             <a:pPr lvl="1"/>
@@ -3772,28 +3960,73 @@
             </a:r>
           </a:p>
           <a:p>
-            <a:r>
-              <a:rPr lang="en-GB" dirty="0"/>
-              <a:t>3. Algorithms</a:t>
-            </a:r>
-          </a:p>
-          <a:p>
             <a:pPr lvl="1"/>
             <a:r>
               <a:rPr lang="en-GB" dirty="0"/>
+              <a:t>Results</a:t>
+            </a:r>
+          </a:p>
+          <a:p>
+            <a:r>
+              <a:rPr lang="en-GB" dirty="0"/>
+              <a:t>3. Algorithms (</a:t>
+            </a:r>
+            <a:r>
+              <a:rPr lang="en-GB" dirty="0" err="1"/>
+              <a:t>Sebas</a:t>
+            </a:r>
+            <a:r>
+              <a:rPr lang="en-GB" dirty="0"/>
+              <a:t>)</a:t>
+            </a:r>
+          </a:p>
+          <a:p>
+            <a:pPr lvl="1"/>
+            <a:r>
+              <a:rPr lang="en-GB" dirty="0"/>
               <a:t>Random, Greedy</a:t>
             </a:r>
           </a:p>
           <a:p>
             <a:r>
               <a:rPr lang="en-GB" dirty="0"/>
-              <a:t>4. Results &amp; Runtimes</a:t>
-            </a:r>
-          </a:p>
-          <a:p>
-            <a:r>
-              <a:rPr lang="en-GB" dirty="0"/>
-              <a:t>5. Q&amp;A and discussion</a:t>
+              <a:t>4. Results (</a:t>
+            </a:r>
+            <a:r>
+              <a:rPr lang="en-GB" dirty="0" err="1"/>
+              <a:t>Sebas</a:t>
+            </a:r>
+            <a:r>
+              <a:rPr lang="en-GB" dirty="0"/>
+              <a:t>)</a:t>
+            </a:r>
+          </a:p>
+          <a:p>
+            <a:r>
+              <a:rPr lang="en-GB" dirty="0"/>
+              <a:t>Future </a:t>
+            </a:r>
+            <a:r>
+              <a:rPr lang="en-GB" dirty="0" err="1"/>
+              <a:t>heuristieken</a:t>
+            </a:r>
+            <a:r>
+              <a:rPr lang="en-GB" dirty="0"/>
+              <a:t> (</a:t>
+            </a:r>
+            <a:r>
+              <a:rPr lang="en-GB" dirty="0" err="1"/>
+              <a:t>Allemaal</a:t>
+            </a:r>
+            <a:r>
+              <a:rPr lang="en-GB" dirty="0"/>
+              <a:t>)</a:t>
+            </a:r>
+          </a:p>
+          <a:p>
+            <a:r>
+              <a:rPr lang="en-GB" dirty="0"/>
+              <a:t>5. Q&amp;A and discussion (Mark)</a:t>
             </a:r>
           </a:p>
         </p:txBody>

</xml_diff>

<commit_message>
Added Seb's slides to PPP
</commit_message>
<xml_diff>
--- a/Documentation/PPP, Week 2, Meeting 1.pptx
+++ b/Documentation/PPP, Week 2, Meeting 1.pptx
@@ -5,7 +5,7 @@
     <p:sldMasterId id="2147483672" r:id="rId1"/>
   </p:sldMasterIdLst>
   <p:notesMasterIdLst>
-    <p:notesMasterId r:id="rId16"/>
+    <p:notesMasterId r:id="rId22"/>
   </p:notesMasterIdLst>
   <p:sldIdLst>
     <p:sldId id="256" r:id="rId2"/>
@@ -15,13 +15,19 @@
     <p:sldId id="268" r:id="rId6"/>
     <p:sldId id="257" r:id="rId7"/>
     <p:sldId id="267" r:id="rId8"/>
-    <p:sldId id="274" r:id="rId9"/>
-    <p:sldId id="275" r:id="rId10"/>
-    <p:sldId id="276" r:id="rId11"/>
-    <p:sldId id="271" r:id="rId12"/>
-    <p:sldId id="269" r:id="rId13"/>
-    <p:sldId id="273" r:id="rId14"/>
-    <p:sldId id="265" r:id="rId15"/>
+    <p:sldId id="277" r:id="rId9"/>
+    <p:sldId id="278" r:id="rId10"/>
+    <p:sldId id="279" r:id="rId11"/>
+    <p:sldId id="280" r:id="rId12"/>
+    <p:sldId id="281" r:id="rId13"/>
+    <p:sldId id="282" r:id="rId14"/>
+    <p:sldId id="274" r:id="rId15"/>
+    <p:sldId id="275" r:id="rId16"/>
+    <p:sldId id="276" r:id="rId17"/>
+    <p:sldId id="271" r:id="rId18"/>
+    <p:sldId id="269" r:id="rId19"/>
+    <p:sldId id="273" r:id="rId20"/>
+    <p:sldId id="265" r:id="rId21"/>
   </p:sldIdLst>
   <p:sldSz cx="12192000" cy="6858000"/>
   <p:notesSz cx="6858000" cy="9144000"/>
@@ -3551,6 +3557,1235 @@
 </file>
 
 <file path=ppt/slides/slide10.xml><?xml version="1.0" encoding="utf-8"?>
+<p:sld xmlns:a="http://schemas.openxmlformats.org/drawingml/2006/main" xmlns:r="http://schemas.openxmlformats.org/officeDocument/2006/relationships" xmlns:p="http://schemas.openxmlformats.org/presentationml/2006/main">
+  <p:cSld>
+    <p:spTree>
+      <p:nvGrpSpPr>
+        <p:cNvPr id="1" name=""/>
+        <p:cNvGrpSpPr/>
+        <p:nvPr/>
+      </p:nvGrpSpPr>
+      <p:grpSpPr>
+        <a:xfrm>
+          <a:off x="0" y="0"/>
+          <a:ext cx="0" cy="0"/>
+          <a:chOff x="0" y="0"/>
+          <a:chExt cx="0" cy="0"/>
+        </a:xfrm>
+      </p:grpSpPr>
+      <p:sp>
+        <p:nvSpPr>
+          <p:cNvPr id="2" name="Titel 1">
+            <a:extLst>
+              <a:ext uri="{FF2B5EF4-FFF2-40B4-BE49-F238E27FC236}">
+                <a16:creationId xmlns:a16="http://schemas.microsoft.com/office/drawing/2014/main" id="{BDECAEB1-542A-F848-9D2C-B10DFE956AB7}"/>
+              </a:ext>
+            </a:extLst>
+          </p:cNvPr>
+          <p:cNvSpPr>
+            <a:spLocks noGrp="1"/>
+          </p:cNvSpPr>
+          <p:nvPr>
+            <p:ph type="title"/>
+          </p:nvPr>
+        </p:nvSpPr>
+        <p:spPr/>
+        <p:txBody>
+          <a:bodyPr/>
+          <a:lstStyle/>
+          <a:p>
+            <a:r>
+              <a:rPr lang="en-GB" dirty="0"/>
+              <a:t>Self avoiding random walk (with a twist)</a:t>
+            </a:r>
+          </a:p>
+        </p:txBody>
+      </p:sp>
+      <p:sp>
+        <p:nvSpPr>
+          <p:cNvPr id="3" name="Tijdelijke aanduiding voor inhoud 2">
+            <a:extLst>
+              <a:ext uri="{FF2B5EF4-FFF2-40B4-BE49-F238E27FC236}">
+                <a16:creationId xmlns:a16="http://schemas.microsoft.com/office/drawing/2014/main" id="{6B57B016-94D5-F646-9976-362E7188E1F0}"/>
+              </a:ext>
+            </a:extLst>
+          </p:cNvPr>
+          <p:cNvSpPr>
+            <a:spLocks noGrp="1"/>
+          </p:cNvSpPr>
+          <p:nvPr>
+            <p:ph sz="half" idx="1"/>
+          </p:nvPr>
+        </p:nvSpPr>
+        <p:spPr/>
+        <p:txBody>
+          <a:bodyPr>
+            <a:normAutofit lnSpcReduction="10000"/>
+          </a:bodyPr>
+          <a:lstStyle/>
+          <a:p>
+            <a:r>
+              <a:rPr lang="en-GB" dirty="0"/>
+              <a:t>Let S be HP-chain of length n.</a:t>
+            </a:r>
+          </a:p>
+          <a:p>
+            <a:r>
+              <a:rPr lang="en-GB" dirty="0"/>
+              <a:t>Fix first 2 elements of chain.</a:t>
+            </a:r>
+            <a:endParaRPr lang="en-GB" baseline="-25000" dirty="0"/>
+          </a:p>
+          <a:p>
+            <a:r>
+              <a:rPr lang="en-GB" dirty="0"/>
+              <a:t>For subsequent elements up to the n</a:t>
+            </a:r>
+            <a:r>
+              <a:rPr lang="en-GB" baseline="30000" dirty="0"/>
+              <a:t>th</a:t>
+            </a:r>
+            <a:r>
+              <a:rPr lang="en-GB" dirty="0"/>
+              <a:t> element, choose random move from {u, d, l, r, </a:t>
+            </a:r>
+            <a:r>
+              <a:rPr lang="en-GB" dirty="0" err="1"/>
+              <a:t>i</a:t>
+            </a:r>
+            <a:r>
+              <a:rPr lang="en-GB" dirty="0"/>
+              <a:t>, o}.</a:t>
+            </a:r>
+          </a:p>
+          <a:p>
+            <a:r>
+              <a:rPr lang="en-GB" dirty="0"/>
+              <a:t>If newly chosen coordinates are occupied, try new move.</a:t>
+            </a:r>
+          </a:p>
+          <a:p>
+            <a:r>
+              <a:rPr lang="en-GB" dirty="0">
+                <a:solidFill>
+                  <a:srgbClr val="FF0000"/>
+                </a:solidFill>
+              </a:rPr>
+              <a:t>If newly chosen coordinates are on the border, try new move.</a:t>
+            </a:r>
+          </a:p>
+          <a:p>
+            <a:r>
+              <a:rPr lang="en-GB" dirty="0"/>
+              <a:t>Stuck? Start over.</a:t>
+            </a:r>
+          </a:p>
+          <a:p>
+            <a:endParaRPr lang="en-GB" dirty="0"/>
+          </a:p>
+        </p:txBody>
+      </p:sp>
+      <p:sp>
+        <p:nvSpPr>
+          <p:cNvPr id="4" name="Tijdelijke aanduiding voor inhoud 3">
+            <a:extLst>
+              <a:ext uri="{FF2B5EF4-FFF2-40B4-BE49-F238E27FC236}">
+                <a16:creationId xmlns:a16="http://schemas.microsoft.com/office/drawing/2014/main" id="{D29CAD77-2AED-E94A-845B-B60D651EF411}"/>
+              </a:ext>
+            </a:extLst>
+          </p:cNvPr>
+          <p:cNvSpPr>
+            <a:spLocks noGrp="1"/>
+          </p:cNvSpPr>
+          <p:nvPr>
+            <p:ph sz="half" idx="2"/>
+          </p:nvPr>
+        </p:nvSpPr>
+        <p:spPr>
+          <a:xfrm>
+            <a:off x="9934956" y="3260725"/>
+            <a:ext cx="2066544" cy="2398465"/>
+          </a:xfrm>
+        </p:spPr>
+        <p:txBody>
+          <a:bodyPr>
+            <a:normAutofit lnSpcReduction="10000"/>
+          </a:bodyPr>
+          <a:lstStyle/>
+          <a:p>
+            <a:pPr marL="0" indent="0">
+              <a:buNone/>
+            </a:pPr>
+            <a:endParaRPr lang="en-GB" dirty="0"/>
+          </a:p>
+          <a:p>
+            <a:pPr lvl="1"/>
+            <a:endParaRPr lang="en-GB" dirty="0"/>
+          </a:p>
+        </p:txBody>
+      </p:sp>
+      <p:pic>
+        <p:nvPicPr>
+          <p:cNvPr id="2050" name="Picture 2" descr="Afbeeldingsresultaat voor self avoiding random walk">
+            <a:extLst>
+              <a:ext uri="{FF2B5EF4-FFF2-40B4-BE49-F238E27FC236}">
+                <a16:creationId xmlns:a16="http://schemas.microsoft.com/office/drawing/2014/main" id="{65C0D2C7-770B-4B82-A820-DDE69D725EE6}"/>
+              </a:ext>
+            </a:extLst>
+          </p:cNvPr>
+          <p:cNvPicPr>
+            <a:picLocks noChangeAspect="1" noChangeArrowheads="1"/>
+          </p:cNvPicPr>
+          <p:nvPr/>
+        </p:nvPicPr>
+        <p:blipFill>
+          <a:blip r:embed="rId2">
+            <a:extLst>
+              <a:ext uri="{28A0092B-C50C-407E-A947-70E740481C1C}">
+                <a14:useLocalDpi xmlns:a14="http://schemas.microsoft.com/office/drawing/2010/main" val="0"/>
+              </a:ext>
+            </a:extLst>
+          </a:blip>
+          <a:srcRect/>
+          <a:stretch>
+            <a:fillRect/>
+          </a:stretch>
+        </p:blipFill>
+        <p:spPr bwMode="auto">
+          <a:xfrm>
+            <a:off x="6648640" y="1840582"/>
+            <a:ext cx="3663760" cy="3663760"/>
+          </a:xfrm>
+          <a:prstGeom prst="rect">
+            <a:avLst/>
+          </a:prstGeom>
+          <a:noFill/>
+          <a:extLst>
+            <a:ext uri="{909E8E84-426E-40DD-AFC4-6F175D3DCCD1}">
+              <a14:hiddenFill xmlns:a14="http://schemas.microsoft.com/office/drawing/2010/main">
+                <a:solidFill>
+                  <a:srgbClr val="FFFFFF"/>
+                </a:solidFill>
+              </a14:hiddenFill>
+            </a:ext>
+          </a:extLst>
+        </p:spPr>
+      </p:pic>
+    </p:spTree>
+    <p:extLst>
+      <p:ext uri="{BB962C8B-B14F-4D97-AF65-F5344CB8AC3E}">
+        <p14:creationId xmlns:p14="http://schemas.microsoft.com/office/powerpoint/2010/main" val="2995681747"/>
+      </p:ext>
+    </p:extLst>
+  </p:cSld>
+  <p:clrMapOvr>
+    <a:masterClrMapping/>
+  </p:clrMapOvr>
+</p:sld>
+</file>
+
+<file path=ppt/slides/slide11.xml><?xml version="1.0" encoding="utf-8"?>
+<p:sld xmlns:a="http://schemas.openxmlformats.org/drawingml/2006/main" xmlns:r="http://schemas.openxmlformats.org/officeDocument/2006/relationships" xmlns:p="http://schemas.openxmlformats.org/presentationml/2006/main">
+  <p:cSld>
+    <p:spTree>
+      <p:nvGrpSpPr>
+        <p:cNvPr id="1" name=""/>
+        <p:cNvGrpSpPr/>
+        <p:nvPr/>
+      </p:nvGrpSpPr>
+      <p:grpSpPr>
+        <a:xfrm>
+          <a:off x="0" y="0"/>
+          <a:ext cx="0" cy="0"/>
+          <a:chOff x="0" y="0"/>
+          <a:chExt cx="0" cy="0"/>
+        </a:xfrm>
+      </p:grpSpPr>
+      <p:sp>
+        <p:nvSpPr>
+          <p:cNvPr id="2" name="Titel 1">
+            <a:extLst>
+              <a:ext uri="{FF2B5EF4-FFF2-40B4-BE49-F238E27FC236}">
+                <a16:creationId xmlns:a16="http://schemas.microsoft.com/office/drawing/2014/main" id="{BDECAEB1-542A-F848-9D2C-B10DFE956AB7}"/>
+              </a:ext>
+            </a:extLst>
+          </p:cNvPr>
+          <p:cNvSpPr>
+            <a:spLocks noGrp="1"/>
+          </p:cNvSpPr>
+          <p:nvPr>
+            <p:ph type="title"/>
+          </p:nvPr>
+        </p:nvSpPr>
+        <p:spPr/>
+        <p:txBody>
+          <a:bodyPr/>
+          <a:lstStyle/>
+          <a:p>
+            <a:r>
+              <a:rPr lang="en-GB" dirty="0"/>
+              <a:t>Greedy</a:t>
+            </a:r>
+          </a:p>
+        </p:txBody>
+      </p:sp>
+      <p:sp>
+        <p:nvSpPr>
+          <p:cNvPr id="3" name="Tijdelijke aanduiding voor inhoud 2">
+            <a:extLst>
+              <a:ext uri="{FF2B5EF4-FFF2-40B4-BE49-F238E27FC236}">
+                <a16:creationId xmlns:a16="http://schemas.microsoft.com/office/drawing/2014/main" id="{6B57B016-94D5-F646-9976-362E7188E1F0}"/>
+              </a:ext>
+            </a:extLst>
+          </p:cNvPr>
+          <p:cNvSpPr>
+            <a:spLocks noGrp="1"/>
+          </p:cNvSpPr>
+          <p:nvPr>
+            <p:ph sz="half" idx="1"/>
+          </p:nvPr>
+        </p:nvSpPr>
+        <p:spPr/>
+        <p:txBody>
+          <a:bodyPr>
+            <a:normAutofit lnSpcReduction="10000"/>
+          </a:bodyPr>
+          <a:lstStyle/>
+          <a:p>
+            <a:r>
+              <a:rPr lang="en-GB" dirty="0"/>
+              <a:t>Let S be HP-chain of length n.</a:t>
+            </a:r>
+          </a:p>
+          <a:p>
+            <a:r>
+              <a:rPr lang="en-GB" dirty="0"/>
+              <a:t>Fix first 2 elements of chain.</a:t>
+            </a:r>
+          </a:p>
+          <a:p>
+            <a:r>
+              <a:rPr lang="en-GB" dirty="0"/>
+              <a:t>For subsequent elements, try all moves from {u, d, l, r, </a:t>
+            </a:r>
+            <a:r>
+              <a:rPr lang="en-GB" dirty="0" err="1"/>
+              <a:t>i</a:t>
+            </a:r>
+            <a:r>
+              <a:rPr lang="en-GB" dirty="0"/>
+              <a:t>, o} and check whether move would result in H-H connection (with self-avoidance).</a:t>
+            </a:r>
+          </a:p>
+          <a:p>
+            <a:r>
+              <a:rPr lang="en-GB" dirty="0"/>
+              <a:t>If so, use the move. If not, pick random.</a:t>
+            </a:r>
+          </a:p>
+          <a:p>
+            <a:r>
+              <a:rPr lang="en-GB" dirty="0"/>
+              <a:t>Stuck? Start over.</a:t>
+            </a:r>
+          </a:p>
+        </p:txBody>
+      </p:sp>
+      <p:pic>
+        <p:nvPicPr>
+          <p:cNvPr id="4098" name="Picture 2" descr="Afbeeldingsresultaat voor greedy algorithm">
+            <a:extLst>
+              <a:ext uri="{FF2B5EF4-FFF2-40B4-BE49-F238E27FC236}">
+                <a16:creationId xmlns:a16="http://schemas.microsoft.com/office/drawing/2014/main" id="{E2145716-8FD2-4D20-9F53-FFC859D21248}"/>
+              </a:ext>
+            </a:extLst>
+          </p:cNvPr>
+          <p:cNvPicPr>
+            <a:picLocks noGrp="1" noChangeAspect="1" noChangeArrowheads="1" noCrop="1"/>
+          </p:cNvPicPr>
+          <p:nvPr>
+            <p:ph sz="half" idx="2"/>
+          </p:nvPr>
+        </p:nvPicPr>
+        <p:blipFill>
+          <a:blip r:embed="rId2">
+            <a:extLst>
+              <a:ext uri="{28A0092B-C50C-407E-A947-70E740481C1C}">
+                <a14:useLocalDpi xmlns:a14="http://schemas.microsoft.com/office/drawing/2010/main" val="0"/>
+              </a:ext>
+            </a:extLst>
+          </a:blip>
+          <a:srcRect/>
+          <a:stretch>
+            <a:fillRect/>
+          </a:stretch>
+        </p:blipFill>
+        <p:spPr bwMode="auto">
+          <a:xfrm>
+            <a:off x="6908799" y="2457054"/>
+            <a:ext cx="3999177" cy="2399506"/>
+          </a:xfrm>
+          <a:prstGeom prst="rect">
+            <a:avLst/>
+          </a:prstGeom>
+          <a:noFill/>
+          <a:extLst>
+            <a:ext uri="{909E8E84-426E-40DD-AFC4-6F175D3DCCD1}">
+              <a14:hiddenFill xmlns:a14="http://schemas.microsoft.com/office/drawing/2010/main">
+                <a:solidFill>
+                  <a:srgbClr val="FFFFFF"/>
+                </a:solidFill>
+              </a14:hiddenFill>
+            </a:ext>
+          </a:extLst>
+        </p:spPr>
+      </p:pic>
+    </p:spTree>
+    <p:extLst>
+      <p:ext uri="{BB962C8B-B14F-4D97-AF65-F5344CB8AC3E}">
+        <p14:creationId xmlns:p14="http://schemas.microsoft.com/office/powerpoint/2010/main" val="3810750948"/>
+      </p:ext>
+    </p:extLst>
+  </p:cSld>
+  <p:clrMapOvr>
+    <a:masterClrMapping/>
+  </p:clrMapOvr>
+</p:sld>
+</file>
+
+<file path=ppt/slides/slide12.xml><?xml version="1.0" encoding="utf-8"?>
+<p:sld xmlns:a="http://schemas.openxmlformats.org/drawingml/2006/main" xmlns:r="http://schemas.openxmlformats.org/officeDocument/2006/relationships" xmlns:p="http://schemas.openxmlformats.org/presentationml/2006/main">
+  <p:cSld>
+    <p:spTree>
+      <p:nvGrpSpPr>
+        <p:cNvPr id="1" name=""/>
+        <p:cNvGrpSpPr/>
+        <p:nvPr/>
+      </p:nvGrpSpPr>
+      <p:grpSpPr>
+        <a:xfrm>
+          <a:off x="0" y="0"/>
+          <a:ext cx="0" cy="0"/>
+          <a:chOff x="0" y="0"/>
+          <a:chExt cx="0" cy="0"/>
+        </a:xfrm>
+      </p:grpSpPr>
+      <p:sp>
+        <p:nvSpPr>
+          <p:cNvPr id="2" name="Titel 1">
+            <a:extLst>
+              <a:ext uri="{FF2B5EF4-FFF2-40B4-BE49-F238E27FC236}">
+                <a16:creationId xmlns:a16="http://schemas.microsoft.com/office/drawing/2014/main" id="{BDECAEB1-542A-F848-9D2C-B10DFE956AB7}"/>
+              </a:ext>
+            </a:extLst>
+          </p:cNvPr>
+          <p:cNvSpPr>
+            <a:spLocks noGrp="1"/>
+          </p:cNvSpPr>
+          <p:nvPr>
+            <p:ph type="title"/>
+          </p:nvPr>
+        </p:nvSpPr>
+        <p:spPr/>
+        <p:txBody>
+          <a:bodyPr/>
+          <a:lstStyle/>
+          <a:p>
+            <a:r>
+              <a:rPr lang="en-GB" dirty="0"/>
+              <a:t>Extended Heuristic Algorithm</a:t>
+            </a:r>
+          </a:p>
+        </p:txBody>
+      </p:sp>
+      <p:sp>
+        <p:nvSpPr>
+          <p:cNvPr id="3" name="Tijdelijke aanduiding voor inhoud 2">
+            <a:extLst>
+              <a:ext uri="{FF2B5EF4-FFF2-40B4-BE49-F238E27FC236}">
+                <a16:creationId xmlns:a16="http://schemas.microsoft.com/office/drawing/2014/main" id="{6B57B016-94D5-F646-9976-362E7188E1F0}"/>
+              </a:ext>
+            </a:extLst>
+          </p:cNvPr>
+          <p:cNvSpPr>
+            <a:spLocks noGrp="1"/>
+          </p:cNvSpPr>
+          <p:nvPr>
+            <p:ph sz="half" idx="1"/>
+          </p:nvPr>
+        </p:nvSpPr>
+        <p:spPr/>
+        <p:txBody>
+          <a:bodyPr/>
+          <a:lstStyle/>
+          <a:p>
+            <a:r>
+              <a:rPr lang="en-GB" dirty="0"/>
+              <a:t>Divide chain S up into n parts S</a:t>
+            </a:r>
+            <a:r>
+              <a:rPr lang="en-GB" baseline="-25000" dirty="0"/>
+              <a:t>i</a:t>
+            </a:r>
+            <a:r>
+              <a:rPr lang="en-GB" dirty="0"/>
+              <a:t> of predetermined length.</a:t>
+            </a:r>
+          </a:p>
+          <a:p>
+            <a:r>
+              <a:rPr lang="en-GB" dirty="0"/>
+              <a:t>Fold S</a:t>
+            </a:r>
+            <a:r>
+              <a:rPr lang="en-GB" baseline="-25000" dirty="0"/>
+              <a:t>1</a:t>
+            </a:r>
+            <a:r>
+              <a:rPr lang="en-GB" dirty="0"/>
+              <a:t> optimally against S</a:t>
+            </a:r>
+            <a:r>
+              <a:rPr lang="en-GB" baseline="-25000" dirty="0"/>
+              <a:t>0 </a:t>
+            </a:r>
+            <a:r>
+              <a:rPr lang="en-GB" dirty="0"/>
+              <a:t>by going through all permutations (with self-avoidance), then fold S</a:t>
+            </a:r>
+            <a:r>
+              <a:rPr lang="en-GB" baseline="-25000" dirty="0"/>
+              <a:t>2</a:t>
+            </a:r>
+            <a:r>
+              <a:rPr lang="en-GB" dirty="0"/>
+              <a:t> optimally against S</a:t>
+            </a:r>
+            <a:r>
+              <a:rPr lang="en-GB" baseline="-25000" dirty="0"/>
+              <a:t>0 </a:t>
+            </a:r>
+            <a:r>
+              <a:rPr lang="en-US" dirty="0"/>
+              <a:t>∪</a:t>
+            </a:r>
+            <a:r>
+              <a:rPr lang="en-GB" dirty="0"/>
+              <a:t> S</a:t>
+            </a:r>
+            <a:r>
+              <a:rPr lang="en-GB" baseline="-25000" dirty="0"/>
+              <a:t>1</a:t>
+            </a:r>
+            <a:r>
+              <a:rPr lang="en-GB" dirty="0"/>
+              <a:t>, etc. up until S</a:t>
+            </a:r>
+            <a:r>
+              <a:rPr lang="en-GB" baseline="-25000" dirty="0"/>
+              <a:t>n</a:t>
+            </a:r>
+            <a:r>
+              <a:rPr lang="en-GB" dirty="0"/>
+              <a:t>.</a:t>
+            </a:r>
+          </a:p>
+          <a:p>
+            <a:r>
+              <a:rPr lang="en-GB" dirty="0"/>
+              <a:t>Optimal means most H-H contacts.</a:t>
+            </a:r>
+          </a:p>
+        </p:txBody>
+      </p:sp>
+      <p:pic>
+        <p:nvPicPr>
+          <p:cNvPr id="5" name="Tijdelijke aanduiding voor inhoud 4">
+            <a:extLst>
+              <a:ext uri="{FF2B5EF4-FFF2-40B4-BE49-F238E27FC236}">
+                <a16:creationId xmlns:a16="http://schemas.microsoft.com/office/drawing/2014/main" id="{A55ADCDF-EAAB-47DA-9B57-A0CE26AA48DA}"/>
+              </a:ext>
+            </a:extLst>
+          </p:cNvPr>
+          <p:cNvPicPr>
+            <a:picLocks noGrp="1" noChangeAspect="1"/>
+          </p:cNvPicPr>
+          <p:nvPr>
+            <p:ph sz="half" idx="2"/>
+          </p:nvPr>
+        </p:nvPicPr>
+        <p:blipFill>
+          <a:blip r:embed="rId2"/>
+          <a:stretch>
+            <a:fillRect/>
+          </a:stretch>
+        </p:blipFill>
+        <p:spPr>
+          <a:xfrm>
+            <a:off x="6172202" y="2564691"/>
+            <a:ext cx="5181600" cy="2238205"/>
+          </a:xfrm>
+          <a:prstGeom prst="rect">
+            <a:avLst/>
+          </a:prstGeom>
+        </p:spPr>
+      </p:pic>
+      <p:sp>
+        <p:nvSpPr>
+          <p:cNvPr id="6" name="Tekstvak 5">
+            <a:extLst>
+              <a:ext uri="{FF2B5EF4-FFF2-40B4-BE49-F238E27FC236}">
+                <a16:creationId xmlns:a16="http://schemas.microsoft.com/office/drawing/2014/main" id="{72D80279-86D1-44DE-A941-63237F704A60}"/>
+              </a:ext>
+            </a:extLst>
+          </p:cNvPr>
+          <p:cNvSpPr txBox="1"/>
+          <p:nvPr/>
+        </p:nvSpPr>
+        <p:spPr>
+          <a:xfrm>
+            <a:off x="1098550" y="6032500"/>
+            <a:ext cx="10185400" cy="646331"/>
+          </a:xfrm>
+          <a:prstGeom prst="rect">
+            <a:avLst/>
+          </a:prstGeom>
+          <a:noFill/>
+        </p:spPr>
+        <p:txBody>
+          <a:bodyPr wrap="square" rtlCol="0">
+            <a:spAutoFit/>
+          </a:bodyPr>
+          <a:lstStyle/>
+          <a:p>
+            <a:r>
+              <a:rPr lang="en-US" dirty="0"/>
+              <a:t>Source: </a:t>
+            </a:r>
+            <a:r>
+              <a:rPr lang="en-US" dirty="0" err="1"/>
+              <a:t>Traykov</a:t>
+            </a:r>
+            <a:r>
+              <a:rPr lang="en-US" dirty="0"/>
+              <a:t>, </a:t>
+            </a:r>
+            <a:r>
+              <a:rPr lang="en-US" dirty="0" err="1"/>
+              <a:t>Metodi</a:t>
+            </a:r>
+            <a:r>
+              <a:rPr lang="en-US" dirty="0"/>
+              <a:t>, et al. "Algorithm for protein folding problem in 3D lattice HP model." </a:t>
+            </a:r>
+            <a:r>
+              <a:rPr lang="en-US" i="1" dirty="0"/>
+              <a:t>International Journal of Biology and Biomedicine</a:t>
+            </a:r>
+            <a:r>
+              <a:rPr lang="en-US" dirty="0"/>
+              <a:t> 3 (2018).</a:t>
+            </a:r>
+          </a:p>
+        </p:txBody>
+      </p:sp>
+    </p:spTree>
+    <p:extLst>
+      <p:ext uri="{BB962C8B-B14F-4D97-AF65-F5344CB8AC3E}">
+        <p14:creationId xmlns:p14="http://schemas.microsoft.com/office/powerpoint/2010/main" val="2280938724"/>
+      </p:ext>
+    </p:extLst>
+  </p:cSld>
+  <p:clrMapOvr>
+    <a:masterClrMapping/>
+  </p:clrMapOvr>
+</p:sld>
+</file>
+
+<file path=ppt/slides/slide13.xml><?xml version="1.0" encoding="utf-8"?>
+<p:sld xmlns:a="http://schemas.openxmlformats.org/drawingml/2006/main" xmlns:r="http://schemas.openxmlformats.org/officeDocument/2006/relationships" xmlns:p="http://schemas.openxmlformats.org/presentationml/2006/main">
+  <p:cSld>
+    <p:spTree>
+      <p:nvGrpSpPr>
+        <p:cNvPr id="1" name=""/>
+        <p:cNvGrpSpPr/>
+        <p:nvPr/>
+      </p:nvGrpSpPr>
+      <p:grpSpPr>
+        <a:xfrm>
+          <a:off x="0" y="0"/>
+          <a:ext cx="0" cy="0"/>
+          <a:chOff x="0" y="0"/>
+          <a:chExt cx="0" cy="0"/>
+        </a:xfrm>
+      </p:grpSpPr>
+      <p:sp>
+        <p:nvSpPr>
+          <p:cNvPr id="2" name="Titel 1">
+            <a:extLst>
+              <a:ext uri="{FF2B5EF4-FFF2-40B4-BE49-F238E27FC236}">
+                <a16:creationId xmlns:a16="http://schemas.microsoft.com/office/drawing/2014/main" id="{BDECAEB1-542A-F848-9D2C-B10DFE956AB7}"/>
+              </a:ext>
+            </a:extLst>
+          </p:cNvPr>
+          <p:cNvSpPr>
+            <a:spLocks noGrp="1"/>
+          </p:cNvSpPr>
+          <p:nvPr>
+            <p:ph type="title"/>
+          </p:nvPr>
+        </p:nvSpPr>
+        <p:spPr/>
+        <p:txBody>
+          <a:bodyPr/>
+          <a:lstStyle/>
+          <a:p>
+            <a:r>
+              <a:rPr lang="en-GB" dirty="0"/>
+              <a:t>Breadth-first: Beam Search</a:t>
+            </a:r>
+          </a:p>
+        </p:txBody>
+      </p:sp>
+      <p:sp>
+        <p:nvSpPr>
+          <p:cNvPr id="3" name="Tijdelijke aanduiding voor inhoud 2">
+            <a:extLst>
+              <a:ext uri="{FF2B5EF4-FFF2-40B4-BE49-F238E27FC236}">
+                <a16:creationId xmlns:a16="http://schemas.microsoft.com/office/drawing/2014/main" id="{6B57B016-94D5-F646-9976-362E7188E1F0}"/>
+              </a:ext>
+            </a:extLst>
+          </p:cNvPr>
+          <p:cNvSpPr>
+            <a:spLocks noGrp="1"/>
+          </p:cNvSpPr>
+          <p:nvPr>
+            <p:ph sz="half" idx="1"/>
+          </p:nvPr>
+        </p:nvSpPr>
+        <p:spPr/>
+        <p:txBody>
+          <a:bodyPr/>
+          <a:lstStyle/>
+          <a:p>
+            <a:r>
+              <a:rPr lang="en-GB" dirty="0"/>
+              <a:t>Combination of breadth-first and greedy.</a:t>
+            </a:r>
+          </a:p>
+          <a:p>
+            <a:r>
+              <a:rPr lang="en-GB" dirty="0"/>
+              <a:t>Goes through all moves from {u, d, l, r, </a:t>
+            </a:r>
+            <a:r>
+              <a:rPr lang="en-GB" dirty="0" err="1"/>
+              <a:t>i</a:t>
+            </a:r>
+            <a:r>
+              <a:rPr lang="en-GB" dirty="0"/>
+              <a:t>, o} and selects the n best moves (based on ‘beam width’).</a:t>
+            </a:r>
+          </a:p>
+          <a:p>
+            <a:r>
+              <a:rPr lang="en-GB" dirty="0"/>
+              <a:t>From selected n moves, go 1 level deeper and repeat up until maximum depth.</a:t>
+            </a:r>
+          </a:p>
+        </p:txBody>
+      </p:sp>
+      <p:pic>
+        <p:nvPicPr>
+          <p:cNvPr id="3074" name="Picture 2" descr="Afbeeldingsresultaat voor beam search">
+            <a:extLst>
+              <a:ext uri="{FF2B5EF4-FFF2-40B4-BE49-F238E27FC236}">
+                <a16:creationId xmlns:a16="http://schemas.microsoft.com/office/drawing/2014/main" id="{2CAFA68E-8EBF-4DCC-83BC-2C80569331AD}"/>
+              </a:ext>
+            </a:extLst>
+          </p:cNvPr>
+          <p:cNvPicPr>
+            <a:picLocks noGrp="1" noChangeAspect="1" noChangeArrowheads="1"/>
+          </p:cNvPicPr>
+          <p:nvPr>
+            <p:ph sz="half" idx="2"/>
+          </p:nvPr>
+        </p:nvPicPr>
+        <p:blipFill>
+          <a:blip r:embed="rId2">
+            <a:extLst>
+              <a:ext uri="{28A0092B-C50C-407E-A947-70E740481C1C}">
+                <a14:useLocalDpi xmlns:a14="http://schemas.microsoft.com/office/drawing/2010/main" val="0"/>
+              </a:ext>
+            </a:extLst>
+          </a:blip>
+          <a:srcRect/>
+          <a:stretch>
+            <a:fillRect/>
+          </a:stretch>
+        </p:blipFill>
+        <p:spPr bwMode="auto">
+          <a:xfrm>
+            <a:off x="6172202" y="2467304"/>
+            <a:ext cx="5181600" cy="2420280"/>
+          </a:xfrm>
+          <a:prstGeom prst="rect">
+            <a:avLst/>
+          </a:prstGeom>
+          <a:noFill/>
+          <a:extLst>
+            <a:ext uri="{909E8E84-426E-40DD-AFC4-6F175D3DCCD1}">
+              <a14:hiddenFill xmlns:a14="http://schemas.microsoft.com/office/drawing/2010/main">
+                <a:solidFill>
+                  <a:srgbClr val="FFFFFF"/>
+                </a:solidFill>
+              </a14:hiddenFill>
+            </a:ext>
+          </a:extLst>
+        </p:spPr>
+      </p:pic>
+    </p:spTree>
+    <p:extLst>
+      <p:ext uri="{BB962C8B-B14F-4D97-AF65-F5344CB8AC3E}">
+        <p14:creationId xmlns:p14="http://schemas.microsoft.com/office/powerpoint/2010/main" val="143121407"/>
+      </p:ext>
+    </p:extLst>
+  </p:cSld>
+  <p:clrMapOvr>
+    <a:masterClrMapping/>
+  </p:clrMapOvr>
+</p:sld>
+</file>
+
+<file path=ppt/slides/slide14.xml><?xml version="1.0" encoding="utf-8"?>
+<p:sld xmlns:a="http://schemas.openxmlformats.org/drawingml/2006/main" xmlns:r="http://schemas.openxmlformats.org/officeDocument/2006/relationships" xmlns:p="http://schemas.openxmlformats.org/presentationml/2006/main">
+  <p:cSld>
+    <p:spTree>
+      <p:nvGrpSpPr>
+        <p:cNvPr id="1" name=""/>
+        <p:cNvGrpSpPr/>
+        <p:nvPr/>
+      </p:nvGrpSpPr>
+      <p:grpSpPr>
+        <a:xfrm>
+          <a:off x="0" y="0"/>
+          <a:ext cx="0" cy="0"/>
+          <a:chOff x="0" y="0"/>
+          <a:chExt cx="0" cy="0"/>
+        </a:xfrm>
+      </p:grpSpPr>
+      <p:sp>
+        <p:nvSpPr>
+          <p:cNvPr id="2" name="Titel 1">
+            <a:extLst>
+              <a:ext uri="{FF2B5EF4-FFF2-40B4-BE49-F238E27FC236}">
+                <a16:creationId xmlns:a16="http://schemas.microsoft.com/office/drawing/2014/main" id="{26D56270-1C1B-4B1E-BC4F-ACC759B672F7}"/>
+              </a:ext>
+            </a:extLst>
+          </p:cNvPr>
+          <p:cNvSpPr>
+            <a:spLocks noGrp="1"/>
+          </p:cNvSpPr>
+          <p:nvPr>
+            <p:ph type="title"/>
+          </p:nvPr>
+        </p:nvSpPr>
+        <p:spPr>
+          <a:xfrm>
+            <a:off x="838200" y="365125"/>
+            <a:ext cx="10515600" cy="1325563"/>
+          </a:xfrm>
+        </p:spPr>
+        <p:txBody>
+          <a:bodyPr/>
+          <a:lstStyle/>
+          <a:p>
+            <a:r>
+              <a:rPr lang="nl-NL" dirty="0" err="1"/>
+              <a:t>Results</a:t>
+            </a:r>
+            <a:r>
+              <a:rPr lang="nl-NL" dirty="0"/>
+              <a:t> – Data </a:t>
+            </a:r>
+            <a:br>
+              <a:rPr lang="nl-NL" dirty="0"/>
+            </a:br>
+            <a:r>
+              <a:rPr lang="nl-NL" dirty="0" err="1"/>
+              <a:t>structure</a:t>
+            </a:r>
+            <a:endParaRPr lang="en-GB" dirty="0"/>
+          </a:p>
+        </p:txBody>
+      </p:sp>
+      <p:sp>
+        <p:nvSpPr>
+          <p:cNvPr id="3" name="Tijdelijke aanduiding voor inhoud 2">
+            <a:extLst>
+              <a:ext uri="{FF2B5EF4-FFF2-40B4-BE49-F238E27FC236}">
+                <a16:creationId xmlns:a16="http://schemas.microsoft.com/office/drawing/2014/main" id="{938874C9-2E1B-4E00-9D04-38873D0AC371}"/>
+              </a:ext>
+            </a:extLst>
+          </p:cNvPr>
+          <p:cNvSpPr>
+            <a:spLocks noGrp="1"/>
+          </p:cNvSpPr>
+          <p:nvPr>
+            <p:ph sz="half" idx="1"/>
+          </p:nvPr>
+        </p:nvSpPr>
+        <p:spPr>
+          <a:xfrm>
+            <a:off x="838200" y="2412693"/>
+            <a:ext cx="3370243" cy="3764269"/>
+          </a:xfrm>
+        </p:spPr>
+        <p:txBody>
+          <a:bodyPr>
+            <a:normAutofit/>
+          </a:bodyPr>
+          <a:lstStyle/>
+          <a:p>
+            <a:r>
+              <a:rPr lang="nl-NL" sz="2400" dirty="0"/>
+              <a:t>L: </a:t>
+            </a:r>
+            <a:r>
+              <a:rPr lang="nl-NL" sz="2400" dirty="0" err="1"/>
+              <a:t>length</a:t>
+            </a:r>
+            <a:r>
+              <a:rPr lang="nl-NL" sz="2400" dirty="0"/>
+              <a:t> of </a:t>
+            </a:r>
+            <a:r>
+              <a:rPr lang="nl-NL" sz="2400" dirty="0" err="1"/>
+              <a:t>protein</a:t>
+            </a:r>
+            <a:endParaRPr lang="nl-NL" sz="2400" dirty="0"/>
+          </a:p>
+          <a:p>
+            <a:r>
+              <a:rPr lang="nl-NL" sz="2400" dirty="0"/>
+              <a:t>N: </a:t>
+            </a:r>
+            <a:r>
+              <a:rPr lang="nl-NL" sz="2400" dirty="0" err="1"/>
+              <a:t>number</a:t>
+            </a:r>
+            <a:r>
+              <a:rPr lang="nl-NL" sz="2400" dirty="0"/>
+              <a:t> of </a:t>
+            </a:r>
+            <a:r>
+              <a:rPr lang="nl-NL" sz="2400" dirty="0" err="1"/>
+              <a:t>iterations</a:t>
+            </a:r>
+            <a:endParaRPr lang="nl-NL" sz="2400" dirty="0"/>
+          </a:p>
+          <a:p>
+            <a:endParaRPr lang="nl-NL" sz="2400" dirty="0"/>
+          </a:p>
+        </p:txBody>
+      </p:sp>
+      <p:pic>
+        <p:nvPicPr>
+          <p:cNvPr id="5" name="Tijdelijke aanduiding voor inhoud 4">
+            <a:extLst>
+              <a:ext uri="{FF2B5EF4-FFF2-40B4-BE49-F238E27FC236}">
+                <a16:creationId xmlns:a16="http://schemas.microsoft.com/office/drawing/2014/main" id="{936E018E-90A8-44A9-B921-A228CBB1098D}"/>
+              </a:ext>
+            </a:extLst>
+          </p:cNvPr>
+          <p:cNvPicPr>
+            <a:picLocks noGrp="1" noChangeAspect="1"/>
+          </p:cNvPicPr>
+          <p:nvPr>
+            <p:ph sz="half" idx="2"/>
+          </p:nvPr>
+        </p:nvPicPr>
+        <p:blipFill>
+          <a:blip r:embed="rId2"/>
+          <a:stretch>
+            <a:fillRect/>
+          </a:stretch>
+        </p:blipFill>
+        <p:spPr>
+          <a:xfrm>
+            <a:off x="4549967" y="484743"/>
+            <a:ext cx="7095504" cy="6008132"/>
+          </a:xfrm>
+          <a:prstGeom prst="rect">
+            <a:avLst/>
+          </a:prstGeom>
+        </p:spPr>
+      </p:pic>
+    </p:spTree>
+    <p:extLst>
+      <p:ext uri="{BB962C8B-B14F-4D97-AF65-F5344CB8AC3E}">
+        <p14:creationId xmlns:p14="http://schemas.microsoft.com/office/powerpoint/2010/main" val="163970808"/>
+      </p:ext>
+    </p:extLst>
+  </p:cSld>
+  <p:clrMapOvr>
+    <a:masterClrMapping/>
+  </p:clrMapOvr>
+</p:sld>
+</file>
+
+<file path=ppt/slides/slide15.xml><?xml version="1.0" encoding="utf-8"?>
+<p:sld xmlns:a="http://schemas.openxmlformats.org/drawingml/2006/main" xmlns:r="http://schemas.openxmlformats.org/officeDocument/2006/relationships" xmlns:p="http://schemas.openxmlformats.org/presentationml/2006/main">
+  <p:cSld>
+    <p:spTree>
+      <p:nvGrpSpPr>
+        <p:cNvPr id="1" name=""/>
+        <p:cNvGrpSpPr/>
+        <p:nvPr/>
+      </p:nvGrpSpPr>
+      <p:grpSpPr>
+        <a:xfrm>
+          <a:off x="0" y="0"/>
+          <a:ext cx="0" cy="0"/>
+          <a:chOff x="0" y="0"/>
+          <a:chExt cx="0" cy="0"/>
+        </a:xfrm>
+      </p:grpSpPr>
+      <p:sp>
+        <p:nvSpPr>
+          <p:cNvPr id="2" name="Titel 1">
+            <a:extLst>
+              <a:ext uri="{FF2B5EF4-FFF2-40B4-BE49-F238E27FC236}">
+                <a16:creationId xmlns:a16="http://schemas.microsoft.com/office/drawing/2014/main" id="{5C770520-98CE-4CE6-ACD0-072593328459}"/>
+              </a:ext>
+            </a:extLst>
+          </p:cNvPr>
+          <p:cNvSpPr>
+            <a:spLocks noGrp="1"/>
+          </p:cNvSpPr>
+          <p:nvPr>
+            <p:ph type="title"/>
+          </p:nvPr>
+        </p:nvSpPr>
+        <p:spPr/>
+        <p:txBody>
+          <a:bodyPr>
+            <a:normAutofit fontScale="90000"/>
+          </a:bodyPr>
+          <a:lstStyle/>
+          <a:p>
+            <a:r>
+              <a:rPr lang="nl-NL" dirty="0" err="1"/>
+              <a:t>Results</a:t>
+            </a:r>
+            <a:r>
+              <a:rPr lang="nl-NL" dirty="0"/>
+              <a:t> – </a:t>
+            </a:r>
+            <a:r>
+              <a:rPr lang="nl-NL" dirty="0" err="1"/>
+              <a:t>Size</a:t>
+            </a:r>
+            <a:r>
+              <a:rPr lang="nl-NL" dirty="0"/>
+              <a:t> </a:t>
+            </a:r>
+            <a:br>
+              <a:rPr lang="nl-NL" dirty="0"/>
+            </a:br>
+            <a:r>
+              <a:rPr lang="nl-NL" dirty="0" err="1"/>
+              <a:t>restricted</a:t>
+            </a:r>
+            <a:r>
+              <a:rPr lang="nl-NL" dirty="0"/>
+              <a:t> </a:t>
+            </a:r>
+            <a:br>
+              <a:rPr lang="nl-NL" dirty="0"/>
+            </a:br>
+            <a:r>
+              <a:rPr lang="nl-NL" dirty="0" err="1"/>
+              <a:t>configuration</a:t>
+            </a:r>
+            <a:r>
+              <a:rPr lang="nl-NL" dirty="0"/>
+              <a:t> </a:t>
+            </a:r>
+            <a:endParaRPr lang="en-GB" dirty="0"/>
+          </a:p>
+        </p:txBody>
+      </p:sp>
+      <p:sp>
+        <p:nvSpPr>
+          <p:cNvPr id="3" name="Tijdelijke aanduiding voor inhoud 2">
+            <a:extLst>
+              <a:ext uri="{FF2B5EF4-FFF2-40B4-BE49-F238E27FC236}">
+                <a16:creationId xmlns:a16="http://schemas.microsoft.com/office/drawing/2014/main" id="{42690F7B-EA12-4F0D-B938-C55DD64D10DF}"/>
+              </a:ext>
+            </a:extLst>
+          </p:cNvPr>
+          <p:cNvSpPr>
+            <a:spLocks noGrp="1"/>
+          </p:cNvSpPr>
+          <p:nvPr>
+            <p:ph sz="half" idx="1"/>
+          </p:nvPr>
+        </p:nvSpPr>
+        <p:spPr>
+          <a:xfrm>
+            <a:off x="838200" y="2379643"/>
+            <a:ext cx="3525253" cy="3797320"/>
+          </a:xfrm>
+        </p:spPr>
+        <p:txBody>
+          <a:bodyPr>
+            <a:normAutofit fontScale="92500" lnSpcReduction="10000"/>
+          </a:bodyPr>
+          <a:lstStyle/>
+          <a:p>
+            <a:r>
+              <a:rPr lang="nl-NL" dirty="0"/>
+              <a:t>S: </a:t>
+            </a:r>
+            <a:r>
+              <a:rPr lang="nl-NL" dirty="0" err="1"/>
+              <a:t>wanted</a:t>
+            </a:r>
+            <a:r>
+              <a:rPr lang="nl-NL" dirty="0"/>
+              <a:t> </a:t>
+            </a:r>
+            <a:r>
+              <a:rPr lang="nl-NL" dirty="0" err="1"/>
+              <a:t>stability</a:t>
+            </a:r>
+            <a:endParaRPr lang="nl-NL" dirty="0"/>
+          </a:p>
+          <a:p>
+            <a:r>
+              <a:rPr lang="nl-NL" dirty="0"/>
+              <a:t>D: </a:t>
+            </a:r>
+            <a:r>
+              <a:rPr lang="nl-NL" dirty="0" err="1"/>
+              <a:t>dimension</a:t>
+            </a:r>
+            <a:r>
+              <a:rPr lang="nl-NL" dirty="0"/>
+              <a:t> of matrix</a:t>
+            </a:r>
+          </a:p>
+          <a:p>
+            <a:r>
+              <a:rPr lang="nl-NL" dirty="0"/>
+              <a:t>L: </a:t>
+            </a:r>
+            <a:r>
+              <a:rPr lang="nl-NL" dirty="0" err="1"/>
+              <a:t>length</a:t>
+            </a:r>
+            <a:r>
+              <a:rPr lang="nl-NL" dirty="0"/>
+              <a:t> of </a:t>
+            </a:r>
+            <a:r>
+              <a:rPr lang="nl-NL" dirty="0" err="1"/>
+              <a:t>protein</a:t>
+            </a:r>
+            <a:endParaRPr lang="nl-NL" dirty="0"/>
+          </a:p>
+          <a:p>
+            <a:endParaRPr lang="nl-NL" dirty="0"/>
+          </a:p>
+          <a:p>
+            <a:r>
+              <a:rPr lang="nl-NL" dirty="0"/>
+              <a:t>String 1 (L=14):</a:t>
+            </a:r>
+            <a:br>
+              <a:rPr lang="nl-NL" dirty="0"/>
+            </a:br>
+            <a:r>
+              <a:rPr lang="nl-NL" sz="2000" dirty="0"/>
+              <a:t>HHPHHHPHPHHHPH</a:t>
+            </a:r>
+          </a:p>
+          <a:p>
+            <a:r>
+              <a:rPr lang="en-GB" dirty="0"/>
+              <a:t>String 2 (L=20):</a:t>
+            </a:r>
+            <a:br>
+              <a:rPr lang="en-GB" dirty="0"/>
+            </a:br>
+            <a:r>
+              <a:rPr lang="en-GB" sz="2000" dirty="0"/>
+              <a:t>HPHPPHHPHPPHPHHPPHPH</a:t>
+            </a:r>
+          </a:p>
+          <a:p>
+            <a:r>
+              <a:rPr lang="en-GB" dirty="0"/>
+              <a:t>String 3 (L=36):</a:t>
+            </a:r>
+            <a:br>
+              <a:rPr lang="en-GB" sz="3200" dirty="0"/>
+            </a:br>
+            <a:r>
+              <a:rPr lang="en-GB" sz="1200" dirty="0"/>
+              <a:t>PPPHHPPHHPPPPPHHHHHHHPPHHPPPPHHPPHPP</a:t>
+            </a:r>
+            <a:endParaRPr lang="en-GB" dirty="0"/>
+          </a:p>
+        </p:txBody>
+      </p:sp>
+      <p:pic>
+        <p:nvPicPr>
+          <p:cNvPr id="9" name="Tijdelijke aanduiding voor inhoud 8">
+            <a:extLst>
+              <a:ext uri="{FF2B5EF4-FFF2-40B4-BE49-F238E27FC236}">
+                <a16:creationId xmlns:a16="http://schemas.microsoft.com/office/drawing/2014/main" id="{F08D6B3F-5E78-495C-B677-CF06845219FA}"/>
+              </a:ext>
+            </a:extLst>
+          </p:cNvPr>
+          <p:cNvPicPr>
+            <a:picLocks noGrp="1" noChangeAspect="1"/>
+          </p:cNvPicPr>
+          <p:nvPr>
+            <p:ph sz="half" idx="2"/>
+          </p:nvPr>
+        </p:nvPicPr>
+        <p:blipFill>
+          <a:blip r:embed="rId2"/>
+          <a:stretch>
+            <a:fillRect/>
+          </a:stretch>
+        </p:blipFill>
+        <p:spPr>
+          <a:xfrm>
+            <a:off x="4759297" y="566365"/>
+            <a:ext cx="6921920" cy="5725270"/>
+          </a:xfrm>
+          <a:prstGeom prst="rect">
+            <a:avLst/>
+          </a:prstGeom>
+        </p:spPr>
+      </p:pic>
+    </p:spTree>
+    <p:extLst>
+      <p:ext uri="{BB962C8B-B14F-4D97-AF65-F5344CB8AC3E}">
+        <p14:creationId xmlns:p14="http://schemas.microsoft.com/office/powerpoint/2010/main" val="1096537137"/>
+      </p:ext>
+    </p:extLst>
+  </p:cSld>
+  <p:clrMapOvr>
+    <a:masterClrMapping/>
+  </p:clrMapOvr>
+</p:sld>
+</file>
+
+<file path=ppt/slides/slide16.xml><?xml version="1.0" encoding="utf-8"?>
 <p:sld xmlns:a="http://schemas.openxmlformats.org/drawingml/2006/main" xmlns:r="http://schemas.openxmlformats.org/officeDocument/2006/relationships" xmlns:p="http://schemas.openxmlformats.org/presentationml/2006/main">
   <p:cSld>
     <p:spTree>
@@ -4922,7 +6157,7 @@
 </p:sld>
 </file>
 
-<file path=ppt/slides/slide11.xml><?xml version="1.0" encoding="utf-8"?>
+<file path=ppt/slides/slide17.xml><?xml version="1.0" encoding="utf-8"?>
 <p:sld xmlns:a="http://schemas.openxmlformats.org/drawingml/2006/main" xmlns:r="http://schemas.openxmlformats.org/officeDocument/2006/relationships" xmlns:p="http://schemas.openxmlformats.org/presentationml/2006/main">
   <p:cSld>
     <p:spTree>
@@ -5061,7 +6296,7 @@
 </p:sld>
 </file>
 
-<file path=ppt/slides/slide12.xml><?xml version="1.0" encoding="utf-8"?>
+<file path=ppt/slides/slide18.xml><?xml version="1.0" encoding="utf-8"?>
 <p:sld xmlns:a="http://schemas.openxmlformats.org/drawingml/2006/main" xmlns:r="http://schemas.openxmlformats.org/officeDocument/2006/relationships" xmlns:p="http://schemas.openxmlformats.org/presentationml/2006/main">
   <p:cSld>
     <p:spTree>
@@ -5633,7 +6868,7 @@
 </p:sld>
 </file>
 
-<file path=ppt/slides/slide13.xml><?xml version="1.0" encoding="utf-8"?>
+<file path=ppt/slides/slide19.xml><?xml version="1.0" encoding="utf-8"?>
 <p:sld xmlns:a="http://schemas.openxmlformats.org/drawingml/2006/main" xmlns:r="http://schemas.openxmlformats.org/officeDocument/2006/relationships" xmlns:p="http://schemas.openxmlformats.org/presentationml/2006/main">
   <p:cSld>
     <p:spTree>
@@ -5782,126 +7017,6 @@
     <p:extLst>
       <p:ext uri="{BB962C8B-B14F-4D97-AF65-F5344CB8AC3E}">
         <p14:creationId xmlns:p14="http://schemas.microsoft.com/office/powerpoint/2010/main" val="1963639422"/>
-      </p:ext>
-    </p:extLst>
-  </p:cSld>
-  <p:clrMapOvr>
-    <a:masterClrMapping/>
-  </p:clrMapOvr>
-</p:sld>
-</file>
-
-<file path=ppt/slides/slide14.xml><?xml version="1.0" encoding="utf-8"?>
-<p:sld xmlns:a="http://schemas.openxmlformats.org/drawingml/2006/main" xmlns:r="http://schemas.openxmlformats.org/officeDocument/2006/relationships" xmlns:p="http://schemas.openxmlformats.org/presentationml/2006/main">
-  <p:cSld>
-    <p:spTree>
-      <p:nvGrpSpPr>
-        <p:cNvPr id="1" name=""/>
-        <p:cNvGrpSpPr/>
-        <p:nvPr/>
-      </p:nvGrpSpPr>
-      <p:grpSpPr>
-        <a:xfrm>
-          <a:off x="0" y="0"/>
-          <a:ext cx="0" cy="0"/>
-          <a:chOff x="0" y="0"/>
-          <a:chExt cx="0" cy="0"/>
-        </a:xfrm>
-      </p:grpSpPr>
-      <p:sp>
-        <p:nvSpPr>
-          <p:cNvPr id="2" name="Titel 1">
-            <a:extLst>
-              <a:ext uri="{FF2B5EF4-FFF2-40B4-BE49-F238E27FC236}">
-                <a16:creationId xmlns:a16="http://schemas.microsoft.com/office/drawing/2014/main" id="{A40D14D6-C616-7346-AB1F-E0B3C6F3B4F5}"/>
-              </a:ext>
-            </a:extLst>
-          </p:cNvPr>
-          <p:cNvSpPr>
-            <a:spLocks noGrp="1"/>
-          </p:cNvSpPr>
-          <p:nvPr>
-            <p:ph type="ctrTitle"/>
-          </p:nvPr>
-        </p:nvSpPr>
-        <p:spPr/>
-        <p:txBody>
-          <a:bodyPr/>
-          <a:lstStyle/>
-          <a:p>
-            <a:r>
-              <a:rPr lang="en-GB" dirty="0"/>
-              <a:t>Questions and comments?</a:t>
-            </a:r>
-          </a:p>
-        </p:txBody>
-      </p:sp>
-      <p:sp>
-        <p:nvSpPr>
-          <p:cNvPr id="3" name="Ondertitel 2">
-            <a:extLst>
-              <a:ext uri="{FF2B5EF4-FFF2-40B4-BE49-F238E27FC236}">
-                <a16:creationId xmlns:a16="http://schemas.microsoft.com/office/drawing/2014/main" id="{CEF25AE3-A6E7-9F45-9D9A-CB2C1B23E372}"/>
-              </a:ext>
-            </a:extLst>
-          </p:cNvPr>
-          <p:cNvSpPr>
-            <a:spLocks noGrp="1"/>
-          </p:cNvSpPr>
-          <p:nvPr>
-            <p:ph type="subTitle" idx="1"/>
-          </p:nvPr>
-        </p:nvSpPr>
-        <p:spPr/>
-        <p:txBody>
-          <a:bodyPr>
-            <a:normAutofit fontScale="85000" lnSpcReduction="20000"/>
-          </a:bodyPr>
-          <a:lstStyle/>
-          <a:p>
-            <a:r>
-              <a:rPr lang="en-GB" dirty="0"/>
-              <a:t>Our questions:</a:t>
-            </a:r>
-          </a:p>
-          <a:p>
-            <a:pPr marL="457200" indent="-457200">
-              <a:buAutoNum type="arabicPeriod"/>
-            </a:pPr>
-            <a:r>
-              <a:rPr lang="en-GB" dirty="0"/>
-              <a:t>All our algorithms are ‘constructive’. Ideas where to think regarding iterative algorithms?</a:t>
-            </a:r>
-          </a:p>
-          <a:p>
-            <a:pPr marL="457200" indent="-457200">
-              <a:buAutoNum type="arabicPeriod"/>
-            </a:pPr>
-            <a:r>
-              <a:rPr lang="en-GB" dirty="0"/>
-              <a:t>What is your view on our choice for </a:t>
-            </a:r>
-            <a:r>
-              <a:rPr lang="en-GB" dirty="0" err="1"/>
-              <a:t>datastructure</a:t>
-            </a:r>
-            <a:r>
-              <a:rPr lang="en-GB" dirty="0"/>
-              <a:t>?</a:t>
-            </a:r>
-          </a:p>
-          <a:p>
-            <a:r>
-              <a:rPr lang="en-GB" dirty="0"/>
-              <a:t>Thank you for your attention</a:t>
-            </a:r>
-          </a:p>
-        </p:txBody>
-      </p:sp>
-    </p:spTree>
-    <p:extLst>
-      <p:ext uri="{BB962C8B-B14F-4D97-AF65-F5344CB8AC3E}">
-        <p14:creationId xmlns:p14="http://schemas.microsoft.com/office/powerpoint/2010/main" val="3056510008"/>
       </p:ext>
     </p:extLst>
   </p:cSld>
@@ -6121,6 +7236,126 @@
     <p:extLst>
       <p:ext uri="{BB962C8B-B14F-4D97-AF65-F5344CB8AC3E}">
         <p14:creationId xmlns:p14="http://schemas.microsoft.com/office/powerpoint/2010/main" val="2072180750"/>
+      </p:ext>
+    </p:extLst>
+  </p:cSld>
+  <p:clrMapOvr>
+    <a:masterClrMapping/>
+  </p:clrMapOvr>
+</p:sld>
+</file>
+
+<file path=ppt/slides/slide20.xml><?xml version="1.0" encoding="utf-8"?>
+<p:sld xmlns:a="http://schemas.openxmlformats.org/drawingml/2006/main" xmlns:r="http://schemas.openxmlformats.org/officeDocument/2006/relationships" xmlns:p="http://schemas.openxmlformats.org/presentationml/2006/main">
+  <p:cSld>
+    <p:spTree>
+      <p:nvGrpSpPr>
+        <p:cNvPr id="1" name=""/>
+        <p:cNvGrpSpPr/>
+        <p:nvPr/>
+      </p:nvGrpSpPr>
+      <p:grpSpPr>
+        <a:xfrm>
+          <a:off x="0" y="0"/>
+          <a:ext cx="0" cy="0"/>
+          <a:chOff x="0" y="0"/>
+          <a:chExt cx="0" cy="0"/>
+        </a:xfrm>
+      </p:grpSpPr>
+      <p:sp>
+        <p:nvSpPr>
+          <p:cNvPr id="2" name="Titel 1">
+            <a:extLst>
+              <a:ext uri="{FF2B5EF4-FFF2-40B4-BE49-F238E27FC236}">
+                <a16:creationId xmlns:a16="http://schemas.microsoft.com/office/drawing/2014/main" id="{A40D14D6-C616-7346-AB1F-E0B3C6F3B4F5}"/>
+              </a:ext>
+            </a:extLst>
+          </p:cNvPr>
+          <p:cNvSpPr>
+            <a:spLocks noGrp="1"/>
+          </p:cNvSpPr>
+          <p:nvPr>
+            <p:ph type="ctrTitle"/>
+          </p:nvPr>
+        </p:nvSpPr>
+        <p:spPr/>
+        <p:txBody>
+          <a:bodyPr/>
+          <a:lstStyle/>
+          <a:p>
+            <a:r>
+              <a:rPr lang="en-GB" dirty="0"/>
+              <a:t>Questions and comments?</a:t>
+            </a:r>
+          </a:p>
+        </p:txBody>
+      </p:sp>
+      <p:sp>
+        <p:nvSpPr>
+          <p:cNvPr id="3" name="Ondertitel 2">
+            <a:extLst>
+              <a:ext uri="{FF2B5EF4-FFF2-40B4-BE49-F238E27FC236}">
+                <a16:creationId xmlns:a16="http://schemas.microsoft.com/office/drawing/2014/main" id="{CEF25AE3-A6E7-9F45-9D9A-CB2C1B23E372}"/>
+              </a:ext>
+            </a:extLst>
+          </p:cNvPr>
+          <p:cNvSpPr>
+            <a:spLocks noGrp="1"/>
+          </p:cNvSpPr>
+          <p:nvPr>
+            <p:ph type="subTitle" idx="1"/>
+          </p:nvPr>
+        </p:nvSpPr>
+        <p:spPr/>
+        <p:txBody>
+          <a:bodyPr>
+            <a:normAutofit fontScale="85000" lnSpcReduction="20000"/>
+          </a:bodyPr>
+          <a:lstStyle/>
+          <a:p>
+            <a:r>
+              <a:rPr lang="en-GB" dirty="0"/>
+              <a:t>Our questions:</a:t>
+            </a:r>
+          </a:p>
+          <a:p>
+            <a:pPr marL="457200" indent="-457200">
+              <a:buAutoNum type="arabicPeriod"/>
+            </a:pPr>
+            <a:r>
+              <a:rPr lang="en-GB" dirty="0"/>
+              <a:t>All our algorithms are ‘constructive’. Ideas where to think regarding iterative algorithms?</a:t>
+            </a:r>
+          </a:p>
+          <a:p>
+            <a:pPr marL="457200" indent="-457200">
+              <a:buAutoNum type="arabicPeriod"/>
+            </a:pPr>
+            <a:r>
+              <a:rPr lang="en-GB" dirty="0"/>
+              <a:t>What is your view on our choice for </a:t>
+            </a:r>
+            <a:r>
+              <a:rPr lang="en-GB" dirty="0" err="1"/>
+              <a:t>datastructure</a:t>
+            </a:r>
+            <a:r>
+              <a:rPr lang="en-GB" dirty="0"/>
+              <a:t>?</a:t>
+            </a:r>
+          </a:p>
+          <a:p>
+            <a:r>
+              <a:rPr lang="en-GB" dirty="0"/>
+              <a:t>Thank you for your attention</a:t>
+            </a:r>
+          </a:p>
+        </p:txBody>
+      </p:sp>
+    </p:spTree>
+    <p:extLst>
+      <p:ext uri="{BB962C8B-B14F-4D97-AF65-F5344CB8AC3E}">
+        <p14:creationId xmlns:p14="http://schemas.microsoft.com/office/powerpoint/2010/main" val="3056510008"/>
       </p:ext>
     </p:extLst>
   </p:cSld>
@@ -8113,7 +9348,7 @@
           <p:cNvPr id="2" name="Titel 1">
             <a:extLst>
               <a:ext uri="{FF2B5EF4-FFF2-40B4-BE49-F238E27FC236}">
-                <a16:creationId xmlns:a16="http://schemas.microsoft.com/office/drawing/2014/main" id="{26D56270-1C1B-4B1E-BC4F-ACC759B672F7}"/>
+                <a16:creationId xmlns:a16="http://schemas.microsoft.com/office/drawing/2014/main" id="{BDECAEB1-542A-F848-9D2C-B10DFE956AB7}"/>
               </a:ext>
             </a:extLst>
           </p:cNvPr>
@@ -8124,32 +9359,15 @@
             <p:ph type="title"/>
           </p:nvPr>
         </p:nvSpPr>
-        <p:spPr>
-          <a:xfrm>
-            <a:off x="838200" y="365125"/>
-            <a:ext cx="10515600" cy="1325563"/>
-          </a:xfrm>
-        </p:spPr>
+        <p:spPr/>
         <p:txBody>
           <a:bodyPr/>
           <a:lstStyle/>
           <a:p>
             <a:r>
-              <a:rPr lang="nl-NL" dirty="0" err="1"/>
-              <a:t>Results</a:t>
-            </a:r>
-            <a:r>
-              <a:rPr lang="nl-NL" dirty="0"/>
-              <a:t> – Data </a:t>
-            </a:r>
-            <a:br>
-              <a:rPr lang="nl-NL" dirty="0"/>
-            </a:br>
-            <a:r>
-              <a:rPr lang="nl-NL" dirty="0" err="1"/>
-              <a:t>structure</a:t>
-            </a:r>
-            <a:endParaRPr lang="en-GB" dirty="0"/>
+              <a:rPr lang="en-GB" dirty="0"/>
+              <a:t>3. Algorithms</a:t>
+            </a:r>
           </a:p>
         </p:txBody>
       </p:sp>
@@ -8158,7 +9376,7 @@
           <p:cNvPr id="3" name="Tijdelijke aanduiding voor inhoud 2">
             <a:extLst>
               <a:ext uri="{FF2B5EF4-FFF2-40B4-BE49-F238E27FC236}">
-                <a16:creationId xmlns:a16="http://schemas.microsoft.com/office/drawing/2014/main" id="{938874C9-2E1B-4E00-9D04-38873D0AC371}"/>
+                <a16:creationId xmlns:a16="http://schemas.microsoft.com/office/drawing/2014/main" id="{6B57B016-94D5-F646-9976-362E7188E1F0}"/>
               </a:ext>
             </a:extLst>
           </p:cNvPr>
@@ -8169,96 +9387,89 @@
             <p:ph sz="half" idx="1"/>
           </p:nvPr>
         </p:nvSpPr>
-        <p:spPr>
-          <a:xfrm>
-            <a:off x="838200" y="2412693"/>
-            <a:ext cx="3370243" cy="3764269"/>
-          </a:xfrm>
-        </p:spPr>
-        <p:txBody>
-          <a:bodyPr>
-            <a:normAutofit/>
-          </a:bodyPr>
+        <p:spPr/>
+        <p:txBody>
+          <a:bodyPr/>
           <a:lstStyle/>
           <a:p>
             <a:r>
-              <a:rPr lang="nl-NL" sz="2400" dirty="0"/>
-              <a:t>L: </a:t>
-            </a:r>
-            <a:r>
-              <a:rPr lang="nl-NL" sz="2400" dirty="0" err="1"/>
-              <a:t>length</a:t>
-            </a:r>
-            <a:r>
-              <a:rPr lang="nl-NL" sz="2400" dirty="0"/>
-              <a:t> of </a:t>
-            </a:r>
-            <a:r>
-              <a:rPr lang="nl-NL" sz="2400" dirty="0" err="1"/>
-              <a:t>protein</a:t>
-            </a:r>
-            <a:endParaRPr lang="nl-NL" sz="2400" dirty="0"/>
-          </a:p>
-          <a:p>
-            <a:r>
-              <a:rPr lang="nl-NL" sz="2400" dirty="0"/>
-              <a:t>N: </a:t>
-            </a:r>
-            <a:r>
-              <a:rPr lang="nl-NL" sz="2400" dirty="0" err="1"/>
-              <a:t>number</a:t>
-            </a:r>
-            <a:r>
-              <a:rPr lang="nl-NL" sz="2400" dirty="0"/>
-              <a:t> of </a:t>
-            </a:r>
-            <a:r>
-              <a:rPr lang="nl-NL" sz="2400" dirty="0" err="1"/>
-              <a:t>iterations</a:t>
-            </a:r>
-            <a:endParaRPr lang="nl-NL" sz="2400" dirty="0"/>
-          </a:p>
-          <a:p>
-            <a:endParaRPr lang="nl-NL" sz="2400" dirty="0"/>
-          </a:p>
-        </p:txBody>
-      </p:sp>
-      <p:pic>
-        <p:nvPicPr>
-          <p:cNvPr id="5" name="Tijdelijke aanduiding voor inhoud 4">
+              <a:rPr lang="en-GB" dirty="0"/>
+              <a:t>Tried:</a:t>
+            </a:r>
+          </a:p>
+          <a:p>
+            <a:pPr lvl="1"/>
+            <a:r>
+              <a:rPr lang="en-GB" dirty="0"/>
+              <a:t>Self avoiding random walk (SARW)</a:t>
+            </a:r>
+          </a:p>
+          <a:p>
+            <a:pPr lvl="1"/>
+            <a:r>
+              <a:rPr lang="en-GB" dirty="0"/>
+              <a:t>SARW with a twist</a:t>
+            </a:r>
+          </a:p>
+          <a:p>
+            <a:pPr lvl="1"/>
+            <a:r>
+              <a:rPr lang="en-GB" dirty="0"/>
+              <a:t>Greedy</a:t>
+            </a:r>
+          </a:p>
+        </p:txBody>
+      </p:sp>
+      <p:sp>
+        <p:nvSpPr>
+          <p:cNvPr id="4" name="Tijdelijke aanduiding voor inhoud 3">
             <a:extLst>
               <a:ext uri="{FF2B5EF4-FFF2-40B4-BE49-F238E27FC236}">
-                <a16:creationId xmlns:a16="http://schemas.microsoft.com/office/drawing/2014/main" id="{936E018E-90A8-44A9-B921-A228CBB1098D}"/>
+                <a16:creationId xmlns:a16="http://schemas.microsoft.com/office/drawing/2014/main" id="{D29CAD77-2AED-E94A-845B-B60D651EF411}"/>
               </a:ext>
             </a:extLst>
           </p:cNvPr>
-          <p:cNvPicPr>
-            <a:picLocks noGrp="1" noChangeAspect="1"/>
-          </p:cNvPicPr>
+          <p:cNvSpPr>
+            <a:spLocks noGrp="1"/>
+          </p:cNvSpPr>
           <p:nvPr>
             <p:ph sz="half" idx="2"/>
           </p:nvPr>
-        </p:nvPicPr>
-        <p:blipFill>
-          <a:blip r:embed="rId2"/>
-          <a:stretch>
-            <a:fillRect/>
-          </a:stretch>
-        </p:blipFill>
-        <p:spPr>
-          <a:xfrm>
-            <a:off x="4549967" y="484743"/>
-            <a:ext cx="7095504" cy="6008132"/>
-          </a:xfrm>
-          <a:prstGeom prst="rect">
-            <a:avLst/>
-          </a:prstGeom>
-        </p:spPr>
-      </p:pic>
+        </p:nvSpPr>
+        <p:spPr/>
+        <p:txBody>
+          <a:bodyPr/>
+          <a:lstStyle/>
+          <a:p>
+            <a:r>
+              <a:rPr lang="en-GB" dirty="0"/>
+              <a:t>Next up:</a:t>
+            </a:r>
+          </a:p>
+          <a:p>
+            <a:pPr lvl="1"/>
+            <a:r>
+              <a:rPr lang="en-GB" dirty="0"/>
+              <a:t>Extended Heuristic Algorithm</a:t>
+            </a:r>
+          </a:p>
+          <a:p>
+            <a:pPr lvl="1"/>
+            <a:r>
+              <a:rPr lang="en-GB" dirty="0"/>
+              <a:t>Breadth-first: Beam Search</a:t>
+            </a:r>
+          </a:p>
+          <a:p>
+            <a:pPr lvl="1"/>
+            <a:endParaRPr lang="en-GB" dirty="0"/>
+          </a:p>
+        </p:txBody>
+      </p:sp>
     </p:spTree>
     <p:extLst>
       <p:ext uri="{BB962C8B-B14F-4D97-AF65-F5344CB8AC3E}">
-        <p14:creationId xmlns:p14="http://schemas.microsoft.com/office/powerpoint/2010/main" val="163970808"/>
+        <p14:creationId xmlns:p14="http://schemas.microsoft.com/office/powerpoint/2010/main" val="4118444954"/>
       </p:ext>
     </p:extLst>
   </p:cSld>
@@ -8290,7 +9501,7 @@
           <p:cNvPr id="2" name="Titel 1">
             <a:extLst>
               <a:ext uri="{FF2B5EF4-FFF2-40B4-BE49-F238E27FC236}">
-                <a16:creationId xmlns:a16="http://schemas.microsoft.com/office/drawing/2014/main" id="{5C770520-98CE-4CE6-ACD0-072593328459}"/>
+                <a16:creationId xmlns:a16="http://schemas.microsoft.com/office/drawing/2014/main" id="{BDECAEB1-542A-F848-9D2C-B10DFE956AB7}"/>
               </a:ext>
             </a:extLst>
           </p:cNvPr>
@@ -8303,50 +9514,13 @@
         </p:nvSpPr>
         <p:spPr/>
         <p:txBody>
-          <a:bodyPr>
-            <a:normAutofit fontScale="90000"/>
-          </a:bodyPr>
+          <a:bodyPr/>
           <a:lstStyle/>
           <a:p>
             <a:r>
-              <a:rPr lang="nl-NL" dirty="0" err="1"/>
-              <a:t>Results</a:t>
-            </a:r>
-            <a:r>
-              <a:rPr lang="nl-NL" dirty="0"/>
-              <a:t> – </a:t>
-            </a:r>
-            <a:r>
-              <a:rPr lang="nl-NL" dirty="0" err="1"/>
-              <a:t>Size</a:t>
-            </a:r>
-            <a:r>
-              <a:rPr lang="nl-NL" dirty="0"/>
-              <a:t> </a:t>
-            </a:r>
-            <a:br>
-              <a:rPr lang="nl-NL" dirty="0"/>
-            </a:br>
-            <a:r>
-              <a:rPr lang="nl-NL" dirty="0" err="1"/>
-              <a:t>restricted</a:t>
-            </a:r>
-            <a:r>
-              <a:rPr lang="nl-NL" dirty="0"/>
-              <a:t> </a:t>
-            </a:r>
-            <a:br>
-              <a:rPr lang="nl-NL" dirty="0"/>
-            </a:br>
-            <a:r>
-              <a:rPr lang="nl-NL" dirty="0" err="1"/>
-              <a:t>configuration</a:t>
-            </a:r>
-            <a:r>
-              <a:rPr lang="nl-NL" dirty="0"/>
-              <a:t> </a:t>
-            </a:r>
-            <a:endParaRPr lang="en-GB" dirty="0"/>
+              <a:rPr lang="en-GB" dirty="0"/>
+              <a:t>Self avoiding random walk</a:t>
+            </a:r>
           </a:p>
         </p:txBody>
       </p:sp>
@@ -8355,7 +9529,7 @@
           <p:cNvPr id="3" name="Tijdelijke aanduiding voor inhoud 2">
             <a:extLst>
               <a:ext uri="{FF2B5EF4-FFF2-40B4-BE49-F238E27FC236}">
-                <a16:creationId xmlns:a16="http://schemas.microsoft.com/office/drawing/2014/main" id="{42690F7B-EA12-4F0D-B938-C55DD64D10DF}"/>
+                <a16:creationId xmlns:a16="http://schemas.microsoft.com/office/drawing/2014/main" id="{6B57B016-94D5-F646-9976-362E7188E1F0}"/>
               </a:ext>
             </a:extLst>
           </p:cNvPr>
@@ -8366,150 +9540,150 @@
             <p:ph sz="half" idx="1"/>
           </p:nvPr>
         </p:nvSpPr>
+        <p:spPr/>
+        <p:txBody>
+          <a:bodyPr/>
+          <a:lstStyle/>
+          <a:p>
+            <a:r>
+              <a:rPr lang="en-GB" dirty="0"/>
+              <a:t>Let S be HP-chain of length n.</a:t>
+            </a:r>
+          </a:p>
+          <a:p>
+            <a:r>
+              <a:rPr lang="en-GB" dirty="0"/>
+              <a:t>Fix first 2 elements of chain.</a:t>
+            </a:r>
+            <a:endParaRPr lang="en-GB" baseline="-25000" dirty="0"/>
+          </a:p>
+          <a:p>
+            <a:r>
+              <a:rPr lang="en-GB" dirty="0"/>
+              <a:t>For subsequent elements up to the n</a:t>
+            </a:r>
+            <a:r>
+              <a:rPr lang="en-GB" baseline="30000" dirty="0"/>
+              <a:t>th</a:t>
+            </a:r>
+            <a:r>
+              <a:rPr lang="en-GB" dirty="0"/>
+              <a:t> element, choose random move from {u, d, l, r, </a:t>
+            </a:r>
+            <a:r>
+              <a:rPr lang="en-GB" dirty="0" err="1"/>
+              <a:t>i</a:t>
+            </a:r>
+            <a:r>
+              <a:rPr lang="en-GB" dirty="0"/>
+              <a:t>, o}.</a:t>
+            </a:r>
+          </a:p>
+          <a:p>
+            <a:r>
+              <a:rPr lang="en-GB" dirty="0"/>
+              <a:t>If newly chosen coordinates are occupied, try new move.</a:t>
+            </a:r>
+          </a:p>
+          <a:p>
+            <a:r>
+              <a:rPr lang="en-GB" dirty="0"/>
+              <a:t>Stuck? Start over.</a:t>
+            </a:r>
+          </a:p>
+          <a:p>
+            <a:endParaRPr lang="en-GB" dirty="0"/>
+          </a:p>
+        </p:txBody>
+      </p:sp>
+      <p:sp>
+        <p:nvSpPr>
+          <p:cNvPr id="4" name="Tijdelijke aanduiding voor inhoud 3">
+            <a:extLst>
+              <a:ext uri="{FF2B5EF4-FFF2-40B4-BE49-F238E27FC236}">
+                <a16:creationId xmlns:a16="http://schemas.microsoft.com/office/drawing/2014/main" id="{D29CAD77-2AED-E94A-845B-B60D651EF411}"/>
+              </a:ext>
+            </a:extLst>
+          </p:cNvPr>
+          <p:cNvSpPr>
+            <a:spLocks noGrp="1"/>
+          </p:cNvSpPr>
+          <p:nvPr>
+            <p:ph sz="half" idx="2"/>
+          </p:nvPr>
+        </p:nvSpPr>
         <p:spPr>
           <a:xfrm>
-            <a:off x="838200" y="2379643"/>
-            <a:ext cx="3525253" cy="3797320"/>
+            <a:off x="9934956" y="3260725"/>
+            <a:ext cx="2066544" cy="2398465"/>
           </a:xfrm>
         </p:spPr>
         <p:txBody>
-          <a:bodyPr>
-            <a:normAutofit fontScale="92500" lnSpcReduction="10000"/>
-          </a:bodyPr>
+          <a:bodyPr/>
           <a:lstStyle/>
           <a:p>
-            <a:r>
-              <a:rPr lang="nl-NL" dirty="0"/>
-              <a:t>S: </a:t>
-            </a:r>
-            <a:r>
-              <a:rPr lang="nl-NL" dirty="0" err="1"/>
-              <a:t>wanted</a:t>
-            </a:r>
-            <a:r>
-              <a:rPr lang="nl-NL" dirty="0"/>
-              <a:t> </a:t>
-            </a:r>
-            <a:r>
-              <a:rPr lang="nl-NL" dirty="0" err="1"/>
-              <a:t>stability</a:t>
-            </a:r>
-            <a:endParaRPr lang="nl-NL" dirty="0"/>
-          </a:p>
-          <a:p>
-            <a:r>
-              <a:rPr lang="nl-NL" dirty="0"/>
-              <a:t>D: </a:t>
-            </a:r>
-            <a:r>
-              <a:rPr lang="nl-NL" dirty="0" err="1"/>
-              <a:t>dimension</a:t>
-            </a:r>
-            <a:r>
-              <a:rPr lang="nl-NL" dirty="0"/>
-              <a:t> of matrix</a:t>
-            </a:r>
-          </a:p>
-          <a:p>
-            <a:r>
-              <a:rPr lang="nl-NL" dirty="0"/>
-              <a:t>L: </a:t>
-            </a:r>
-            <a:r>
-              <a:rPr lang="nl-NL" dirty="0" err="1"/>
-              <a:t>length</a:t>
-            </a:r>
-            <a:r>
-              <a:rPr lang="nl-NL" dirty="0"/>
-              <a:t> of </a:t>
-            </a:r>
-            <a:r>
-              <a:rPr lang="nl-NL" dirty="0" err="1"/>
-              <a:t>protein</a:t>
-            </a:r>
-            <a:endParaRPr lang="nl-NL" dirty="0"/>
-          </a:p>
-          <a:p>
-            <a:endParaRPr lang="nl-NL" dirty="0"/>
-          </a:p>
-          <a:p>
-            <a:r>
-              <a:rPr lang="nl-NL" dirty="0"/>
-              <a:t>String 1 (L=14):</a:t>
-            </a:r>
-            <a:br>
-              <a:rPr lang="nl-NL" dirty="0"/>
-            </a:br>
-            <a:r>
-              <a:rPr lang="nl-NL" sz="2000" dirty="0"/>
-              <a:t>HHPHHHPHPHHHPH</a:t>
-            </a:r>
-          </a:p>
-          <a:p>
-            <a:r>
-              <a:rPr lang="en-GB" dirty="0"/>
-              <a:t>String 2 (L=20):</a:t>
-            </a:r>
-            <a:br>
-              <a:rPr lang="en-GB" dirty="0"/>
-            </a:br>
-            <a:r>
-              <a:rPr lang="en-GB" sz="2000" dirty="0"/>
-              <a:t>HPHPPHHPHPPHPHHPPHPH</a:t>
-            </a:r>
-          </a:p>
-          <a:p>
-            <a:r>
-              <a:rPr lang="en-GB" dirty="0"/>
-              <a:t>String 3 (L=36):</a:t>
-            </a:r>
-            <a:br>
-              <a:rPr lang="en-GB" sz="3200" dirty="0"/>
-            </a:br>
-            <a:r>
-              <a:rPr lang="en-GB" sz="1200" dirty="0"/>
-              <a:t>PPPHHPPHHPPPPPHHHHHHHPPHHPPPPHHPPHPP</a:t>
-            </a:r>
+            <a:pPr marL="0" indent="0">
+              <a:buNone/>
+            </a:pPr>
+            <a:endParaRPr lang="en-GB" dirty="0"/>
+          </a:p>
+          <a:p>
+            <a:pPr lvl="1"/>
             <a:endParaRPr lang="en-GB" dirty="0"/>
           </a:p>
         </p:txBody>
       </p:sp>
       <p:pic>
         <p:nvPicPr>
-          <p:cNvPr id="9" name="Tijdelijke aanduiding voor inhoud 8">
+          <p:cNvPr id="1026" name="Picture 2" descr="Afbeeldingsresultaat voor self avoiding random walk">
             <a:extLst>
               <a:ext uri="{FF2B5EF4-FFF2-40B4-BE49-F238E27FC236}">
-                <a16:creationId xmlns:a16="http://schemas.microsoft.com/office/drawing/2014/main" id="{F08D6B3F-5E78-495C-B677-CF06845219FA}"/>
+                <a16:creationId xmlns:a16="http://schemas.microsoft.com/office/drawing/2014/main" id="{8E936368-6D3B-4E23-941A-C09BAA0B3A0D}"/>
               </a:ext>
             </a:extLst>
           </p:cNvPr>
           <p:cNvPicPr>
-            <a:picLocks noGrp="1" noChangeAspect="1"/>
+            <a:picLocks noChangeAspect="1" noChangeArrowheads="1"/>
           </p:cNvPicPr>
-          <p:nvPr>
-            <p:ph sz="half" idx="2"/>
-          </p:nvPr>
+          <p:nvPr/>
         </p:nvPicPr>
         <p:blipFill>
-          <a:blip r:embed="rId2"/>
+          <a:blip r:embed="rId2">
+            <a:extLst>
+              <a:ext uri="{28A0092B-C50C-407E-A947-70E740481C1C}">
+                <a14:useLocalDpi xmlns:a14="http://schemas.microsoft.com/office/drawing/2010/main" val="0"/>
+              </a:ext>
+            </a:extLst>
+          </a:blip>
+          <a:srcRect/>
           <a:stretch>
             <a:fillRect/>
           </a:stretch>
         </p:blipFill>
-        <p:spPr>
+        <p:spPr bwMode="auto">
           <a:xfrm>
-            <a:off x="4759297" y="566365"/>
-            <a:ext cx="6921920" cy="5725270"/>
+            <a:off x="6329157" y="1825625"/>
+            <a:ext cx="4462667" cy="3349625"/>
           </a:xfrm>
           <a:prstGeom prst="rect">
             <a:avLst/>
           </a:prstGeom>
+          <a:noFill/>
+          <a:extLst>
+            <a:ext uri="{909E8E84-426E-40DD-AFC4-6F175D3DCCD1}">
+              <a14:hiddenFill xmlns:a14="http://schemas.microsoft.com/office/drawing/2010/main">
+                <a:solidFill>
+                  <a:srgbClr val="FFFFFF"/>
+                </a:solidFill>
+              </a14:hiddenFill>
+            </a:ext>
+          </a:extLst>
         </p:spPr>
       </p:pic>
     </p:spTree>
     <p:extLst>
       <p:ext uri="{BB962C8B-B14F-4D97-AF65-F5344CB8AC3E}">
-        <p14:creationId xmlns:p14="http://schemas.microsoft.com/office/powerpoint/2010/main" val="1096537137"/>
+        <p14:creationId xmlns:p14="http://schemas.microsoft.com/office/powerpoint/2010/main" val="668971847"/>
       </p:ext>
     </p:extLst>
   </p:cSld>

</xml_diff>

<commit_message>
small bugfix in ppp2. Filling out Algorithm table still required by whole team.
</commit_message>
<xml_diff>
--- a/Documentation/PPP, Week 2, Meeting 1.pptx
+++ b/Documentation/PPP, Week 2, Meeting 1.pptx
@@ -213,7 +213,7 @@
           <a:p>
             <a:fld id="{1E47D41A-4042-B543-AE22-1ED09200DB20}" type="datetimeFigureOut">
               <a:rPr lang="en-GB" smtClean="0"/>
-              <a:t>14/01/2020</a:t>
+              <a:t>17/01/2020</a:t>
             </a:fld>
             <a:endParaRPr lang="en-GB"/>
           </a:p>
@@ -696,7 +696,7 @@
           <a:p>
             <a:fld id="{1CC4CA7E-E4E1-D74C-ACCE-7F4688DA46B0}" type="datetimeFigureOut">
               <a:rPr lang="en-GB" smtClean="0"/>
-              <a:t>14/01/2020</a:t>
+              <a:t>17/01/2020</a:t>
             </a:fld>
             <a:endParaRPr lang="en-GB"/>
           </a:p>
@@ -866,7 +866,7 @@
           <a:p>
             <a:fld id="{1CC4CA7E-E4E1-D74C-ACCE-7F4688DA46B0}" type="datetimeFigureOut">
               <a:rPr lang="en-GB" smtClean="0"/>
-              <a:t>14/01/2020</a:t>
+              <a:t>17/01/2020</a:t>
             </a:fld>
             <a:endParaRPr lang="en-GB"/>
           </a:p>
@@ -1046,7 +1046,7 @@
           <a:p>
             <a:fld id="{1CC4CA7E-E4E1-D74C-ACCE-7F4688DA46B0}" type="datetimeFigureOut">
               <a:rPr lang="en-GB" smtClean="0"/>
-              <a:t>14/01/2020</a:t>
+              <a:t>17/01/2020</a:t>
             </a:fld>
             <a:endParaRPr lang="en-GB"/>
           </a:p>
@@ -1216,7 +1216,7 @@
           <a:p>
             <a:fld id="{1CC4CA7E-E4E1-D74C-ACCE-7F4688DA46B0}" type="datetimeFigureOut">
               <a:rPr lang="en-GB" smtClean="0"/>
-              <a:t>14/01/2020</a:t>
+              <a:t>17/01/2020</a:t>
             </a:fld>
             <a:endParaRPr lang="en-GB"/>
           </a:p>
@@ -1462,7 +1462,7 @@
           <a:p>
             <a:fld id="{1CC4CA7E-E4E1-D74C-ACCE-7F4688DA46B0}" type="datetimeFigureOut">
               <a:rPr lang="en-GB" smtClean="0"/>
-              <a:t>14/01/2020</a:t>
+              <a:t>17/01/2020</a:t>
             </a:fld>
             <a:endParaRPr lang="en-GB"/>
           </a:p>
@@ -1694,7 +1694,7 @@
           <a:p>
             <a:fld id="{1CC4CA7E-E4E1-D74C-ACCE-7F4688DA46B0}" type="datetimeFigureOut">
               <a:rPr lang="en-GB" smtClean="0"/>
-              <a:t>14/01/2020</a:t>
+              <a:t>17/01/2020</a:t>
             </a:fld>
             <a:endParaRPr lang="en-GB"/>
           </a:p>
@@ -2061,7 +2061,7 @@
           <a:p>
             <a:fld id="{1CC4CA7E-E4E1-D74C-ACCE-7F4688DA46B0}" type="datetimeFigureOut">
               <a:rPr lang="en-GB" smtClean="0"/>
-              <a:t>14/01/2020</a:t>
+              <a:t>17/01/2020</a:t>
             </a:fld>
             <a:endParaRPr lang="en-GB"/>
           </a:p>
@@ -2179,7 +2179,7 @@
           <a:p>
             <a:fld id="{1CC4CA7E-E4E1-D74C-ACCE-7F4688DA46B0}" type="datetimeFigureOut">
               <a:rPr lang="en-GB" smtClean="0"/>
-              <a:t>14/01/2020</a:t>
+              <a:t>17/01/2020</a:t>
             </a:fld>
             <a:endParaRPr lang="en-GB"/>
           </a:p>
@@ -2274,7 +2274,7 @@
           <a:p>
             <a:fld id="{1CC4CA7E-E4E1-D74C-ACCE-7F4688DA46B0}" type="datetimeFigureOut">
               <a:rPr lang="en-GB" smtClean="0"/>
-              <a:t>14/01/2020</a:t>
+              <a:t>17/01/2020</a:t>
             </a:fld>
             <a:endParaRPr lang="en-GB"/>
           </a:p>
@@ -2551,7 +2551,7 @@
           <a:p>
             <a:fld id="{1CC4CA7E-E4E1-D74C-ACCE-7F4688DA46B0}" type="datetimeFigureOut">
               <a:rPr lang="en-GB" smtClean="0"/>
-              <a:t>14/01/2020</a:t>
+              <a:t>17/01/2020</a:t>
             </a:fld>
             <a:endParaRPr lang="en-GB"/>
           </a:p>
@@ -2808,7 +2808,7 @@
           <a:p>
             <a:fld id="{1CC4CA7E-E4E1-D74C-ACCE-7F4688DA46B0}" type="datetimeFigureOut">
               <a:rPr lang="en-GB" smtClean="0"/>
-              <a:t>14/01/2020</a:t>
+              <a:t>17/01/2020</a:t>
             </a:fld>
             <a:endParaRPr lang="en-GB"/>
           </a:p>
@@ -3021,7 +3021,7 @@
           <a:p>
             <a:fld id="{1CC4CA7E-E4E1-D74C-ACCE-7F4688DA46B0}" type="datetimeFigureOut">
               <a:rPr lang="en-GB" smtClean="0"/>
-              <a:t>14/01/2020</a:t>
+              <a:t>17/01/2020</a:t>
             </a:fld>
             <a:endParaRPr lang="en-GB"/>
           </a:p>
@@ -3494,7 +3494,7 @@
             </a:r>
             <a:r>
               <a:rPr lang="en-GB" dirty="0"/>
-              <a:t> 1</a:t>
+              <a:t> 2</a:t>
             </a:r>
           </a:p>
           <a:p>
@@ -7500,7 +7500,7 @@
             <a:pPr lvl="1"/>
             <a:r>
               <a:rPr lang="en-GB" dirty="0"/>
-              <a:t>Stores: element objects in two ways</a:t>
+              <a:t>Stores: element objects in Matrix or Dictionaries format</a:t>
             </a:r>
           </a:p>
         </p:txBody>

</xml_diff>

<commit_message>
PPP final update of my side
</commit_message>
<xml_diff>
--- a/Documentation/PPP, Week 2, Meeting 1.pptx
+++ b/Documentation/PPP, Week 2, Meeting 1.pptx
@@ -7192,7 +7192,9 @@
         </p:nvSpPr>
         <p:spPr/>
         <p:txBody>
-          <a:bodyPr/>
+          <a:bodyPr>
+            <a:normAutofit/>
+          </a:bodyPr>
           <a:lstStyle/>
           <a:p>
             <a:r>
@@ -7278,7 +7280,9 @@
         </p:nvSpPr>
         <p:spPr/>
         <p:txBody>
-          <a:bodyPr/>
+          <a:bodyPr>
+            <a:normAutofit/>
+          </a:bodyPr>
           <a:lstStyle/>
           <a:p>
             <a:r>
@@ -7303,10 +7307,6 @@
           </a:p>
           <a:p>
             <a:pPr lvl="1"/>
-            <a:endParaRPr lang="en-GB" dirty="0"/>
-          </a:p>
-          <a:p>
-            <a:pPr lvl="1"/>
             <a:r>
               <a:rPr lang="en-GB" dirty="0"/>
               <a:t>4*3</a:t>
@@ -7324,37 +7324,50 @@
             <a:pPr lvl="1"/>
             <a:r>
               <a:rPr lang="en-GB" dirty="0"/>
-              <a:t>Unchanged due to rotation</a:t>
+              <a:t>Upper bound</a:t>
             </a:r>
           </a:p>
           <a:p>
             <a:pPr lvl="1"/>
             <a:r>
               <a:rPr lang="en-GB" dirty="0"/>
-              <a:t>3</a:t>
+              <a:t>Unchanged due </a:t>
+            </a:r>
+            <a:r>
+              <a:rPr lang="en-GB"/>
+              <a:t>to rotation</a:t>
+            </a:r>
+          </a:p>
+          <a:p>
+            <a:pPr lvl="1"/>
+            <a:endParaRPr lang="en-GB" dirty="0"/>
+          </a:p>
+          <a:p>
+            <a:pPr lvl="1"/>
+            <a:r>
+              <a:rPr lang="en-GB" dirty="0"/>
+              <a:t>Upper bound: &lt; 3</a:t>
             </a:r>
             <a:r>
               <a:rPr lang="en-GB" baseline="30000" dirty="0"/>
               <a:t>n-2</a:t>
             </a:r>
-            <a:endParaRPr lang="en-GB" dirty="0"/>
+          </a:p>
+          <a:p>
+            <a:pPr lvl="1"/>
+            <a:r>
+              <a:rPr lang="en-GB" dirty="0"/>
+              <a:t>Lower bound: &gt; n</a:t>
+            </a:r>
+          </a:p>
+          <a:p>
+            <a:pPr lvl="1"/>
+            <a:endParaRPr lang="en-GB" baseline="30000" dirty="0"/>
           </a:p>
           <a:p>
             <a:pPr marL="457200" lvl="1" indent="0">
               <a:buNone/>
             </a:pPr>
-            <a:endParaRPr lang="en-GB" dirty="0"/>
-          </a:p>
-          <a:p>
-            <a:pPr lvl="1"/>
-            <a:r>
-              <a:rPr lang="en-GB" dirty="0"/>
-              <a:t>True State Space: &lt; 3</a:t>
-            </a:r>
-            <a:r>
-              <a:rPr lang="en-GB" baseline="30000" dirty="0"/>
-              <a:t>n-2</a:t>
-            </a:r>
             <a:endParaRPr lang="en-GB" dirty="0"/>
           </a:p>
           <a:p>

</xml_diff>

<commit_message>
Removed dia in case of presentation
</commit_message>
<xml_diff>
--- a/Documentation/PPP, Week 2, Meeting 1.pptx
+++ b/Documentation/PPP, Week 2, Meeting 1.pptx
@@ -5,7 +5,7 @@
     <p:sldMasterId id="2147483672" r:id="rId1"/>
   </p:sldMasterIdLst>
   <p:notesMasterIdLst>
-    <p:notesMasterId r:id="rId19"/>
+    <p:notesMasterId r:id="rId18"/>
   </p:notesMasterIdLst>
   <p:sldIdLst>
     <p:sldId id="256" r:id="rId2"/>
@@ -23,8 +23,7 @@
     <p:sldId id="274" r:id="rId14"/>
     <p:sldId id="275" r:id="rId15"/>
     <p:sldId id="276" r:id="rId16"/>
-    <p:sldId id="269" r:id="rId17"/>
-    <p:sldId id="265" r:id="rId18"/>
+    <p:sldId id="265" r:id="rId17"/>
   </p:sldIdLst>
   <p:sldSz cx="12192000" cy="6858000"/>
   <p:notesSz cx="6858000" cy="9144000"/>
@@ -6005,578 +6004,6 @@
 </file>
 
 <file path=ppt/slides/slide16.xml><?xml version="1.0" encoding="utf-8"?>
-<p:sld xmlns:a="http://schemas.openxmlformats.org/drawingml/2006/main" xmlns:r="http://schemas.openxmlformats.org/officeDocument/2006/relationships" xmlns:p="http://schemas.openxmlformats.org/presentationml/2006/main">
-  <p:cSld>
-    <p:spTree>
-      <p:nvGrpSpPr>
-        <p:cNvPr id="1" name=""/>
-        <p:cNvGrpSpPr/>
-        <p:nvPr/>
-      </p:nvGrpSpPr>
-      <p:grpSpPr>
-        <a:xfrm>
-          <a:off x="0" y="0"/>
-          <a:ext cx="0" cy="0"/>
-          <a:chOff x="0" y="0"/>
-          <a:chExt cx="0" cy="0"/>
-        </a:xfrm>
-      </p:grpSpPr>
-      <p:sp>
-        <p:nvSpPr>
-          <p:cNvPr id="2" name="Titel 1">
-            <a:extLst>
-              <a:ext uri="{FF2B5EF4-FFF2-40B4-BE49-F238E27FC236}">
-                <a16:creationId xmlns:a16="http://schemas.microsoft.com/office/drawing/2014/main" id="{048DA664-7B4B-904F-9F8D-5AD398A7E951}"/>
-              </a:ext>
-            </a:extLst>
-          </p:cNvPr>
-          <p:cNvSpPr>
-            <a:spLocks noGrp="1"/>
-          </p:cNvSpPr>
-          <p:nvPr>
-            <p:ph type="title"/>
-          </p:nvPr>
-        </p:nvSpPr>
-        <p:spPr/>
-        <p:txBody>
-          <a:bodyPr/>
-          <a:lstStyle/>
-          <a:p>
-            <a:r>
-              <a:rPr lang="en-GB" dirty="0"/>
-              <a:t>4. Method: Possible algorithms</a:t>
-            </a:r>
-          </a:p>
-        </p:txBody>
-      </p:sp>
-      <p:graphicFrame>
-        <p:nvGraphicFramePr>
-          <p:cNvPr id="4" name="Tijdelijke aanduiding voor inhoud 3">
-            <a:extLst>
-              <a:ext uri="{FF2B5EF4-FFF2-40B4-BE49-F238E27FC236}">
-                <a16:creationId xmlns:a16="http://schemas.microsoft.com/office/drawing/2014/main" id="{A99AE717-0713-1642-BF68-3759AE9FEC44}"/>
-              </a:ext>
-            </a:extLst>
-          </p:cNvPr>
-          <p:cNvGraphicFramePr>
-            <a:graphicFrameLocks noGrp="1"/>
-          </p:cNvGraphicFramePr>
-          <p:nvPr>
-            <p:ph sz="half" idx="1"/>
-            <p:extLst>
-              <p:ext uri="{D42A27DB-BD31-4B8C-83A1-F6EECF244321}">
-                <p14:modId xmlns:p14="http://schemas.microsoft.com/office/powerpoint/2010/main" val="1788444708"/>
-              </p:ext>
-            </p:extLst>
-          </p:nvPr>
-        </p:nvGraphicFramePr>
-        <p:xfrm>
-          <a:off x="838199" y="1825624"/>
-          <a:ext cx="10515600" cy="4346576"/>
-        </p:xfrm>
-        <a:graphic>
-          <a:graphicData uri="http://schemas.openxmlformats.org/drawingml/2006/table">
-            <a:tbl>
-              <a:tblPr firstRow="1" bandRow="1">
-                <a:tableStyleId>{5C22544A-7EE6-4342-B048-85BDC9FD1C3A}</a:tableStyleId>
-              </a:tblPr>
-              <a:tblGrid>
-                <a:gridCol w="1752600">
-                  <a:extLst>
-                    <a:ext uri="{9D8B030D-6E8A-4147-A177-3AD203B41FA5}">
-                      <a16:colId xmlns:a16="http://schemas.microsoft.com/office/drawing/2014/main" val="3498264961"/>
-                    </a:ext>
-                  </a:extLst>
-                </a:gridCol>
-                <a:gridCol w="1752600">
-                  <a:extLst>
-                    <a:ext uri="{9D8B030D-6E8A-4147-A177-3AD203B41FA5}">
-                      <a16:colId xmlns:a16="http://schemas.microsoft.com/office/drawing/2014/main" val="4197057412"/>
-                    </a:ext>
-                  </a:extLst>
-                </a:gridCol>
-                <a:gridCol w="1752600">
-                  <a:extLst>
-                    <a:ext uri="{9D8B030D-6E8A-4147-A177-3AD203B41FA5}">
-                      <a16:colId xmlns:a16="http://schemas.microsoft.com/office/drawing/2014/main" val="3755094875"/>
-                    </a:ext>
-                  </a:extLst>
-                </a:gridCol>
-                <a:gridCol w="1752600">
-                  <a:extLst>
-                    <a:ext uri="{9D8B030D-6E8A-4147-A177-3AD203B41FA5}">
-                      <a16:colId xmlns:a16="http://schemas.microsoft.com/office/drawing/2014/main" val="3007925308"/>
-                    </a:ext>
-                  </a:extLst>
-                </a:gridCol>
-                <a:gridCol w="1752600">
-                  <a:extLst>
-                    <a:ext uri="{9D8B030D-6E8A-4147-A177-3AD203B41FA5}">
-                      <a16:colId xmlns:a16="http://schemas.microsoft.com/office/drawing/2014/main" val="804067653"/>
-                    </a:ext>
-                  </a:extLst>
-                </a:gridCol>
-                <a:gridCol w="1752600">
-                  <a:extLst>
-                    <a:ext uri="{9D8B030D-6E8A-4147-A177-3AD203B41FA5}">
-                      <a16:colId xmlns:a16="http://schemas.microsoft.com/office/drawing/2014/main" val="4294553547"/>
-                    </a:ext>
-                  </a:extLst>
-                </a:gridCol>
-              </a:tblGrid>
-              <a:tr h="1310212">
-                <a:tc>
-                  <a:txBody>
-                    <a:bodyPr/>
-                    <a:lstStyle/>
-                    <a:p>
-                      <a:r>
-                        <a:rPr lang="en-GB" dirty="0"/>
-                        <a:t>Name</a:t>
-                      </a:r>
-                    </a:p>
-                  </a:txBody>
-                  <a:tcPr/>
-                </a:tc>
-                <a:tc>
-                  <a:txBody>
-                    <a:bodyPr/>
-                    <a:lstStyle/>
-                    <a:p>
-                      <a:r>
-                        <a:rPr lang="en-GB" dirty="0"/>
-                        <a:t>Result</a:t>
-                      </a:r>
-                    </a:p>
-                  </a:txBody>
-                  <a:tcPr/>
-                </a:tc>
-                <a:tc>
-                  <a:txBody>
-                    <a:bodyPr/>
-                    <a:lstStyle/>
-                    <a:p>
-                      <a:pPr marL="0" marR="0" lvl="0" indent="0" algn="l" defTabSz="914400" rtl="0" eaLnBrk="1" fontAlgn="auto" latinLnBrk="0" hangingPunct="1">
-                        <a:lnSpc>
-                          <a:spcPct val="100000"/>
-                        </a:lnSpc>
-                        <a:spcBef>
-                          <a:spcPts val="0"/>
-                        </a:spcBef>
-                        <a:spcAft>
-                          <a:spcPts val="0"/>
-                        </a:spcAft>
-                        <a:buClrTx/>
-                        <a:buSzTx/>
-                        <a:buFontTx/>
-                        <a:buNone/>
-                        <a:tabLst/>
-                        <a:defRPr/>
-                      </a:pPr>
-                      <a:r>
-                        <a:rPr lang="nl-NL" dirty="0"/>
-                        <a:t>Method</a:t>
-                      </a:r>
-                      <a:endParaRPr lang="en-GB" dirty="0"/>
-                    </a:p>
-                  </a:txBody>
-                  <a:tcPr/>
-                </a:tc>
-                <a:tc>
-                  <a:txBody>
-                    <a:bodyPr/>
-                    <a:lstStyle/>
-                    <a:p>
-                      <a:pPr marL="0" marR="0" lvl="0" indent="0" algn="l" defTabSz="914400" rtl="0" eaLnBrk="1" fontAlgn="auto" latinLnBrk="0" hangingPunct="1">
-                        <a:lnSpc>
-                          <a:spcPct val="100000"/>
-                        </a:lnSpc>
-                        <a:spcBef>
-                          <a:spcPts val="0"/>
-                        </a:spcBef>
-                        <a:spcAft>
-                          <a:spcPts val="0"/>
-                        </a:spcAft>
-                        <a:buClrTx/>
-                        <a:buSzTx/>
-                        <a:buFontTx/>
-                        <a:buNone/>
-                        <a:tabLst/>
-                        <a:defRPr/>
-                      </a:pPr>
-                      <a:r>
-                        <a:rPr lang="el-GR" dirty="0"/>
-                        <a:t>Ω</a:t>
-                      </a:r>
-                      <a:r>
-                        <a:rPr lang="nl-NL" dirty="0"/>
-                        <a:t> (Best Case)</a:t>
-                      </a:r>
-                      <a:endParaRPr lang="en-GB" dirty="0"/>
-                    </a:p>
-                  </a:txBody>
-                  <a:tcPr/>
-                </a:tc>
-                <a:tc>
-                  <a:txBody>
-                    <a:bodyPr/>
-                    <a:lstStyle/>
-                    <a:p>
-                      <a:r>
-                        <a:rPr lang="en-GB" dirty="0"/>
-                        <a:t>Runtime (1000 iterations) </a:t>
-                      </a:r>
-                      <a:r>
-                        <a:rPr lang="en-GB" dirty="0" err="1"/>
-                        <a:t>Dict</a:t>
-                      </a:r>
-                      <a:endParaRPr lang="en-GB" dirty="0"/>
-                    </a:p>
-                  </a:txBody>
-                  <a:tcPr/>
-                </a:tc>
-                <a:tc>
-                  <a:txBody>
-                    <a:bodyPr/>
-                    <a:lstStyle/>
-                    <a:p>
-                      <a:r>
-                        <a:rPr lang="en-GB" dirty="0"/>
-                        <a:t>Runtime (1000 iterations) Matrix</a:t>
-                      </a:r>
-                    </a:p>
-                  </a:txBody>
-                  <a:tcPr/>
-                </a:tc>
-                <a:extLst>
-                  <a:ext uri="{0D108BD9-81ED-4DB2-BD59-A6C34878D82A}">
-                    <a16:rowId xmlns:a16="http://schemas.microsoft.com/office/drawing/2014/main" val="2410651011"/>
-                  </a:ext>
-                </a:extLst>
-              </a:tr>
-              <a:tr h="759091">
-                <a:tc>
-                  <a:txBody>
-                    <a:bodyPr/>
-                    <a:lstStyle/>
-                    <a:p>
-                      <a:r>
-                        <a:rPr lang="en-GB" dirty="0"/>
-                        <a:t>Random</a:t>
-                      </a:r>
-                    </a:p>
-                  </a:txBody>
-                  <a:tcPr/>
-                </a:tc>
-                <a:tc>
-                  <a:txBody>
-                    <a:bodyPr/>
-                    <a:lstStyle/>
-                    <a:p>
-                      <a:r>
-                        <a:rPr lang="en-GB" dirty="0"/>
-                        <a:t>Sub-optimal</a:t>
-                      </a:r>
-                    </a:p>
-                  </a:txBody>
-                  <a:tcPr/>
-                </a:tc>
-                <a:tc>
-                  <a:txBody>
-                    <a:bodyPr/>
-                    <a:lstStyle/>
-                    <a:p>
-                      <a:r>
-                        <a:rPr lang="en-GB" dirty="0"/>
-                        <a:t>Constructive</a:t>
-                      </a:r>
-                    </a:p>
-                  </a:txBody>
-                  <a:tcPr/>
-                </a:tc>
-                <a:tc>
-                  <a:txBody>
-                    <a:bodyPr/>
-                    <a:lstStyle/>
-                    <a:p>
-                      <a:endParaRPr lang="en-GB" dirty="0"/>
-                    </a:p>
-                  </a:txBody>
-                  <a:tcPr/>
-                </a:tc>
-                <a:tc>
-                  <a:txBody>
-                    <a:bodyPr/>
-                    <a:lstStyle/>
-                    <a:p>
-                      <a:endParaRPr lang="en-GB" dirty="0"/>
-                    </a:p>
-                  </a:txBody>
-                  <a:tcPr/>
-                </a:tc>
-                <a:tc>
-                  <a:txBody>
-                    <a:bodyPr/>
-                    <a:lstStyle/>
-                    <a:p>
-                      <a:endParaRPr lang="en-GB" dirty="0"/>
-                    </a:p>
-                  </a:txBody>
-                  <a:tcPr/>
-                </a:tc>
-                <a:extLst>
-                  <a:ext uri="{0D108BD9-81ED-4DB2-BD59-A6C34878D82A}">
-                    <a16:rowId xmlns:a16="http://schemas.microsoft.com/office/drawing/2014/main" val="1634554122"/>
-                  </a:ext>
-                </a:extLst>
-              </a:tr>
-              <a:tr h="759091">
-                <a:tc>
-                  <a:txBody>
-                    <a:bodyPr/>
-                    <a:lstStyle/>
-                    <a:p>
-                      <a:r>
-                        <a:rPr lang="en-GB" dirty="0"/>
-                        <a:t>Greedy</a:t>
-                      </a:r>
-                    </a:p>
-                  </a:txBody>
-                  <a:tcPr/>
-                </a:tc>
-                <a:tc>
-                  <a:txBody>
-                    <a:bodyPr/>
-                    <a:lstStyle/>
-                    <a:p>
-                      <a:r>
-                        <a:rPr lang="en-GB" dirty="0"/>
-                        <a:t>Sub-optimal+</a:t>
-                      </a:r>
-                    </a:p>
-                  </a:txBody>
-                  <a:tcPr/>
-                </a:tc>
-                <a:tc>
-                  <a:txBody>
-                    <a:bodyPr/>
-                    <a:lstStyle/>
-                    <a:p>
-                      <a:r>
-                        <a:rPr lang="en-GB" dirty="0"/>
-                        <a:t>Constructive</a:t>
-                      </a:r>
-                    </a:p>
-                  </a:txBody>
-                  <a:tcPr/>
-                </a:tc>
-                <a:tc>
-                  <a:txBody>
-                    <a:bodyPr/>
-                    <a:lstStyle/>
-                    <a:p>
-                      <a:endParaRPr lang="en-GB" dirty="0"/>
-                    </a:p>
-                  </a:txBody>
-                  <a:tcPr/>
-                </a:tc>
-                <a:tc>
-                  <a:txBody>
-                    <a:bodyPr/>
-                    <a:lstStyle/>
-                    <a:p>
-                      <a:endParaRPr lang="en-GB" dirty="0"/>
-                    </a:p>
-                  </a:txBody>
-                  <a:tcPr/>
-                </a:tc>
-                <a:tc>
-                  <a:txBody>
-                    <a:bodyPr/>
-                    <a:lstStyle/>
-                    <a:p>
-                      <a:endParaRPr lang="en-GB" dirty="0"/>
-                    </a:p>
-                  </a:txBody>
-                  <a:tcPr/>
-                </a:tc>
-                <a:extLst>
-                  <a:ext uri="{0D108BD9-81ED-4DB2-BD59-A6C34878D82A}">
-                    <a16:rowId xmlns:a16="http://schemas.microsoft.com/office/drawing/2014/main" val="2093889383"/>
-                  </a:ext>
-                </a:extLst>
-              </a:tr>
-              <a:tr h="759091">
-                <a:tc>
-                  <a:txBody>
-                    <a:bodyPr/>
-                    <a:lstStyle/>
-                    <a:p>
-                      <a:r>
-                        <a:rPr lang="en-GB" dirty="0" err="1"/>
-                        <a:t>Lineair</a:t>
-                      </a:r>
-                      <a:endParaRPr lang="en-GB" dirty="0"/>
-                    </a:p>
-                  </a:txBody>
-                  <a:tcPr/>
-                </a:tc>
-                <a:tc>
-                  <a:txBody>
-                    <a:bodyPr/>
-                    <a:lstStyle/>
-                    <a:p>
-                      <a:r>
-                        <a:rPr lang="en-GB" dirty="0"/>
-                        <a:t>Optimal</a:t>
-                      </a:r>
-                    </a:p>
-                  </a:txBody>
-                  <a:tcPr/>
-                </a:tc>
-                <a:tc>
-                  <a:txBody>
-                    <a:bodyPr/>
-                    <a:lstStyle/>
-                    <a:p>
-                      <a:r>
-                        <a:rPr lang="en-GB" dirty="0"/>
-                        <a:t>Constructive</a:t>
-                      </a:r>
-                    </a:p>
-                  </a:txBody>
-                  <a:tcPr/>
-                </a:tc>
-                <a:tc>
-                  <a:txBody>
-                    <a:bodyPr/>
-                    <a:lstStyle/>
-                    <a:p>
-                      <a:endParaRPr lang="en-GB" dirty="0"/>
-                    </a:p>
-                  </a:txBody>
-                  <a:tcPr/>
-                </a:tc>
-                <a:tc>
-                  <a:txBody>
-                    <a:bodyPr/>
-                    <a:lstStyle/>
-                    <a:p>
-                      <a:endParaRPr lang="en-GB" dirty="0"/>
-                    </a:p>
-                  </a:txBody>
-                  <a:tcPr/>
-                </a:tc>
-                <a:tc>
-                  <a:txBody>
-                    <a:bodyPr/>
-                    <a:lstStyle/>
-                    <a:p>
-                      <a:endParaRPr lang="en-GB" dirty="0"/>
-                    </a:p>
-                  </a:txBody>
-                  <a:tcPr/>
-                </a:tc>
-                <a:extLst>
-                  <a:ext uri="{0D108BD9-81ED-4DB2-BD59-A6C34878D82A}">
-                    <a16:rowId xmlns:a16="http://schemas.microsoft.com/office/drawing/2014/main" val="2023286041"/>
-                  </a:ext>
-                </a:extLst>
-              </a:tr>
-              <a:tr h="759091">
-                <a:tc>
-                  <a:txBody>
-                    <a:bodyPr/>
-                    <a:lstStyle/>
-                    <a:p>
-                      <a:r>
-                        <a:rPr lang="en-GB" dirty="0"/>
-                        <a:t>Future </a:t>
-                      </a:r>
-                    </a:p>
-                  </a:txBody>
-                  <a:tcPr/>
-                </a:tc>
-                <a:tc>
-                  <a:txBody>
-                    <a:bodyPr/>
-                    <a:lstStyle/>
-                    <a:p>
-                      <a:r>
-                        <a:rPr lang="en-GB" dirty="0"/>
-                        <a:t>-</a:t>
-                      </a:r>
-                    </a:p>
-                  </a:txBody>
-                  <a:tcPr/>
-                </a:tc>
-                <a:tc>
-                  <a:txBody>
-                    <a:bodyPr/>
-                    <a:lstStyle/>
-                    <a:p>
-                      <a:r>
-                        <a:rPr lang="en-GB" dirty="0"/>
-                        <a:t>-</a:t>
-                      </a:r>
-                    </a:p>
-                  </a:txBody>
-                  <a:tcPr/>
-                </a:tc>
-                <a:tc>
-                  <a:txBody>
-                    <a:bodyPr/>
-                    <a:lstStyle/>
-                    <a:p>
-                      <a:endParaRPr lang="en-GB" dirty="0"/>
-                    </a:p>
-                  </a:txBody>
-                  <a:tcPr/>
-                </a:tc>
-                <a:tc>
-                  <a:txBody>
-                    <a:bodyPr/>
-                    <a:lstStyle/>
-                    <a:p>
-                      <a:endParaRPr lang="en-GB" dirty="0"/>
-                    </a:p>
-                  </a:txBody>
-                  <a:tcPr/>
-                </a:tc>
-                <a:tc>
-                  <a:txBody>
-                    <a:bodyPr/>
-                    <a:lstStyle/>
-                    <a:p>
-                      <a:endParaRPr lang="en-GB" dirty="0"/>
-                    </a:p>
-                  </a:txBody>
-                  <a:tcPr/>
-                </a:tc>
-                <a:extLst>
-                  <a:ext uri="{0D108BD9-81ED-4DB2-BD59-A6C34878D82A}">
-                    <a16:rowId xmlns:a16="http://schemas.microsoft.com/office/drawing/2014/main" val="207538214"/>
-                  </a:ext>
-                </a:extLst>
-              </a:tr>
-            </a:tbl>
-          </a:graphicData>
-        </a:graphic>
-      </p:graphicFrame>
-    </p:spTree>
-    <p:extLst>
-      <p:ext uri="{BB962C8B-B14F-4D97-AF65-F5344CB8AC3E}">
-        <p14:creationId xmlns:p14="http://schemas.microsoft.com/office/powerpoint/2010/main" val="635308508"/>
-      </p:ext>
-    </p:extLst>
-  </p:cSld>
-  <p:clrMapOvr>
-    <a:masterClrMapping/>
-  </p:clrMapOvr>
-</p:sld>
-</file>
-
-<file path=ppt/slides/slide17.xml><?xml version="1.0" encoding="utf-8"?>
 <p:sld xmlns:a="http://schemas.openxmlformats.org/drawingml/2006/main" xmlns:r="http://schemas.openxmlformats.org/officeDocument/2006/relationships" xmlns:p="http://schemas.openxmlformats.org/presentationml/2006/main">
   <p:cSld>
     <p:spTree>

</xml_diff>

<commit_message>
updated visualise and edited ppp
</commit_message>
<xml_diff>
--- a/Documentation/PPP, Week 2, Meeting 1.pptx
+++ b/Documentation/PPP, Week 2, Meeting 1.pptx
@@ -5,7 +5,7 @@
     <p:sldMasterId id="2147483672" r:id="rId1"/>
   </p:sldMasterIdLst>
   <p:notesMasterIdLst>
-    <p:notesMasterId r:id="rId18"/>
+    <p:notesMasterId r:id="rId17"/>
   </p:notesMasterIdLst>
   <p:sldIdLst>
     <p:sldId id="256" r:id="rId2"/>
@@ -13,17 +13,16 @@
     <p:sldId id="283" r:id="rId4"/>
     <p:sldId id="284" r:id="rId5"/>
     <p:sldId id="268" r:id="rId6"/>
-    <p:sldId id="267" r:id="rId7"/>
-    <p:sldId id="277" r:id="rId8"/>
-    <p:sldId id="278" r:id="rId9"/>
-    <p:sldId id="279" r:id="rId10"/>
-    <p:sldId id="280" r:id="rId11"/>
-    <p:sldId id="281" r:id="rId12"/>
-    <p:sldId id="282" r:id="rId13"/>
-    <p:sldId id="274" r:id="rId14"/>
-    <p:sldId id="275" r:id="rId15"/>
-    <p:sldId id="276" r:id="rId16"/>
-    <p:sldId id="265" r:id="rId17"/>
+    <p:sldId id="277" r:id="rId7"/>
+    <p:sldId id="278" r:id="rId8"/>
+    <p:sldId id="279" r:id="rId9"/>
+    <p:sldId id="280" r:id="rId10"/>
+    <p:sldId id="281" r:id="rId11"/>
+    <p:sldId id="282" r:id="rId12"/>
+    <p:sldId id="274" r:id="rId13"/>
+    <p:sldId id="275" r:id="rId14"/>
+    <p:sldId id="276" r:id="rId15"/>
+    <p:sldId id="265" r:id="rId16"/>
   </p:sldIdLst>
   <p:sldSz cx="12192000" cy="6858000"/>
   <p:notesSz cx="6858000" cy="9144000"/>
@@ -212,7 +211,7 @@
           <a:p>
             <a:fld id="{1E47D41A-4042-B543-AE22-1ED09200DB20}" type="datetimeFigureOut">
               <a:rPr lang="en-GB" smtClean="0"/>
-              <a:t>17/01/2020</a:t>
+              <a:t>20/01/2020</a:t>
             </a:fld>
             <a:endParaRPr lang="en-GB"/>
           </a:p>
@@ -695,7 +694,7 @@
           <a:p>
             <a:fld id="{14FA74A2-3722-1A41-8512-46265943785A}" type="datetime1">
               <a:rPr lang="nl-NL" smtClean="0"/>
-              <a:t>17-01-2020</a:t>
+              <a:t>20-1-2020</a:t>
             </a:fld>
             <a:endParaRPr lang="en-GB"/>
           </a:p>
@@ -865,7 +864,7 @@
           <a:p>
             <a:fld id="{F95A9C9F-8C45-7343-9CDB-F9A485B697FF}" type="datetime1">
               <a:rPr lang="nl-NL" smtClean="0"/>
-              <a:t>17-01-2020</a:t>
+              <a:t>20-1-2020</a:t>
             </a:fld>
             <a:endParaRPr lang="en-GB"/>
           </a:p>
@@ -1045,7 +1044,7 @@
           <a:p>
             <a:fld id="{F023C2D3-547E-4849-B250-ECC27C4ADAB2}" type="datetime1">
               <a:rPr lang="nl-NL" smtClean="0"/>
-              <a:t>17-01-2020</a:t>
+              <a:t>20-1-2020</a:t>
             </a:fld>
             <a:endParaRPr lang="en-GB"/>
           </a:p>
@@ -1215,7 +1214,7 @@
           <a:p>
             <a:fld id="{7ED8645F-302A-FC4F-B65E-BE44BD7D0BFE}" type="datetime1">
               <a:rPr lang="nl-NL" smtClean="0"/>
-              <a:t>17-01-2020</a:t>
+              <a:t>20-1-2020</a:t>
             </a:fld>
             <a:endParaRPr lang="en-GB"/>
           </a:p>
@@ -1461,7 +1460,7 @@
           <a:p>
             <a:fld id="{3F37FD0C-92E3-6147-B017-5A3F3FC940DB}" type="datetime1">
               <a:rPr lang="nl-NL" smtClean="0"/>
-              <a:t>17-01-2020</a:t>
+              <a:t>20-1-2020</a:t>
             </a:fld>
             <a:endParaRPr lang="en-GB"/>
           </a:p>
@@ -1693,7 +1692,7 @@
           <a:p>
             <a:fld id="{12999FB7-638F-064F-9F1B-5A2B67E58CFF}" type="datetime1">
               <a:rPr lang="nl-NL" smtClean="0"/>
-              <a:t>17-01-2020</a:t>
+              <a:t>20-1-2020</a:t>
             </a:fld>
             <a:endParaRPr lang="en-GB"/>
           </a:p>
@@ -2060,7 +2059,7 @@
           <a:p>
             <a:fld id="{A1CFFDEF-85F2-E847-8D85-682A9D98BAB3}" type="datetime1">
               <a:rPr lang="nl-NL" smtClean="0"/>
-              <a:t>17-01-2020</a:t>
+              <a:t>20-1-2020</a:t>
             </a:fld>
             <a:endParaRPr lang="en-GB"/>
           </a:p>
@@ -2178,7 +2177,7 @@
           <a:p>
             <a:fld id="{028B6388-FB3E-614B-A3B7-D097F68BF908}" type="datetime1">
               <a:rPr lang="nl-NL" smtClean="0"/>
-              <a:t>17-01-2020</a:t>
+              <a:t>20-1-2020</a:t>
             </a:fld>
             <a:endParaRPr lang="en-GB"/>
           </a:p>
@@ -2273,7 +2272,7 @@
           <a:p>
             <a:fld id="{139C7612-8A5C-2E4F-AB2E-9CC1B411E701}" type="datetime1">
               <a:rPr lang="nl-NL" smtClean="0"/>
-              <a:t>17-01-2020</a:t>
+              <a:t>20-1-2020</a:t>
             </a:fld>
             <a:endParaRPr lang="en-GB"/>
           </a:p>
@@ -2550,7 +2549,7 @@
           <a:p>
             <a:fld id="{C00946DD-15F0-6346-9ACF-7E04BBC1DA84}" type="datetime1">
               <a:rPr lang="nl-NL" smtClean="0"/>
-              <a:t>17-01-2020</a:t>
+              <a:t>20-1-2020</a:t>
             </a:fld>
             <a:endParaRPr lang="en-GB"/>
           </a:p>
@@ -2807,7 +2806,7 @@
           <a:p>
             <a:fld id="{3D169EF2-A6C6-B04D-A2C4-C446C863F365}" type="datetime1">
               <a:rPr lang="nl-NL" smtClean="0"/>
-              <a:t>17-01-2020</a:t>
+              <a:t>20-1-2020</a:t>
             </a:fld>
             <a:endParaRPr lang="en-GB"/>
           </a:p>
@@ -3020,7 +3019,7 @@
           <a:p>
             <a:fld id="{9C1111A9-A1AF-C34E-B614-37051BC839D5}" type="datetime1">
               <a:rPr lang="nl-NL" smtClean="0"/>
-              <a:t>17-01-2020</a:t>
+              <a:t>20-1-2020</a:t>
             </a:fld>
             <a:endParaRPr lang="en-GB"/>
           </a:p>
@@ -3622,204 +3621,6 @@
           <a:p>
             <a:r>
               <a:rPr lang="en-GB" dirty="0"/>
-              <a:t>Greedy</a:t>
-            </a:r>
-          </a:p>
-        </p:txBody>
-      </p:sp>
-      <p:sp>
-        <p:nvSpPr>
-          <p:cNvPr id="3" name="Tijdelijke aanduiding voor inhoud 2">
-            <a:extLst>
-              <a:ext uri="{FF2B5EF4-FFF2-40B4-BE49-F238E27FC236}">
-                <a16:creationId xmlns:a16="http://schemas.microsoft.com/office/drawing/2014/main" id="{6B57B016-94D5-F646-9976-362E7188E1F0}"/>
-              </a:ext>
-            </a:extLst>
-          </p:cNvPr>
-          <p:cNvSpPr>
-            <a:spLocks noGrp="1"/>
-          </p:cNvSpPr>
-          <p:nvPr>
-            <p:ph sz="half" idx="1"/>
-          </p:nvPr>
-        </p:nvSpPr>
-        <p:spPr/>
-        <p:txBody>
-          <a:bodyPr>
-            <a:normAutofit lnSpcReduction="10000"/>
-          </a:bodyPr>
-          <a:lstStyle/>
-          <a:p>
-            <a:r>
-              <a:rPr lang="en-GB" dirty="0"/>
-              <a:t>Let S be HP-chain of length n.</a:t>
-            </a:r>
-          </a:p>
-          <a:p>
-            <a:r>
-              <a:rPr lang="en-GB" dirty="0"/>
-              <a:t>Fix first 2 elements of chain.</a:t>
-            </a:r>
-          </a:p>
-          <a:p>
-            <a:r>
-              <a:rPr lang="en-GB" dirty="0"/>
-              <a:t>For subsequent elements, try all moves from {u, d, l, r, </a:t>
-            </a:r>
-            <a:r>
-              <a:rPr lang="en-GB" dirty="0" err="1"/>
-              <a:t>i</a:t>
-            </a:r>
-            <a:r>
-              <a:rPr lang="en-GB" dirty="0"/>
-              <a:t>, o} and check whether move would result in H-H connection (with self-avoidance).</a:t>
-            </a:r>
-          </a:p>
-          <a:p>
-            <a:r>
-              <a:rPr lang="en-GB" dirty="0"/>
-              <a:t>If so, use the move. If not, pick random.</a:t>
-            </a:r>
-          </a:p>
-          <a:p>
-            <a:r>
-              <a:rPr lang="en-GB" dirty="0"/>
-              <a:t>Stuck? Start over.</a:t>
-            </a:r>
-          </a:p>
-        </p:txBody>
-      </p:sp>
-      <p:pic>
-        <p:nvPicPr>
-          <p:cNvPr id="4098" name="Picture 2" descr="Afbeeldingsresultaat voor greedy algorithm">
-            <a:extLst>
-              <a:ext uri="{FF2B5EF4-FFF2-40B4-BE49-F238E27FC236}">
-                <a16:creationId xmlns:a16="http://schemas.microsoft.com/office/drawing/2014/main" id="{E2145716-8FD2-4D20-9F53-FFC859D21248}"/>
-              </a:ext>
-            </a:extLst>
-          </p:cNvPr>
-          <p:cNvPicPr>
-            <a:picLocks noGrp="1" noChangeAspect="1" noChangeArrowheads="1" noCrop="1"/>
-          </p:cNvPicPr>
-          <p:nvPr>
-            <p:ph sz="half" idx="2"/>
-          </p:nvPr>
-        </p:nvPicPr>
-        <p:blipFill>
-          <a:blip r:embed="rId2">
-            <a:extLst>
-              <a:ext uri="{28A0092B-C50C-407E-A947-70E740481C1C}">
-                <a14:useLocalDpi xmlns:a14="http://schemas.microsoft.com/office/drawing/2010/main" val="0"/>
-              </a:ext>
-            </a:extLst>
-          </a:blip>
-          <a:srcRect/>
-          <a:stretch>
-            <a:fillRect/>
-          </a:stretch>
-        </p:blipFill>
-        <p:spPr bwMode="auto">
-          <a:xfrm>
-            <a:off x="6908799" y="2457054"/>
-            <a:ext cx="3999177" cy="2399506"/>
-          </a:xfrm>
-          <a:prstGeom prst="rect">
-            <a:avLst/>
-          </a:prstGeom>
-          <a:noFill/>
-          <a:extLst>
-            <a:ext uri="{909E8E84-426E-40DD-AFC4-6F175D3DCCD1}">
-              <a14:hiddenFill xmlns:a14="http://schemas.microsoft.com/office/drawing/2010/main">
-                <a:solidFill>
-                  <a:srgbClr val="FFFFFF"/>
-                </a:solidFill>
-              </a14:hiddenFill>
-            </a:ext>
-          </a:extLst>
-        </p:spPr>
-      </p:pic>
-      <p:sp>
-        <p:nvSpPr>
-          <p:cNvPr id="4" name="Tijdelijke aanduiding voor dianummer 3">
-            <a:extLst>
-              <a:ext uri="{FF2B5EF4-FFF2-40B4-BE49-F238E27FC236}">
-                <a16:creationId xmlns:a16="http://schemas.microsoft.com/office/drawing/2014/main" id="{BD4D1BB4-6ED2-0A44-97B4-82BA6D6CE108}"/>
-              </a:ext>
-            </a:extLst>
-          </p:cNvPr>
-          <p:cNvSpPr>
-            <a:spLocks noGrp="1"/>
-          </p:cNvSpPr>
-          <p:nvPr>
-            <p:ph type="sldNum" sz="quarter" idx="12"/>
-          </p:nvPr>
-        </p:nvSpPr>
-        <p:spPr/>
-        <p:txBody>
-          <a:bodyPr/>
-          <a:lstStyle/>
-          <a:p>
-            <a:fld id="{D1892F8F-5571-E246-B053-E27A62D47BEF}" type="slidenum">
-              <a:rPr lang="en-GB" smtClean="0"/>
-              <a:t>10</a:t>
-            </a:fld>
-            <a:endParaRPr lang="en-GB"/>
-          </a:p>
-        </p:txBody>
-      </p:sp>
-    </p:spTree>
-    <p:extLst>
-      <p:ext uri="{BB962C8B-B14F-4D97-AF65-F5344CB8AC3E}">
-        <p14:creationId xmlns:p14="http://schemas.microsoft.com/office/powerpoint/2010/main" val="3810750948"/>
-      </p:ext>
-    </p:extLst>
-  </p:cSld>
-  <p:clrMapOvr>
-    <a:masterClrMapping/>
-  </p:clrMapOvr>
-</p:sld>
-</file>
-
-<file path=ppt/slides/slide11.xml><?xml version="1.0" encoding="utf-8"?>
-<p:sld xmlns:a="http://schemas.openxmlformats.org/drawingml/2006/main" xmlns:r="http://schemas.openxmlformats.org/officeDocument/2006/relationships" xmlns:p="http://schemas.openxmlformats.org/presentationml/2006/main">
-  <p:cSld>
-    <p:spTree>
-      <p:nvGrpSpPr>
-        <p:cNvPr id="1" name=""/>
-        <p:cNvGrpSpPr/>
-        <p:nvPr/>
-      </p:nvGrpSpPr>
-      <p:grpSpPr>
-        <a:xfrm>
-          <a:off x="0" y="0"/>
-          <a:ext cx="0" cy="0"/>
-          <a:chOff x="0" y="0"/>
-          <a:chExt cx="0" cy="0"/>
-        </a:xfrm>
-      </p:grpSpPr>
-      <p:sp>
-        <p:nvSpPr>
-          <p:cNvPr id="2" name="Titel 1">
-            <a:extLst>
-              <a:ext uri="{FF2B5EF4-FFF2-40B4-BE49-F238E27FC236}">
-                <a16:creationId xmlns:a16="http://schemas.microsoft.com/office/drawing/2014/main" id="{BDECAEB1-542A-F848-9D2C-B10DFE956AB7}"/>
-              </a:ext>
-            </a:extLst>
-          </p:cNvPr>
-          <p:cNvSpPr>
-            <a:spLocks noGrp="1"/>
-          </p:cNvSpPr>
-          <p:nvPr>
-            <p:ph type="title"/>
-          </p:nvPr>
-        </p:nvSpPr>
-        <p:spPr/>
-        <p:txBody>
-          <a:bodyPr/>
-          <a:lstStyle/>
-          <a:p>
-            <a:r>
-              <a:rPr lang="en-GB" dirty="0"/>
               <a:t>Extended Heuristic Algorithm</a:t>
             </a:r>
           </a:p>
@@ -4039,7 +3840,7 @@
           <a:p>
             <a:fld id="{D1892F8F-5571-E246-B053-E27A62D47BEF}" type="slidenum">
               <a:rPr lang="en-GB" smtClean="0"/>
-              <a:t>11</a:t>
+              <a:t>10</a:t>
             </a:fld>
             <a:endParaRPr lang="en-GB"/>
           </a:p>
@@ -4058,7 +3859,7 @@
 </p:sld>
 </file>
 
-<file path=ppt/slides/slide12.xml><?xml version="1.0" encoding="utf-8"?>
+<file path=ppt/slides/slide11.xml><?xml version="1.0" encoding="utf-8"?>
 <p:sld xmlns:a="http://schemas.openxmlformats.org/drawingml/2006/main" xmlns:r="http://schemas.openxmlformats.org/officeDocument/2006/relationships" xmlns:p="http://schemas.openxmlformats.org/presentationml/2006/main">
   <p:cSld>
     <p:spTree>
@@ -4223,7 +4024,7 @@
           <a:p>
             <a:fld id="{D1892F8F-5571-E246-B053-E27A62D47BEF}" type="slidenum">
               <a:rPr lang="en-GB" smtClean="0"/>
-              <a:t>12</a:t>
+              <a:t>11</a:t>
             </a:fld>
             <a:endParaRPr lang="en-GB"/>
           </a:p>
@@ -4233,6 +4034,212 @@
     <p:extLst>
       <p:ext uri="{BB962C8B-B14F-4D97-AF65-F5344CB8AC3E}">
         <p14:creationId xmlns:p14="http://schemas.microsoft.com/office/powerpoint/2010/main" val="143121407"/>
+      </p:ext>
+    </p:extLst>
+  </p:cSld>
+  <p:clrMapOvr>
+    <a:masterClrMapping/>
+  </p:clrMapOvr>
+</p:sld>
+</file>
+
+<file path=ppt/slides/slide12.xml><?xml version="1.0" encoding="utf-8"?>
+<p:sld xmlns:a="http://schemas.openxmlformats.org/drawingml/2006/main" xmlns:r="http://schemas.openxmlformats.org/officeDocument/2006/relationships" xmlns:p="http://schemas.openxmlformats.org/presentationml/2006/main">
+  <p:cSld>
+    <p:spTree>
+      <p:nvGrpSpPr>
+        <p:cNvPr id="1" name=""/>
+        <p:cNvGrpSpPr/>
+        <p:nvPr/>
+      </p:nvGrpSpPr>
+      <p:grpSpPr>
+        <a:xfrm>
+          <a:off x="0" y="0"/>
+          <a:ext cx="0" cy="0"/>
+          <a:chOff x="0" y="0"/>
+          <a:chExt cx="0" cy="0"/>
+        </a:xfrm>
+      </p:grpSpPr>
+      <p:sp>
+        <p:nvSpPr>
+          <p:cNvPr id="2" name="Titel 1">
+            <a:extLst>
+              <a:ext uri="{FF2B5EF4-FFF2-40B4-BE49-F238E27FC236}">
+                <a16:creationId xmlns:a16="http://schemas.microsoft.com/office/drawing/2014/main" id="{26D56270-1C1B-4B1E-BC4F-ACC759B672F7}"/>
+              </a:ext>
+            </a:extLst>
+          </p:cNvPr>
+          <p:cNvSpPr>
+            <a:spLocks noGrp="1"/>
+          </p:cNvSpPr>
+          <p:nvPr>
+            <p:ph type="title"/>
+          </p:nvPr>
+        </p:nvSpPr>
+        <p:spPr>
+          <a:xfrm>
+            <a:off x="838200" y="365125"/>
+            <a:ext cx="10515600" cy="1325563"/>
+          </a:xfrm>
+        </p:spPr>
+        <p:txBody>
+          <a:bodyPr/>
+          <a:lstStyle/>
+          <a:p>
+            <a:r>
+              <a:rPr lang="nl-NL" dirty="0" err="1"/>
+              <a:t>Results</a:t>
+            </a:r>
+            <a:r>
+              <a:rPr lang="nl-NL" dirty="0"/>
+              <a:t> – Data </a:t>
+            </a:r>
+            <a:br>
+              <a:rPr lang="nl-NL" dirty="0"/>
+            </a:br>
+            <a:r>
+              <a:rPr lang="nl-NL" dirty="0" err="1"/>
+              <a:t>structure</a:t>
+            </a:r>
+            <a:endParaRPr lang="en-GB" dirty="0"/>
+          </a:p>
+        </p:txBody>
+      </p:sp>
+      <p:sp>
+        <p:nvSpPr>
+          <p:cNvPr id="3" name="Tijdelijke aanduiding voor inhoud 2">
+            <a:extLst>
+              <a:ext uri="{FF2B5EF4-FFF2-40B4-BE49-F238E27FC236}">
+                <a16:creationId xmlns:a16="http://schemas.microsoft.com/office/drawing/2014/main" id="{938874C9-2E1B-4E00-9D04-38873D0AC371}"/>
+              </a:ext>
+            </a:extLst>
+          </p:cNvPr>
+          <p:cNvSpPr>
+            <a:spLocks noGrp="1"/>
+          </p:cNvSpPr>
+          <p:nvPr>
+            <p:ph sz="half" idx="1"/>
+          </p:nvPr>
+        </p:nvSpPr>
+        <p:spPr>
+          <a:xfrm>
+            <a:off x="838200" y="2412693"/>
+            <a:ext cx="3370243" cy="3764269"/>
+          </a:xfrm>
+        </p:spPr>
+        <p:txBody>
+          <a:bodyPr>
+            <a:normAutofit/>
+          </a:bodyPr>
+          <a:lstStyle/>
+          <a:p>
+            <a:r>
+              <a:rPr lang="nl-NL" sz="2400" dirty="0"/>
+              <a:t>L: </a:t>
+            </a:r>
+            <a:r>
+              <a:rPr lang="nl-NL" sz="2400" dirty="0" err="1"/>
+              <a:t>length</a:t>
+            </a:r>
+            <a:r>
+              <a:rPr lang="nl-NL" sz="2400" dirty="0"/>
+              <a:t> of </a:t>
+            </a:r>
+            <a:r>
+              <a:rPr lang="nl-NL" sz="2400" dirty="0" err="1"/>
+              <a:t>protein</a:t>
+            </a:r>
+            <a:endParaRPr lang="nl-NL" sz="2400" dirty="0"/>
+          </a:p>
+          <a:p>
+            <a:r>
+              <a:rPr lang="nl-NL" sz="2400" dirty="0"/>
+              <a:t>N: </a:t>
+            </a:r>
+            <a:r>
+              <a:rPr lang="nl-NL" sz="2400" dirty="0" err="1"/>
+              <a:t>number</a:t>
+            </a:r>
+            <a:r>
+              <a:rPr lang="nl-NL" sz="2400" dirty="0"/>
+              <a:t> of </a:t>
+            </a:r>
+            <a:r>
+              <a:rPr lang="nl-NL" sz="2400" dirty="0" err="1"/>
+              <a:t>iterations</a:t>
+            </a:r>
+            <a:endParaRPr lang="nl-NL" sz="2400" dirty="0"/>
+          </a:p>
+          <a:p>
+            <a:endParaRPr lang="nl-NL" sz="2400" dirty="0"/>
+          </a:p>
+        </p:txBody>
+      </p:sp>
+      <p:pic>
+        <p:nvPicPr>
+          <p:cNvPr id="5" name="Tijdelijke aanduiding voor inhoud 4">
+            <a:extLst>
+              <a:ext uri="{FF2B5EF4-FFF2-40B4-BE49-F238E27FC236}">
+                <a16:creationId xmlns:a16="http://schemas.microsoft.com/office/drawing/2014/main" id="{936E018E-90A8-44A9-B921-A228CBB1098D}"/>
+              </a:ext>
+            </a:extLst>
+          </p:cNvPr>
+          <p:cNvPicPr>
+            <a:picLocks noGrp="1" noChangeAspect="1"/>
+          </p:cNvPicPr>
+          <p:nvPr>
+            <p:ph sz="half" idx="2"/>
+          </p:nvPr>
+        </p:nvPicPr>
+        <p:blipFill>
+          <a:blip r:embed="rId2"/>
+          <a:stretch>
+            <a:fillRect/>
+          </a:stretch>
+        </p:blipFill>
+        <p:spPr>
+          <a:xfrm>
+            <a:off x="4549967" y="484743"/>
+            <a:ext cx="7095504" cy="6008132"/>
+          </a:xfrm>
+          <a:prstGeom prst="rect">
+            <a:avLst/>
+          </a:prstGeom>
+        </p:spPr>
+      </p:pic>
+      <p:sp>
+        <p:nvSpPr>
+          <p:cNvPr id="4" name="Tijdelijke aanduiding voor dianummer 3">
+            <a:extLst>
+              <a:ext uri="{FF2B5EF4-FFF2-40B4-BE49-F238E27FC236}">
+                <a16:creationId xmlns:a16="http://schemas.microsoft.com/office/drawing/2014/main" id="{6F592BCE-9B97-CA47-BF1B-C09A35D3D8AD}"/>
+              </a:ext>
+            </a:extLst>
+          </p:cNvPr>
+          <p:cNvSpPr>
+            <a:spLocks noGrp="1"/>
+          </p:cNvSpPr>
+          <p:nvPr>
+            <p:ph type="sldNum" sz="quarter" idx="12"/>
+          </p:nvPr>
+        </p:nvSpPr>
+        <p:spPr/>
+        <p:txBody>
+          <a:bodyPr/>
+          <a:lstStyle/>
+          <a:p>
+            <a:fld id="{D1892F8F-5571-E246-B053-E27A62D47BEF}" type="slidenum">
+              <a:rPr lang="en-GB" smtClean="0"/>
+              <a:t>12</a:t>
+            </a:fld>
+            <a:endParaRPr lang="en-GB"/>
+          </a:p>
+        </p:txBody>
+      </p:sp>
+    </p:spTree>
+    <p:extLst>
+      <p:ext uri="{BB962C8B-B14F-4D97-AF65-F5344CB8AC3E}">
+        <p14:creationId xmlns:p14="http://schemas.microsoft.com/office/powerpoint/2010/main" val="163970808"/>
       </p:ext>
     </p:extLst>
   </p:cSld>
@@ -4264,212 +4271,6 @@
           <p:cNvPr id="2" name="Titel 1">
             <a:extLst>
               <a:ext uri="{FF2B5EF4-FFF2-40B4-BE49-F238E27FC236}">
-                <a16:creationId xmlns:a16="http://schemas.microsoft.com/office/drawing/2014/main" id="{26D56270-1C1B-4B1E-BC4F-ACC759B672F7}"/>
-              </a:ext>
-            </a:extLst>
-          </p:cNvPr>
-          <p:cNvSpPr>
-            <a:spLocks noGrp="1"/>
-          </p:cNvSpPr>
-          <p:nvPr>
-            <p:ph type="title"/>
-          </p:nvPr>
-        </p:nvSpPr>
-        <p:spPr>
-          <a:xfrm>
-            <a:off x="838200" y="365125"/>
-            <a:ext cx="10515600" cy="1325563"/>
-          </a:xfrm>
-        </p:spPr>
-        <p:txBody>
-          <a:bodyPr/>
-          <a:lstStyle/>
-          <a:p>
-            <a:r>
-              <a:rPr lang="nl-NL" dirty="0" err="1"/>
-              <a:t>Results</a:t>
-            </a:r>
-            <a:r>
-              <a:rPr lang="nl-NL" dirty="0"/>
-              <a:t> – Data </a:t>
-            </a:r>
-            <a:br>
-              <a:rPr lang="nl-NL" dirty="0"/>
-            </a:br>
-            <a:r>
-              <a:rPr lang="nl-NL" dirty="0" err="1"/>
-              <a:t>structure</a:t>
-            </a:r>
-            <a:endParaRPr lang="en-GB" dirty="0"/>
-          </a:p>
-        </p:txBody>
-      </p:sp>
-      <p:sp>
-        <p:nvSpPr>
-          <p:cNvPr id="3" name="Tijdelijke aanduiding voor inhoud 2">
-            <a:extLst>
-              <a:ext uri="{FF2B5EF4-FFF2-40B4-BE49-F238E27FC236}">
-                <a16:creationId xmlns:a16="http://schemas.microsoft.com/office/drawing/2014/main" id="{938874C9-2E1B-4E00-9D04-38873D0AC371}"/>
-              </a:ext>
-            </a:extLst>
-          </p:cNvPr>
-          <p:cNvSpPr>
-            <a:spLocks noGrp="1"/>
-          </p:cNvSpPr>
-          <p:nvPr>
-            <p:ph sz="half" idx="1"/>
-          </p:nvPr>
-        </p:nvSpPr>
-        <p:spPr>
-          <a:xfrm>
-            <a:off x="838200" y="2412693"/>
-            <a:ext cx="3370243" cy="3764269"/>
-          </a:xfrm>
-        </p:spPr>
-        <p:txBody>
-          <a:bodyPr>
-            <a:normAutofit/>
-          </a:bodyPr>
-          <a:lstStyle/>
-          <a:p>
-            <a:r>
-              <a:rPr lang="nl-NL" sz="2400" dirty="0"/>
-              <a:t>L: </a:t>
-            </a:r>
-            <a:r>
-              <a:rPr lang="nl-NL" sz="2400" dirty="0" err="1"/>
-              <a:t>length</a:t>
-            </a:r>
-            <a:r>
-              <a:rPr lang="nl-NL" sz="2400" dirty="0"/>
-              <a:t> of </a:t>
-            </a:r>
-            <a:r>
-              <a:rPr lang="nl-NL" sz="2400" dirty="0" err="1"/>
-              <a:t>protein</a:t>
-            </a:r>
-            <a:endParaRPr lang="nl-NL" sz="2400" dirty="0"/>
-          </a:p>
-          <a:p>
-            <a:r>
-              <a:rPr lang="nl-NL" sz="2400" dirty="0"/>
-              <a:t>N: </a:t>
-            </a:r>
-            <a:r>
-              <a:rPr lang="nl-NL" sz="2400" dirty="0" err="1"/>
-              <a:t>number</a:t>
-            </a:r>
-            <a:r>
-              <a:rPr lang="nl-NL" sz="2400" dirty="0"/>
-              <a:t> of </a:t>
-            </a:r>
-            <a:r>
-              <a:rPr lang="nl-NL" sz="2400" dirty="0" err="1"/>
-              <a:t>iterations</a:t>
-            </a:r>
-            <a:endParaRPr lang="nl-NL" sz="2400" dirty="0"/>
-          </a:p>
-          <a:p>
-            <a:endParaRPr lang="nl-NL" sz="2400" dirty="0"/>
-          </a:p>
-        </p:txBody>
-      </p:sp>
-      <p:pic>
-        <p:nvPicPr>
-          <p:cNvPr id="5" name="Tijdelijke aanduiding voor inhoud 4">
-            <a:extLst>
-              <a:ext uri="{FF2B5EF4-FFF2-40B4-BE49-F238E27FC236}">
-                <a16:creationId xmlns:a16="http://schemas.microsoft.com/office/drawing/2014/main" id="{936E018E-90A8-44A9-B921-A228CBB1098D}"/>
-              </a:ext>
-            </a:extLst>
-          </p:cNvPr>
-          <p:cNvPicPr>
-            <a:picLocks noGrp="1" noChangeAspect="1"/>
-          </p:cNvPicPr>
-          <p:nvPr>
-            <p:ph sz="half" idx="2"/>
-          </p:nvPr>
-        </p:nvPicPr>
-        <p:blipFill>
-          <a:blip r:embed="rId2"/>
-          <a:stretch>
-            <a:fillRect/>
-          </a:stretch>
-        </p:blipFill>
-        <p:spPr>
-          <a:xfrm>
-            <a:off x="4549967" y="484743"/>
-            <a:ext cx="7095504" cy="6008132"/>
-          </a:xfrm>
-          <a:prstGeom prst="rect">
-            <a:avLst/>
-          </a:prstGeom>
-        </p:spPr>
-      </p:pic>
-      <p:sp>
-        <p:nvSpPr>
-          <p:cNvPr id="4" name="Tijdelijke aanduiding voor dianummer 3">
-            <a:extLst>
-              <a:ext uri="{FF2B5EF4-FFF2-40B4-BE49-F238E27FC236}">
-                <a16:creationId xmlns:a16="http://schemas.microsoft.com/office/drawing/2014/main" id="{6F592BCE-9B97-CA47-BF1B-C09A35D3D8AD}"/>
-              </a:ext>
-            </a:extLst>
-          </p:cNvPr>
-          <p:cNvSpPr>
-            <a:spLocks noGrp="1"/>
-          </p:cNvSpPr>
-          <p:nvPr>
-            <p:ph type="sldNum" sz="quarter" idx="12"/>
-          </p:nvPr>
-        </p:nvSpPr>
-        <p:spPr/>
-        <p:txBody>
-          <a:bodyPr/>
-          <a:lstStyle/>
-          <a:p>
-            <a:fld id="{D1892F8F-5571-E246-B053-E27A62D47BEF}" type="slidenum">
-              <a:rPr lang="en-GB" smtClean="0"/>
-              <a:t>13</a:t>
-            </a:fld>
-            <a:endParaRPr lang="en-GB"/>
-          </a:p>
-        </p:txBody>
-      </p:sp>
-    </p:spTree>
-    <p:extLst>
-      <p:ext uri="{BB962C8B-B14F-4D97-AF65-F5344CB8AC3E}">
-        <p14:creationId xmlns:p14="http://schemas.microsoft.com/office/powerpoint/2010/main" val="163970808"/>
-      </p:ext>
-    </p:extLst>
-  </p:cSld>
-  <p:clrMapOvr>
-    <a:masterClrMapping/>
-  </p:clrMapOvr>
-</p:sld>
-</file>
-
-<file path=ppt/slides/slide14.xml><?xml version="1.0" encoding="utf-8"?>
-<p:sld xmlns:a="http://schemas.openxmlformats.org/drawingml/2006/main" xmlns:r="http://schemas.openxmlformats.org/officeDocument/2006/relationships" xmlns:p="http://schemas.openxmlformats.org/presentationml/2006/main">
-  <p:cSld>
-    <p:spTree>
-      <p:nvGrpSpPr>
-        <p:cNvPr id="1" name=""/>
-        <p:cNvGrpSpPr/>
-        <p:nvPr/>
-      </p:nvGrpSpPr>
-      <p:grpSpPr>
-        <a:xfrm>
-          <a:off x="0" y="0"/>
-          <a:ext cx="0" cy="0"/>
-          <a:chOff x="0" y="0"/>
-          <a:chExt cx="0" cy="0"/>
-        </a:xfrm>
-      </p:grpSpPr>
-      <p:sp>
-        <p:nvSpPr>
-          <p:cNvPr id="2" name="Titel 1">
-            <a:extLst>
-              <a:ext uri="{FF2B5EF4-FFF2-40B4-BE49-F238E27FC236}">
                 <a16:creationId xmlns:a16="http://schemas.microsoft.com/office/drawing/2014/main" id="{5C770520-98CE-4CE6-ACD0-072593328459}"/>
               </a:ext>
             </a:extLst>
@@ -4709,7 +4510,7 @@
           <a:p>
             <a:fld id="{D1892F8F-5571-E246-B053-E27A62D47BEF}" type="slidenum">
               <a:rPr lang="en-GB" smtClean="0"/>
-              <a:t>14</a:t>
+              <a:t>13</a:t>
             </a:fld>
             <a:endParaRPr lang="en-GB"/>
           </a:p>
@@ -4728,7 +4529,7 @@
 </p:sld>
 </file>
 
-<file path=ppt/slides/slide15.xml><?xml version="1.0" encoding="utf-8"?>
+<file path=ppt/slides/slide14.xml><?xml version="1.0" encoding="utf-8"?>
 <p:sld xmlns:a="http://schemas.openxmlformats.org/drawingml/2006/main" xmlns:r="http://schemas.openxmlformats.org/officeDocument/2006/relationships" xmlns:p="http://schemas.openxmlformats.org/presentationml/2006/main">
   <p:cSld>
     <p:spTree>
@@ -6006,7 +5807,7 @@
           <a:p>
             <a:fld id="{D1892F8F-5571-E246-B053-E27A62D47BEF}" type="slidenum">
               <a:rPr lang="en-GB" smtClean="0"/>
-              <a:t>15</a:t>
+              <a:t>14</a:t>
             </a:fld>
             <a:endParaRPr lang="en-GB"/>
           </a:p>
@@ -6207,7 +6008,7 @@
 </p:sld>
 </file>
 
-<file path=ppt/slides/slide16.xml><?xml version="1.0" encoding="utf-8"?>
+<file path=ppt/slides/slide15.xml><?xml version="1.0" encoding="utf-8"?>
 <p:sld xmlns:a="http://schemas.openxmlformats.org/drawingml/2006/main" xmlns:r="http://schemas.openxmlformats.org/officeDocument/2006/relationships" xmlns:p="http://schemas.openxmlformats.org/presentationml/2006/main">
   <p:cSld>
     <p:spTree>
@@ -6305,7 +6106,7 @@
           <a:p>
             <a:fld id="{D1892F8F-5571-E246-B053-E27A62D47BEF}" type="slidenum">
               <a:rPr lang="en-GB" smtClean="0"/>
-              <a:t>16</a:t>
+              <a:t>15</a:t>
             </a:fld>
             <a:endParaRPr lang="en-GB"/>
           </a:p>
@@ -7149,1108 +6950,6 @@
           <p:cNvPr id="2" name="Titel 1">
             <a:extLst>
               <a:ext uri="{FF2B5EF4-FFF2-40B4-BE49-F238E27FC236}">
-                <a16:creationId xmlns:a16="http://schemas.microsoft.com/office/drawing/2014/main" id="{469AD8D3-EDB6-5D49-8D44-472ED11B1188}"/>
-              </a:ext>
-            </a:extLst>
-          </p:cNvPr>
-          <p:cNvSpPr>
-            <a:spLocks noGrp="1"/>
-          </p:cNvSpPr>
-          <p:nvPr>
-            <p:ph type="title"/>
-          </p:nvPr>
-        </p:nvSpPr>
-        <p:spPr/>
-        <p:txBody>
-          <a:bodyPr/>
-          <a:lstStyle/>
-          <a:p>
-            <a:r>
-              <a:rPr lang="en-GB" dirty="0"/>
-              <a:t>2. Quick recap</a:t>
-            </a:r>
-          </a:p>
-        </p:txBody>
-      </p:sp>
-      <p:sp>
-        <p:nvSpPr>
-          <p:cNvPr id="3" name="Tijdelijke aanduiding voor inhoud 2">
-            <a:extLst>
-              <a:ext uri="{FF2B5EF4-FFF2-40B4-BE49-F238E27FC236}">
-                <a16:creationId xmlns:a16="http://schemas.microsoft.com/office/drawing/2014/main" id="{70EB0242-E78A-C44A-8160-6A82BC9E7222}"/>
-              </a:ext>
-            </a:extLst>
-          </p:cNvPr>
-          <p:cNvSpPr>
-            <a:spLocks noGrp="1"/>
-          </p:cNvSpPr>
-          <p:nvPr>
-            <p:ph sz="half" idx="1"/>
-          </p:nvPr>
-        </p:nvSpPr>
-        <p:spPr>
-          <a:xfrm>
-            <a:off x="838200" y="1825625"/>
-            <a:ext cx="5181600" cy="1492928"/>
-          </a:xfrm>
-        </p:spPr>
-        <p:txBody>
-          <a:bodyPr/>
-          <a:lstStyle/>
-          <a:p>
-            <a:r>
-              <a:rPr lang="en-GB" dirty="0"/>
-              <a:t>Element Object</a:t>
-            </a:r>
-          </a:p>
-          <a:p>
-            <a:pPr lvl="1"/>
-            <a:r>
-              <a:rPr lang="en-GB" dirty="0"/>
-              <a:t>Stores: coordinates, direction, type</a:t>
-            </a:r>
-          </a:p>
-        </p:txBody>
-      </p:sp>
-      <p:sp>
-        <p:nvSpPr>
-          <p:cNvPr id="4" name="Tijdelijke aanduiding voor inhoud 3">
-            <a:extLst>
-              <a:ext uri="{FF2B5EF4-FFF2-40B4-BE49-F238E27FC236}">
-                <a16:creationId xmlns:a16="http://schemas.microsoft.com/office/drawing/2014/main" id="{9C67E9D9-F639-D049-A1C7-EF4275E5D4A7}"/>
-              </a:ext>
-            </a:extLst>
-          </p:cNvPr>
-          <p:cNvSpPr>
-            <a:spLocks noGrp="1"/>
-          </p:cNvSpPr>
-          <p:nvPr>
-            <p:ph sz="half" idx="2"/>
-          </p:nvPr>
-        </p:nvSpPr>
-        <p:spPr>
-          <a:xfrm>
-            <a:off x="6172200" y="1825625"/>
-            <a:ext cx="5181600" cy="1492928"/>
-          </a:xfrm>
-        </p:spPr>
-        <p:txBody>
-          <a:bodyPr/>
-          <a:lstStyle/>
-          <a:p>
-            <a:r>
-              <a:rPr lang="en-GB" dirty="0"/>
-              <a:t>Lattice Object</a:t>
-            </a:r>
-          </a:p>
-          <a:p>
-            <a:pPr lvl="1"/>
-            <a:r>
-              <a:rPr lang="en-GB" dirty="0"/>
-              <a:t>Stores: element objects in Matrix or Dictionaries format</a:t>
-            </a:r>
-          </a:p>
-        </p:txBody>
-      </p:sp>
-      <p:sp>
-        <p:nvSpPr>
-          <p:cNvPr id="5" name="Tijdelijke aanduiding voor inhoud 2">
-            <a:extLst>
-              <a:ext uri="{FF2B5EF4-FFF2-40B4-BE49-F238E27FC236}">
-                <a16:creationId xmlns:a16="http://schemas.microsoft.com/office/drawing/2014/main" id="{27ADD09B-7A82-4A58-A517-163996F1954A}"/>
-              </a:ext>
-            </a:extLst>
-          </p:cNvPr>
-          <p:cNvSpPr txBox="1">
-            <a:spLocks/>
-          </p:cNvSpPr>
-          <p:nvPr/>
-        </p:nvSpPr>
-        <p:spPr>
-          <a:xfrm>
-            <a:off x="838200" y="3559997"/>
-            <a:ext cx="5181600" cy="1492928"/>
-          </a:xfrm>
-          <a:prstGeom prst="rect">
-            <a:avLst/>
-          </a:prstGeom>
-        </p:spPr>
-        <p:txBody>
-          <a:bodyPr vert="horz" lIns="91440" tIns="45720" rIns="91440" bIns="45720" rtlCol="0">
-            <a:normAutofit/>
-          </a:bodyPr>
-          <a:lstStyle>
-            <a:lvl1pPr marL="228600" indent="-228600" algn="l" defTabSz="914400" rtl="0" eaLnBrk="1" latinLnBrk="0" hangingPunct="1">
-              <a:lnSpc>
-                <a:spcPct val="90000"/>
-              </a:lnSpc>
-              <a:spcBef>
-                <a:spcPts val="1000"/>
-              </a:spcBef>
-              <a:buFont typeface="Arial" panose="020B0604020202020204" pitchFamily="34" charset="0"/>
-              <a:buChar char="•"/>
-              <a:defRPr sz="2800" kern="1200">
-                <a:solidFill>
-                  <a:schemeClr val="tx1"/>
-                </a:solidFill>
-                <a:latin typeface="+mn-lt"/>
-                <a:ea typeface="+mn-ea"/>
-                <a:cs typeface="+mn-cs"/>
-              </a:defRPr>
-            </a:lvl1pPr>
-            <a:lvl2pPr marL="685800" indent="-228600" algn="l" defTabSz="914400" rtl="0" eaLnBrk="1" latinLnBrk="0" hangingPunct="1">
-              <a:lnSpc>
-                <a:spcPct val="90000"/>
-              </a:lnSpc>
-              <a:spcBef>
-                <a:spcPts val="500"/>
-              </a:spcBef>
-              <a:buFont typeface="Arial" panose="020B0604020202020204" pitchFamily="34" charset="0"/>
-              <a:buChar char="•"/>
-              <a:defRPr sz="2400" kern="1200">
-                <a:solidFill>
-                  <a:schemeClr val="tx1"/>
-                </a:solidFill>
-                <a:latin typeface="+mn-lt"/>
-                <a:ea typeface="+mn-ea"/>
-                <a:cs typeface="+mn-cs"/>
-              </a:defRPr>
-            </a:lvl2pPr>
-            <a:lvl3pPr marL="1143000" indent="-228600" algn="l" defTabSz="914400" rtl="0" eaLnBrk="1" latinLnBrk="0" hangingPunct="1">
-              <a:lnSpc>
-                <a:spcPct val="90000"/>
-              </a:lnSpc>
-              <a:spcBef>
-                <a:spcPts val="500"/>
-              </a:spcBef>
-              <a:buFont typeface="Arial" panose="020B0604020202020204" pitchFamily="34" charset="0"/>
-              <a:buChar char="•"/>
-              <a:defRPr sz="2000" kern="1200">
-                <a:solidFill>
-                  <a:schemeClr val="tx1"/>
-                </a:solidFill>
-                <a:latin typeface="+mn-lt"/>
-                <a:ea typeface="+mn-ea"/>
-                <a:cs typeface="+mn-cs"/>
-              </a:defRPr>
-            </a:lvl3pPr>
-            <a:lvl4pPr marL="1600200" indent="-228600" algn="l" defTabSz="914400" rtl="0" eaLnBrk="1" latinLnBrk="0" hangingPunct="1">
-              <a:lnSpc>
-                <a:spcPct val="90000"/>
-              </a:lnSpc>
-              <a:spcBef>
-                <a:spcPts val="500"/>
-              </a:spcBef>
-              <a:buFont typeface="Arial" panose="020B0604020202020204" pitchFamily="34" charset="0"/>
-              <a:buChar char="•"/>
-              <a:defRPr sz="1800" kern="1200">
-                <a:solidFill>
-                  <a:schemeClr val="tx1"/>
-                </a:solidFill>
-                <a:latin typeface="+mn-lt"/>
-                <a:ea typeface="+mn-ea"/>
-                <a:cs typeface="+mn-cs"/>
-              </a:defRPr>
-            </a:lvl4pPr>
-            <a:lvl5pPr marL="2057400" indent="-228600" algn="l" defTabSz="914400" rtl="0" eaLnBrk="1" latinLnBrk="0" hangingPunct="1">
-              <a:lnSpc>
-                <a:spcPct val="90000"/>
-              </a:lnSpc>
-              <a:spcBef>
-                <a:spcPts val="500"/>
-              </a:spcBef>
-              <a:buFont typeface="Arial" panose="020B0604020202020204" pitchFamily="34" charset="0"/>
-              <a:buChar char="•"/>
-              <a:defRPr sz="1800" kern="1200">
-                <a:solidFill>
-                  <a:schemeClr val="tx1"/>
-                </a:solidFill>
-                <a:latin typeface="+mn-lt"/>
-                <a:ea typeface="+mn-ea"/>
-                <a:cs typeface="+mn-cs"/>
-              </a:defRPr>
-            </a:lvl5pPr>
-            <a:lvl6pPr marL="2514600" indent="-228600" algn="l" defTabSz="914400" rtl="0" eaLnBrk="1" latinLnBrk="0" hangingPunct="1">
-              <a:lnSpc>
-                <a:spcPct val="90000"/>
-              </a:lnSpc>
-              <a:spcBef>
-                <a:spcPts val="500"/>
-              </a:spcBef>
-              <a:buFont typeface="Arial" panose="020B0604020202020204" pitchFamily="34" charset="0"/>
-              <a:buChar char="•"/>
-              <a:defRPr sz="1800" kern="1200">
-                <a:solidFill>
-                  <a:schemeClr val="tx1"/>
-                </a:solidFill>
-                <a:latin typeface="+mn-lt"/>
-                <a:ea typeface="+mn-ea"/>
-                <a:cs typeface="+mn-cs"/>
-              </a:defRPr>
-            </a:lvl6pPr>
-            <a:lvl7pPr marL="2971800" indent="-228600" algn="l" defTabSz="914400" rtl="0" eaLnBrk="1" latinLnBrk="0" hangingPunct="1">
-              <a:lnSpc>
-                <a:spcPct val="90000"/>
-              </a:lnSpc>
-              <a:spcBef>
-                <a:spcPts val="500"/>
-              </a:spcBef>
-              <a:buFont typeface="Arial" panose="020B0604020202020204" pitchFamily="34" charset="0"/>
-              <a:buChar char="•"/>
-              <a:defRPr sz="1800" kern="1200">
-                <a:solidFill>
-                  <a:schemeClr val="tx1"/>
-                </a:solidFill>
-                <a:latin typeface="+mn-lt"/>
-                <a:ea typeface="+mn-ea"/>
-                <a:cs typeface="+mn-cs"/>
-              </a:defRPr>
-            </a:lvl7pPr>
-            <a:lvl8pPr marL="3429000" indent="-228600" algn="l" defTabSz="914400" rtl="0" eaLnBrk="1" latinLnBrk="0" hangingPunct="1">
-              <a:lnSpc>
-                <a:spcPct val="90000"/>
-              </a:lnSpc>
-              <a:spcBef>
-                <a:spcPts val="500"/>
-              </a:spcBef>
-              <a:buFont typeface="Arial" panose="020B0604020202020204" pitchFamily="34" charset="0"/>
-              <a:buChar char="•"/>
-              <a:defRPr sz="1800" kern="1200">
-                <a:solidFill>
-                  <a:schemeClr val="tx1"/>
-                </a:solidFill>
-                <a:latin typeface="+mn-lt"/>
-                <a:ea typeface="+mn-ea"/>
-                <a:cs typeface="+mn-cs"/>
-              </a:defRPr>
-            </a:lvl8pPr>
-            <a:lvl9pPr marL="3886200" indent="-228600" algn="l" defTabSz="914400" rtl="0" eaLnBrk="1" latinLnBrk="0" hangingPunct="1">
-              <a:lnSpc>
-                <a:spcPct val="90000"/>
-              </a:lnSpc>
-              <a:spcBef>
-                <a:spcPts val="500"/>
-              </a:spcBef>
-              <a:buFont typeface="Arial" panose="020B0604020202020204" pitchFamily="34" charset="0"/>
-              <a:buChar char="•"/>
-              <a:defRPr sz="1800" kern="1200">
-                <a:solidFill>
-                  <a:schemeClr val="tx1"/>
-                </a:solidFill>
-                <a:latin typeface="+mn-lt"/>
-                <a:ea typeface="+mn-ea"/>
-                <a:cs typeface="+mn-cs"/>
-              </a:defRPr>
-            </a:lvl9pPr>
-          </a:lstStyle>
-          <a:p>
-            <a:r>
-              <a:rPr lang="en-GB" dirty="0"/>
-              <a:t>Dictionaries</a:t>
-            </a:r>
-          </a:p>
-          <a:p>
-            <a:pPr lvl="1"/>
-            <a:r>
-              <a:rPr lang="en-GB" dirty="0"/>
-              <a:t>Use of dictionaries to store element objects.</a:t>
-            </a:r>
-          </a:p>
-        </p:txBody>
-      </p:sp>
-      <p:sp>
-        <p:nvSpPr>
-          <p:cNvPr id="6" name="Tijdelijke aanduiding voor inhoud 3">
-            <a:extLst>
-              <a:ext uri="{FF2B5EF4-FFF2-40B4-BE49-F238E27FC236}">
-                <a16:creationId xmlns:a16="http://schemas.microsoft.com/office/drawing/2014/main" id="{CBB90616-AF52-4DE6-8AAD-E1464E7B07B5}"/>
-              </a:ext>
-            </a:extLst>
-          </p:cNvPr>
-          <p:cNvSpPr txBox="1">
-            <a:spLocks/>
-          </p:cNvSpPr>
-          <p:nvPr/>
-        </p:nvSpPr>
-        <p:spPr>
-          <a:xfrm>
-            <a:off x="6172200" y="3559997"/>
-            <a:ext cx="5181600" cy="1492928"/>
-          </a:xfrm>
-          <a:prstGeom prst="rect">
-            <a:avLst/>
-          </a:prstGeom>
-        </p:spPr>
-        <p:txBody>
-          <a:bodyPr vert="horz" lIns="91440" tIns="45720" rIns="91440" bIns="45720" rtlCol="0">
-            <a:normAutofit/>
-          </a:bodyPr>
-          <a:lstStyle>
-            <a:lvl1pPr marL="228600" indent="-228600" algn="l" defTabSz="914400" rtl="0" eaLnBrk="1" latinLnBrk="0" hangingPunct="1">
-              <a:lnSpc>
-                <a:spcPct val="90000"/>
-              </a:lnSpc>
-              <a:spcBef>
-                <a:spcPts val="1000"/>
-              </a:spcBef>
-              <a:buFont typeface="Arial" panose="020B0604020202020204" pitchFamily="34" charset="0"/>
-              <a:buChar char="•"/>
-              <a:defRPr sz="2800" kern="1200">
-                <a:solidFill>
-                  <a:schemeClr val="tx1"/>
-                </a:solidFill>
-                <a:latin typeface="+mn-lt"/>
-                <a:ea typeface="+mn-ea"/>
-                <a:cs typeface="+mn-cs"/>
-              </a:defRPr>
-            </a:lvl1pPr>
-            <a:lvl2pPr marL="685800" indent="-228600" algn="l" defTabSz="914400" rtl="0" eaLnBrk="1" latinLnBrk="0" hangingPunct="1">
-              <a:lnSpc>
-                <a:spcPct val="90000"/>
-              </a:lnSpc>
-              <a:spcBef>
-                <a:spcPts val="500"/>
-              </a:spcBef>
-              <a:buFont typeface="Arial" panose="020B0604020202020204" pitchFamily="34" charset="0"/>
-              <a:buChar char="•"/>
-              <a:defRPr sz="2400" kern="1200">
-                <a:solidFill>
-                  <a:schemeClr val="tx1"/>
-                </a:solidFill>
-                <a:latin typeface="+mn-lt"/>
-                <a:ea typeface="+mn-ea"/>
-                <a:cs typeface="+mn-cs"/>
-              </a:defRPr>
-            </a:lvl2pPr>
-            <a:lvl3pPr marL="1143000" indent="-228600" algn="l" defTabSz="914400" rtl="0" eaLnBrk="1" latinLnBrk="0" hangingPunct="1">
-              <a:lnSpc>
-                <a:spcPct val="90000"/>
-              </a:lnSpc>
-              <a:spcBef>
-                <a:spcPts val="500"/>
-              </a:spcBef>
-              <a:buFont typeface="Arial" panose="020B0604020202020204" pitchFamily="34" charset="0"/>
-              <a:buChar char="•"/>
-              <a:defRPr sz="2000" kern="1200">
-                <a:solidFill>
-                  <a:schemeClr val="tx1"/>
-                </a:solidFill>
-                <a:latin typeface="+mn-lt"/>
-                <a:ea typeface="+mn-ea"/>
-                <a:cs typeface="+mn-cs"/>
-              </a:defRPr>
-            </a:lvl3pPr>
-            <a:lvl4pPr marL="1600200" indent="-228600" algn="l" defTabSz="914400" rtl="0" eaLnBrk="1" latinLnBrk="0" hangingPunct="1">
-              <a:lnSpc>
-                <a:spcPct val="90000"/>
-              </a:lnSpc>
-              <a:spcBef>
-                <a:spcPts val="500"/>
-              </a:spcBef>
-              <a:buFont typeface="Arial" panose="020B0604020202020204" pitchFamily="34" charset="0"/>
-              <a:buChar char="•"/>
-              <a:defRPr sz="1800" kern="1200">
-                <a:solidFill>
-                  <a:schemeClr val="tx1"/>
-                </a:solidFill>
-                <a:latin typeface="+mn-lt"/>
-                <a:ea typeface="+mn-ea"/>
-                <a:cs typeface="+mn-cs"/>
-              </a:defRPr>
-            </a:lvl4pPr>
-            <a:lvl5pPr marL="2057400" indent="-228600" algn="l" defTabSz="914400" rtl="0" eaLnBrk="1" latinLnBrk="0" hangingPunct="1">
-              <a:lnSpc>
-                <a:spcPct val="90000"/>
-              </a:lnSpc>
-              <a:spcBef>
-                <a:spcPts val="500"/>
-              </a:spcBef>
-              <a:buFont typeface="Arial" panose="020B0604020202020204" pitchFamily="34" charset="0"/>
-              <a:buChar char="•"/>
-              <a:defRPr sz="1800" kern="1200">
-                <a:solidFill>
-                  <a:schemeClr val="tx1"/>
-                </a:solidFill>
-                <a:latin typeface="+mn-lt"/>
-                <a:ea typeface="+mn-ea"/>
-                <a:cs typeface="+mn-cs"/>
-              </a:defRPr>
-            </a:lvl5pPr>
-            <a:lvl6pPr marL="2514600" indent="-228600" algn="l" defTabSz="914400" rtl="0" eaLnBrk="1" latinLnBrk="0" hangingPunct="1">
-              <a:lnSpc>
-                <a:spcPct val="90000"/>
-              </a:lnSpc>
-              <a:spcBef>
-                <a:spcPts val="500"/>
-              </a:spcBef>
-              <a:buFont typeface="Arial" panose="020B0604020202020204" pitchFamily="34" charset="0"/>
-              <a:buChar char="•"/>
-              <a:defRPr sz="1800" kern="1200">
-                <a:solidFill>
-                  <a:schemeClr val="tx1"/>
-                </a:solidFill>
-                <a:latin typeface="+mn-lt"/>
-                <a:ea typeface="+mn-ea"/>
-                <a:cs typeface="+mn-cs"/>
-              </a:defRPr>
-            </a:lvl6pPr>
-            <a:lvl7pPr marL="2971800" indent="-228600" algn="l" defTabSz="914400" rtl="0" eaLnBrk="1" latinLnBrk="0" hangingPunct="1">
-              <a:lnSpc>
-                <a:spcPct val="90000"/>
-              </a:lnSpc>
-              <a:spcBef>
-                <a:spcPts val="500"/>
-              </a:spcBef>
-              <a:buFont typeface="Arial" panose="020B0604020202020204" pitchFamily="34" charset="0"/>
-              <a:buChar char="•"/>
-              <a:defRPr sz="1800" kern="1200">
-                <a:solidFill>
-                  <a:schemeClr val="tx1"/>
-                </a:solidFill>
-                <a:latin typeface="+mn-lt"/>
-                <a:ea typeface="+mn-ea"/>
-                <a:cs typeface="+mn-cs"/>
-              </a:defRPr>
-            </a:lvl7pPr>
-            <a:lvl8pPr marL="3429000" indent="-228600" algn="l" defTabSz="914400" rtl="0" eaLnBrk="1" latinLnBrk="0" hangingPunct="1">
-              <a:lnSpc>
-                <a:spcPct val="90000"/>
-              </a:lnSpc>
-              <a:spcBef>
-                <a:spcPts val="500"/>
-              </a:spcBef>
-              <a:buFont typeface="Arial" panose="020B0604020202020204" pitchFamily="34" charset="0"/>
-              <a:buChar char="•"/>
-              <a:defRPr sz="1800" kern="1200">
-                <a:solidFill>
-                  <a:schemeClr val="tx1"/>
-                </a:solidFill>
-                <a:latin typeface="+mn-lt"/>
-                <a:ea typeface="+mn-ea"/>
-                <a:cs typeface="+mn-cs"/>
-              </a:defRPr>
-            </a:lvl8pPr>
-            <a:lvl9pPr marL="3886200" indent="-228600" algn="l" defTabSz="914400" rtl="0" eaLnBrk="1" latinLnBrk="0" hangingPunct="1">
-              <a:lnSpc>
-                <a:spcPct val="90000"/>
-              </a:lnSpc>
-              <a:spcBef>
-                <a:spcPts val="500"/>
-              </a:spcBef>
-              <a:buFont typeface="Arial" panose="020B0604020202020204" pitchFamily="34" charset="0"/>
-              <a:buChar char="•"/>
-              <a:defRPr sz="1800" kern="1200">
-                <a:solidFill>
-                  <a:schemeClr val="tx1"/>
-                </a:solidFill>
-                <a:latin typeface="+mn-lt"/>
-                <a:ea typeface="+mn-ea"/>
-                <a:cs typeface="+mn-cs"/>
-              </a:defRPr>
-            </a:lvl9pPr>
-          </a:lstStyle>
-          <a:p>
-            <a:r>
-              <a:rPr lang="en-GB" dirty="0"/>
-              <a:t>Matrixes (2D or 3D grid)</a:t>
-            </a:r>
-          </a:p>
-          <a:p>
-            <a:pPr lvl="1"/>
-            <a:r>
-              <a:rPr lang="en-GB" dirty="0"/>
-              <a:t>Use of a matrix to store element objects.</a:t>
-            </a:r>
-          </a:p>
-        </p:txBody>
-      </p:sp>
-      <p:sp>
-        <p:nvSpPr>
-          <p:cNvPr id="7" name="Tijdelijke aanduiding voor inhoud 2">
-            <a:extLst>
-              <a:ext uri="{FF2B5EF4-FFF2-40B4-BE49-F238E27FC236}">
-                <a16:creationId xmlns:a16="http://schemas.microsoft.com/office/drawing/2014/main" id="{96DECC56-88C1-468C-B3A2-4AFC76F77D3A}"/>
-              </a:ext>
-            </a:extLst>
-          </p:cNvPr>
-          <p:cNvSpPr txBox="1">
-            <a:spLocks/>
-          </p:cNvSpPr>
-          <p:nvPr/>
-        </p:nvSpPr>
-        <p:spPr>
-          <a:xfrm>
-            <a:off x="2831335" y="5618601"/>
-            <a:ext cx="6039998" cy="948997"/>
-          </a:xfrm>
-          <a:prstGeom prst="rect">
-            <a:avLst/>
-          </a:prstGeom>
-        </p:spPr>
-        <p:txBody>
-          <a:bodyPr vert="horz" lIns="91440" tIns="45720" rIns="91440" bIns="45720" rtlCol="0">
-            <a:normAutofit/>
-          </a:bodyPr>
-          <a:lstStyle>
-            <a:lvl1pPr marL="228600" indent="-228600" algn="l" defTabSz="914400" rtl="0" eaLnBrk="1" latinLnBrk="0" hangingPunct="1">
-              <a:lnSpc>
-                <a:spcPct val="90000"/>
-              </a:lnSpc>
-              <a:spcBef>
-                <a:spcPts val="1000"/>
-              </a:spcBef>
-              <a:buFont typeface="Arial" panose="020B0604020202020204" pitchFamily="34" charset="0"/>
-              <a:buChar char="•"/>
-              <a:defRPr sz="2800" kern="1200">
-                <a:solidFill>
-                  <a:schemeClr val="tx1"/>
-                </a:solidFill>
-                <a:latin typeface="+mn-lt"/>
-                <a:ea typeface="+mn-ea"/>
-                <a:cs typeface="+mn-cs"/>
-              </a:defRPr>
-            </a:lvl1pPr>
-            <a:lvl2pPr marL="685800" indent="-228600" algn="l" defTabSz="914400" rtl="0" eaLnBrk="1" latinLnBrk="0" hangingPunct="1">
-              <a:lnSpc>
-                <a:spcPct val="90000"/>
-              </a:lnSpc>
-              <a:spcBef>
-                <a:spcPts val="500"/>
-              </a:spcBef>
-              <a:buFont typeface="Arial" panose="020B0604020202020204" pitchFamily="34" charset="0"/>
-              <a:buChar char="•"/>
-              <a:defRPr sz="2400" kern="1200">
-                <a:solidFill>
-                  <a:schemeClr val="tx1"/>
-                </a:solidFill>
-                <a:latin typeface="+mn-lt"/>
-                <a:ea typeface="+mn-ea"/>
-                <a:cs typeface="+mn-cs"/>
-              </a:defRPr>
-            </a:lvl2pPr>
-            <a:lvl3pPr marL="1143000" indent="-228600" algn="l" defTabSz="914400" rtl="0" eaLnBrk="1" latinLnBrk="0" hangingPunct="1">
-              <a:lnSpc>
-                <a:spcPct val="90000"/>
-              </a:lnSpc>
-              <a:spcBef>
-                <a:spcPts val="500"/>
-              </a:spcBef>
-              <a:buFont typeface="Arial" panose="020B0604020202020204" pitchFamily="34" charset="0"/>
-              <a:buChar char="•"/>
-              <a:defRPr sz="2000" kern="1200">
-                <a:solidFill>
-                  <a:schemeClr val="tx1"/>
-                </a:solidFill>
-                <a:latin typeface="+mn-lt"/>
-                <a:ea typeface="+mn-ea"/>
-                <a:cs typeface="+mn-cs"/>
-              </a:defRPr>
-            </a:lvl3pPr>
-            <a:lvl4pPr marL="1600200" indent="-228600" algn="l" defTabSz="914400" rtl="0" eaLnBrk="1" latinLnBrk="0" hangingPunct="1">
-              <a:lnSpc>
-                <a:spcPct val="90000"/>
-              </a:lnSpc>
-              <a:spcBef>
-                <a:spcPts val="500"/>
-              </a:spcBef>
-              <a:buFont typeface="Arial" panose="020B0604020202020204" pitchFamily="34" charset="0"/>
-              <a:buChar char="•"/>
-              <a:defRPr sz="1800" kern="1200">
-                <a:solidFill>
-                  <a:schemeClr val="tx1"/>
-                </a:solidFill>
-                <a:latin typeface="+mn-lt"/>
-                <a:ea typeface="+mn-ea"/>
-                <a:cs typeface="+mn-cs"/>
-              </a:defRPr>
-            </a:lvl4pPr>
-            <a:lvl5pPr marL="2057400" indent="-228600" algn="l" defTabSz="914400" rtl="0" eaLnBrk="1" latinLnBrk="0" hangingPunct="1">
-              <a:lnSpc>
-                <a:spcPct val="90000"/>
-              </a:lnSpc>
-              <a:spcBef>
-                <a:spcPts val="500"/>
-              </a:spcBef>
-              <a:buFont typeface="Arial" panose="020B0604020202020204" pitchFamily="34" charset="0"/>
-              <a:buChar char="•"/>
-              <a:defRPr sz="1800" kern="1200">
-                <a:solidFill>
-                  <a:schemeClr val="tx1"/>
-                </a:solidFill>
-                <a:latin typeface="+mn-lt"/>
-                <a:ea typeface="+mn-ea"/>
-                <a:cs typeface="+mn-cs"/>
-              </a:defRPr>
-            </a:lvl5pPr>
-            <a:lvl6pPr marL="2514600" indent="-228600" algn="l" defTabSz="914400" rtl="0" eaLnBrk="1" latinLnBrk="0" hangingPunct="1">
-              <a:lnSpc>
-                <a:spcPct val="90000"/>
-              </a:lnSpc>
-              <a:spcBef>
-                <a:spcPts val="500"/>
-              </a:spcBef>
-              <a:buFont typeface="Arial" panose="020B0604020202020204" pitchFamily="34" charset="0"/>
-              <a:buChar char="•"/>
-              <a:defRPr sz="1800" kern="1200">
-                <a:solidFill>
-                  <a:schemeClr val="tx1"/>
-                </a:solidFill>
-                <a:latin typeface="+mn-lt"/>
-                <a:ea typeface="+mn-ea"/>
-                <a:cs typeface="+mn-cs"/>
-              </a:defRPr>
-            </a:lvl6pPr>
-            <a:lvl7pPr marL="2971800" indent="-228600" algn="l" defTabSz="914400" rtl="0" eaLnBrk="1" latinLnBrk="0" hangingPunct="1">
-              <a:lnSpc>
-                <a:spcPct val="90000"/>
-              </a:lnSpc>
-              <a:spcBef>
-                <a:spcPts val="500"/>
-              </a:spcBef>
-              <a:buFont typeface="Arial" panose="020B0604020202020204" pitchFamily="34" charset="0"/>
-              <a:buChar char="•"/>
-              <a:defRPr sz="1800" kern="1200">
-                <a:solidFill>
-                  <a:schemeClr val="tx1"/>
-                </a:solidFill>
-                <a:latin typeface="+mn-lt"/>
-                <a:ea typeface="+mn-ea"/>
-                <a:cs typeface="+mn-cs"/>
-              </a:defRPr>
-            </a:lvl7pPr>
-            <a:lvl8pPr marL="3429000" indent="-228600" algn="l" defTabSz="914400" rtl="0" eaLnBrk="1" latinLnBrk="0" hangingPunct="1">
-              <a:lnSpc>
-                <a:spcPct val="90000"/>
-              </a:lnSpc>
-              <a:spcBef>
-                <a:spcPts val="500"/>
-              </a:spcBef>
-              <a:buFont typeface="Arial" panose="020B0604020202020204" pitchFamily="34" charset="0"/>
-              <a:buChar char="•"/>
-              <a:defRPr sz="1800" kern="1200">
-                <a:solidFill>
-                  <a:schemeClr val="tx1"/>
-                </a:solidFill>
-                <a:latin typeface="+mn-lt"/>
-                <a:ea typeface="+mn-ea"/>
-                <a:cs typeface="+mn-cs"/>
-              </a:defRPr>
-            </a:lvl8pPr>
-            <a:lvl9pPr marL="3886200" indent="-228600" algn="l" defTabSz="914400" rtl="0" eaLnBrk="1" latinLnBrk="0" hangingPunct="1">
-              <a:lnSpc>
-                <a:spcPct val="90000"/>
-              </a:lnSpc>
-              <a:spcBef>
-                <a:spcPts val="500"/>
-              </a:spcBef>
-              <a:buFont typeface="Arial" panose="020B0604020202020204" pitchFamily="34" charset="0"/>
-              <a:buChar char="•"/>
-              <a:defRPr sz="1800" kern="1200">
-                <a:solidFill>
-                  <a:schemeClr val="tx1"/>
-                </a:solidFill>
-                <a:latin typeface="+mn-lt"/>
-                <a:ea typeface="+mn-ea"/>
-                <a:cs typeface="+mn-cs"/>
-              </a:defRPr>
-            </a:lvl9pPr>
-          </a:lstStyle>
-          <a:p>
-            <a:pPr marL="0" indent="0">
-              <a:buNone/>
-            </a:pPr>
-            <a:r>
-              <a:rPr lang="nl-NL" dirty="0"/>
-              <a:t>Question: </a:t>
-            </a:r>
-            <a:r>
-              <a:rPr lang="nl-NL" dirty="0" err="1"/>
-              <a:t>which</a:t>
-            </a:r>
-            <a:r>
-              <a:rPr lang="nl-NL" dirty="0"/>
-              <a:t> data </a:t>
-            </a:r>
-            <a:r>
-              <a:rPr lang="nl-NL" dirty="0" err="1"/>
-              <a:t>structure</a:t>
-            </a:r>
-            <a:r>
-              <a:rPr lang="nl-NL" dirty="0"/>
-              <a:t> is </a:t>
-            </a:r>
-            <a:r>
-              <a:rPr lang="nl-NL" dirty="0" err="1"/>
-              <a:t>faster</a:t>
-            </a:r>
-            <a:r>
-              <a:rPr lang="nl-NL" dirty="0"/>
-              <a:t>?</a:t>
-            </a:r>
-            <a:endParaRPr lang="en-GB" dirty="0"/>
-          </a:p>
-        </p:txBody>
-      </p:sp>
-      <p:sp>
-        <p:nvSpPr>
-          <p:cNvPr id="8" name="Tijdelijke aanduiding voor dianummer 7">
-            <a:extLst>
-              <a:ext uri="{FF2B5EF4-FFF2-40B4-BE49-F238E27FC236}">
-                <a16:creationId xmlns:a16="http://schemas.microsoft.com/office/drawing/2014/main" id="{DFF791AE-E5A2-464C-AEA5-4D1F81127049}"/>
-              </a:ext>
-            </a:extLst>
-          </p:cNvPr>
-          <p:cNvSpPr>
-            <a:spLocks noGrp="1"/>
-          </p:cNvSpPr>
-          <p:nvPr>
-            <p:ph type="sldNum" sz="quarter" idx="12"/>
-          </p:nvPr>
-        </p:nvSpPr>
-        <p:spPr/>
-        <p:txBody>
-          <a:bodyPr/>
-          <a:lstStyle/>
-          <a:p>
-            <a:fld id="{D1892F8F-5571-E246-B053-E27A62D47BEF}" type="slidenum">
-              <a:rPr lang="en-GB" smtClean="0"/>
-              <a:t>6</a:t>
-            </a:fld>
-            <a:endParaRPr lang="en-GB"/>
-          </a:p>
-        </p:txBody>
-      </p:sp>
-    </p:spTree>
-    <p:extLst>
-      <p:ext uri="{BB962C8B-B14F-4D97-AF65-F5344CB8AC3E}">
-        <p14:creationId xmlns:p14="http://schemas.microsoft.com/office/powerpoint/2010/main" val="2537418944"/>
-      </p:ext>
-    </p:extLst>
-  </p:cSld>
-  <p:clrMapOvr>
-    <a:masterClrMapping/>
-  </p:clrMapOvr>
-  <p:timing>
-    <p:tnLst>
-      <p:par>
-        <p:cTn id="1" dur="indefinite" restart="never" nodeType="tmRoot">
-          <p:childTnLst>
-            <p:seq concurrent="1" nextAc="seek">
-              <p:cTn id="2" dur="indefinite" nodeType="mainSeq">
-                <p:childTnLst>
-                  <p:par>
-                    <p:cTn id="3" fill="hold">
-                      <p:stCondLst>
-                        <p:cond delay="indefinite"/>
-                      </p:stCondLst>
-                      <p:childTnLst>
-                        <p:par>
-                          <p:cTn id="4" fill="hold">
-                            <p:stCondLst>
-                              <p:cond delay="0"/>
-                            </p:stCondLst>
-                            <p:childTnLst>
-                              <p:par>
-                                <p:cTn id="5" presetID="1" presetClass="entr" presetSubtype="0" fill="hold" grpId="0" nodeType="clickEffect">
-                                  <p:stCondLst>
-                                    <p:cond delay="0"/>
-                                  </p:stCondLst>
-                                  <p:childTnLst>
-                                    <p:set>
-                                      <p:cBhvr>
-                                        <p:cTn id="6" dur="1" fill="hold">
-                                          <p:stCondLst>
-                                            <p:cond delay="0"/>
-                                          </p:stCondLst>
-                                        </p:cTn>
-                                        <p:tgtEl>
-                                          <p:spTgt spid="3">
-                                            <p:txEl>
-                                              <p:pRg st="0" end="0"/>
-                                            </p:txEl>
-                                          </p:spTgt>
-                                        </p:tgtEl>
-                                        <p:attrNameLst>
-                                          <p:attrName>style.visibility</p:attrName>
-                                        </p:attrNameLst>
-                                      </p:cBhvr>
-                                      <p:to>
-                                        <p:strVal val="visible"/>
-                                      </p:to>
-                                    </p:set>
-                                  </p:childTnLst>
-                                </p:cTn>
-                              </p:par>
-                              <p:par>
-                                <p:cTn id="7" presetID="1" presetClass="entr" presetSubtype="0" fill="hold" grpId="0" nodeType="withEffect">
-                                  <p:stCondLst>
-                                    <p:cond delay="0"/>
-                                  </p:stCondLst>
-                                  <p:childTnLst>
-                                    <p:set>
-                                      <p:cBhvr>
-                                        <p:cTn id="8" dur="1" fill="hold">
-                                          <p:stCondLst>
-                                            <p:cond delay="0"/>
-                                          </p:stCondLst>
-                                        </p:cTn>
-                                        <p:tgtEl>
-                                          <p:spTgt spid="3">
-                                            <p:txEl>
-                                              <p:pRg st="1" end="1"/>
-                                            </p:txEl>
-                                          </p:spTgt>
-                                        </p:tgtEl>
-                                        <p:attrNameLst>
-                                          <p:attrName>style.visibility</p:attrName>
-                                        </p:attrNameLst>
-                                      </p:cBhvr>
-                                      <p:to>
-                                        <p:strVal val="visible"/>
-                                      </p:to>
-                                    </p:set>
-                                  </p:childTnLst>
-                                </p:cTn>
-                              </p:par>
-                              <p:par>
-                                <p:cTn id="9" presetID="1" presetClass="entr" presetSubtype="0" fill="hold" grpId="0" nodeType="withEffect">
-                                  <p:stCondLst>
-                                    <p:cond delay="0"/>
-                                  </p:stCondLst>
-                                  <p:childTnLst>
-                                    <p:set>
-                                      <p:cBhvr>
-                                        <p:cTn id="10" dur="1" fill="hold">
-                                          <p:stCondLst>
-                                            <p:cond delay="0"/>
-                                          </p:stCondLst>
-                                        </p:cTn>
-                                        <p:tgtEl>
-                                          <p:spTgt spid="4">
-                                            <p:txEl>
-                                              <p:pRg st="0" end="0"/>
-                                            </p:txEl>
-                                          </p:spTgt>
-                                        </p:tgtEl>
-                                        <p:attrNameLst>
-                                          <p:attrName>style.visibility</p:attrName>
-                                        </p:attrNameLst>
-                                      </p:cBhvr>
-                                      <p:to>
-                                        <p:strVal val="visible"/>
-                                      </p:to>
-                                    </p:set>
-                                  </p:childTnLst>
-                                </p:cTn>
-                              </p:par>
-                              <p:par>
-                                <p:cTn id="11" presetID="1" presetClass="entr" presetSubtype="0" fill="hold" grpId="0" nodeType="withEffect">
-                                  <p:stCondLst>
-                                    <p:cond delay="0"/>
-                                  </p:stCondLst>
-                                  <p:childTnLst>
-                                    <p:set>
-                                      <p:cBhvr>
-                                        <p:cTn id="12" dur="1" fill="hold">
-                                          <p:stCondLst>
-                                            <p:cond delay="0"/>
-                                          </p:stCondLst>
-                                        </p:cTn>
-                                        <p:tgtEl>
-                                          <p:spTgt spid="4">
-                                            <p:txEl>
-                                              <p:pRg st="1" end="1"/>
-                                            </p:txEl>
-                                          </p:spTgt>
-                                        </p:tgtEl>
-                                        <p:attrNameLst>
-                                          <p:attrName>style.visibility</p:attrName>
-                                        </p:attrNameLst>
-                                      </p:cBhvr>
-                                      <p:to>
-                                        <p:strVal val="visible"/>
-                                      </p:to>
-                                    </p:set>
-                                  </p:childTnLst>
-                                </p:cTn>
-                              </p:par>
-                            </p:childTnLst>
-                          </p:cTn>
-                        </p:par>
-                      </p:childTnLst>
-                    </p:cTn>
-                  </p:par>
-                  <p:par>
-                    <p:cTn id="13" fill="hold">
-                      <p:stCondLst>
-                        <p:cond delay="indefinite"/>
-                      </p:stCondLst>
-                      <p:childTnLst>
-                        <p:par>
-                          <p:cTn id="14" fill="hold">
-                            <p:stCondLst>
-                              <p:cond delay="0"/>
-                            </p:stCondLst>
-                            <p:childTnLst>
-                              <p:par>
-                                <p:cTn id="15" presetID="1" presetClass="entr" presetSubtype="0" fill="hold" grpId="0" nodeType="clickEffect">
-                                  <p:stCondLst>
-                                    <p:cond delay="0"/>
-                                  </p:stCondLst>
-                                  <p:childTnLst>
-                                    <p:set>
-                                      <p:cBhvr>
-                                        <p:cTn id="16" dur="1" fill="hold">
-                                          <p:stCondLst>
-                                            <p:cond delay="0"/>
-                                          </p:stCondLst>
-                                        </p:cTn>
-                                        <p:tgtEl>
-                                          <p:spTgt spid="5"/>
-                                        </p:tgtEl>
-                                        <p:attrNameLst>
-                                          <p:attrName>style.visibility</p:attrName>
-                                        </p:attrNameLst>
-                                      </p:cBhvr>
-                                      <p:to>
-                                        <p:strVal val="visible"/>
-                                      </p:to>
-                                    </p:set>
-                                  </p:childTnLst>
-                                </p:cTn>
-                              </p:par>
-                              <p:par>
-                                <p:cTn id="17" presetID="1" presetClass="entr" presetSubtype="0" fill="hold" grpId="0" nodeType="withEffect">
-                                  <p:stCondLst>
-                                    <p:cond delay="0"/>
-                                  </p:stCondLst>
-                                  <p:childTnLst>
-                                    <p:set>
-                                      <p:cBhvr>
-                                        <p:cTn id="18" dur="1" fill="hold">
-                                          <p:stCondLst>
-                                            <p:cond delay="0"/>
-                                          </p:stCondLst>
-                                        </p:cTn>
-                                        <p:tgtEl>
-                                          <p:spTgt spid="6"/>
-                                        </p:tgtEl>
-                                        <p:attrNameLst>
-                                          <p:attrName>style.visibility</p:attrName>
-                                        </p:attrNameLst>
-                                      </p:cBhvr>
-                                      <p:to>
-                                        <p:strVal val="visible"/>
-                                      </p:to>
-                                    </p:set>
-                                  </p:childTnLst>
-                                </p:cTn>
-                              </p:par>
-                            </p:childTnLst>
-                          </p:cTn>
-                        </p:par>
-                      </p:childTnLst>
-                    </p:cTn>
-                  </p:par>
-                  <p:par>
-                    <p:cTn id="19" fill="hold">
-                      <p:stCondLst>
-                        <p:cond delay="indefinite"/>
-                      </p:stCondLst>
-                      <p:childTnLst>
-                        <p:par>
-                          <p:cTn id="20" fill="hold">
-                            <p:stCondLst>
-                              <p:cond delay="0"/>
-                            </p:stCondLst>
-                            <p:childTnLst>
-                              <p:par>
-                                <p:cTn id="21" presetID="1" presetClass="entr" presetSubtype="0" fill="hold" grpId="0" nodeType="clickEffect">
-                                  <p:stCondLst>
-                                    <p:cond delay="0"/>
-                                  </p:stCondLst>
-                                  <p:childTnLst>
-                                    <p:set>
-                                      <p:cBhvr>
-                                        <p:cTn id="22" dur="1" fill="hold">
-                                          <p:stCondLst>
-                                            <p:cond delay="0"/>
-                                          </p:stCondLst>
-                                        </p:cTn>
-                                        <p:tgtEl>
-                                          <p:spTgt spid="7"/>
-                                        </p:tgtEl>
-                                        <p:attrNameLst>
-                                          <p:attrName>style.visibility</p:attrName>
-                                        </p:attrNameLst>
-                                      </p:cBhvr>
-                                      <p:to>
-                                        <p:strVal val="visible"/>
-                                      </p:to>
-                                    </p:set>
-                                  </p:childTnLst>
-                                </p:cTn>
-                              </p:par>
-                            </p:childTnLst>
-                          </p:cTn>
-                        </p:par>
-                      </p:childTnLst>
-                    </p:cTn>
-                  </p:par>
-                </p:childTnLst>
-              </p:cTn>
-              <p:prevCondLst>
-                <p:cond evt="onPrev" delay="0">
-                  <p:tgtEl>
-                    <p:sldTgt/>
-                  </p:tgtEl>
-                </p:cond>
-              </p:prevCondLst>
-              <p:nextCondLst>
-                <p:cond evt="onNext" delay="0">
-                  <p:tgtEl>
-                    <p:sldTgt/>
-                  </p:tgtEl>
-                </p:cond>
-              </p:nextCondLst>
-            </p:seq>
-          </p:childTnLst>
-        </p:cTn>
-      </p:par>
-    </p:tnLst>
-    <p:bldLst>
-      <p:bldP spid="3" grpId="0" build="p"/>
-      <p:bldP spid="4" grpId="0" uiExpand="1" build="p"/>
-      <p:bldP spid="5" grpId="0"/>
-      <p:bldP spid="6" grpId="0"/>
-      <p:bldP spid="7" grpId="0"/>
-    </p:bldLst>
-  </p:timing>
-</p:sld>
-</file>
-
-<file path=ppt/slides/slide7.xml><?xml version="1.0" encoding="utf-8"?>
-<p:sld xmlns:a="http://schemas.openxmlformats.org/drawingml/2006/main" xmlns:r="http://schemas.openxmlformats.org/officeDocument/2006/relationships" xmlns:p="http://schemas.openxmlformats.org/presentationml/2006/main">
-  <p:cSld>
-    <p:spTree>
-      <p:nvGrpSpPr>
-        <p:cNvPr id="1" name=""/>
-        <p:cNvGrpSpPr/>
-        <p:nvPr/>
-      </p:nvGrpSpPr>
-      <p:grpSpPr>
-        <a:xfrm>
-          <a:off x="0" y="0"/>
-          <a:ext cx="0" cy="0"/>
-          <a:chOff x="0" y="0"/>
-          <a:chExt cx="0" cy="0"/>
-        </a:xfrm>
-      </p:grpSpPr>
-      <p:sp>
-        <p:nvSpPr>
-          <p:cNvPr id="2" name="Titel 1">
-            <a:extLst>
-              <a:ext uri="{FF2B5EF4-FFF2-40B4-BE49-F238E27FC236}">
                 <a16:creationId xmlns:a16="http://schemas.microsoft.com/office/drawing/2014/main" id="{BDECAEB1-542A-F848-9D2C-B10DFE956AB7}"/>
               </a:ext>
             </a:extLst>
@@ -8392,7 +7091,7 @@
           <a:p>
             <a:fld id="{D1892F8F-5571-E246-B053-E27A62D47BEF}" type="slidenum">
               <a:rPr lang="en-GB" smtClean="0"/>
-              <a:t>7</a:t>
+              <a:t>6</a:t>
             </a:fld>
             <a:endParaRPr lang="en-GB"/>
           </a:p>
@@ -8411,7 +7110,7 @@
 </p:sld>
 </file>
 
-<file path=ppt/slides/slide8.xml><?xml version="1.0" encoding="utf-8"?>
+<file path=ppt/slides/slide7.xml><?xml version="1.0" encoding="utf-8"?>
 <p:sld xmlns:a="http://schemas.openxmlformats.org/drawingml/2006/main" xmlns:r="http://schemas.openxmlformats.org/officeDocument/2006/relationships" xmlns:p="http://schemas.openxmlformats.org/presentationml/2006/main">
   <p:cSld>
     <p:spTree>
@@ -8635,7 +7334,7 @@
           <a:p>
             <a:fld id="{D1892F8F-5571-E246-B053-E27A62D47BEF}" type="slidenum">
               <a:rPr lang="en-GB" smtClean="0"/>
-              <a:t>8</a:t>
+              <a:t>7</a:t>
             </a:fld>
             <a:endParaRPr lang="en-GB"/>
           </a:p>
@@ -8654,7 +7353,7 @@
 </p:sld>
 </file>
 
-<file path=ppt/slides/slide9.xml><?xml version="1.0" encoding="utf-8"?>
+<file path=ppt/slides/slide8.xml><?xml version="1.0" encoding="utf-8"?>
 <p:sld xmlns:a="http://schemas.openxmlformats.org/drawingml/2006/main" xmlns:r="http://schemas.openxmlformats.org/officeDocument/2006/relationships" xmlns:p="http://schemas.openxmlformats.org/presentationml/2006/main">
   <p:cSld>
     <p:spTree>
@@ -8892,7 +7591,7 @@
           <a:p>
             <a:fld id="{D1892F8F-5571-E246-B053-E27A62D47BEF}" type="slidenum">
               <a:rPr lang="en-GB" smtClean="0"/>
-              <a:t>9</a:t>
+              <a:t>8</a:t>
             </a:fld>
             <a:endParaRPr lang="en-GB"/>
           </a:p>
@@ -8902,6 +7601,204 @@
     <p:extLst>
       <p:ext uri="{BB962C8B-B14F-4D97-AF65-F5344CB8AC3E}">
         <p14:creationId xmlns:p14="http://schemas.microsoft.com/office/powerpoint/2010/main" val="2995681747"/>
+      </p:ext>
+    </p:extLst>
+  </p:cSld>
+  <p:clrMapOvr>
+    <a:masterClrMapping/>
+  </p:clrMapOvr>
+</p:sld>
+</file>
+
+<file path=ppt/slides/slide9.xml><?xml version="1.0" encoding="utf-8"?>
+<p:sld xmlns:a="http://schemas.openxmlformats.org/drawingml/2006/main" xmlns:r="http://schemas.openxmlformats.org/officeDocument/2006/relationships" xmlns:p="http://schemas.openxmlformats.org/presentationml/2006/main">
+  <p:cSld>
+    <p:spTree>
+      <p:nvGrpSpPr>
+        <p:cNvPr id="1" name=""/>
+        <p:cNvGrpSpPr/>
+        <p:nvPr/>
+      </p:nvGrpSpPr>
+      <p:grpSpPr>
+        <a:xfrm>
+          <a:off x="0" y="0"/>
+          <a:ext cx="0" cy="0"/>
+          <a:chOff x="0" y="0"/>
+          <a:chExt cx="0" cy="0"/>
+        </a:xfrm>
+      </p:grpSpPr>
+      <p:sp>
+        <p:nvSpPr>
+          <p:cNvPr id="2" name="Titel 1">
+            <a:extLst>
+              <a:ext uri="{FF2B5EF4-FFF2-40B4-BE49-F238E27FC236}">
+                <a16:creationId xmlns:a16="http://schemas.microsoft.com/office/drawing/2014/main" id="{BDECAEB1-542A-F848-9D2C-B10DFE956AB7}"/>
+              </a:ext>
+            </a:extLst>
+          </p:cNvPr>
+          <p:cNvSpPr>
+            <a:spLocks noGrp="1"/>
+          </p:cNvSpPr>
+          <p:nvPr>
+            <p:ph type="title"/>
+          </p:nvPr>
+        </p:nvSpPr>
+        <p:spPr/>
+        <p:txBody>
+          <a:bodyPr/>
+          <a:lstStyle/>
+          <a:p>
+            <a:r>
+              <a:rPr lang="en-GB" dirty="0"/>
+              <a:t>Greedy</a:t>
+            </a:r>
+          </a:p>
+        </p:txBody>
+      </p:sp>
+      <p:sp>
+        <p:nvSpPr>
+          <p:cNvPr id="3" name="Tijdelijke aanduiding voor inhoud 2">
+            <a:extLst>
+              <a:ext uri="{FF2B5EF4-FFF2-40B4-BE49-F238E27FC236}">
+                <a16:creationId xmlns:a16="http://schemas.microsoft.com/office/drawing/2014/main" id="{6B57B016-94D5-F646-9976-362E7188E1F0}"/>
+              </a:ext>
+            </a:extLst>
+          </p:cNvPr>
+          <p:cNvSpPr>
+            <a:spLocks noGrp="1"/>
+          </p:cNvSpPr>
+          <p:nvPr>
+            <p:ph sz="half" idx="1"/>
+          </p:nvPr>
+        </p:nvSpPr>
+        <p:spPr/>
+        <p:txBody>
+          <a:bodyPr>
+            <a:normAutofit lnSpcReduction="10000"/>
+          </a:bodyPr>
+          <a:lstStyle/>
+          <a:p>
+            <a:r>
+              <a:rPr lang="en-GB" dirty="0"/>
+              <a:t>Let S be HP-chain of length n.</a:t>
+            </a:r>
+          </a:p>
+          <a:p>
+            <a:r>
+              <a:rPr lang="en-GB" dirty="0"/>
+              <a:t>Fix first 2 elements of chain.</a:t>
+            </a:r>
+          </a:p>
+          <a:p>
+            <a:r>
+              <a:rPr lang="en-GB" dirty="0"/>
+              <a:t>For subsequent elements, try all moves from {u, d, l, r, </a:t>
+            </a:r>
+            <a:r>
+              <a:rPr lang="en-GB" dirty="0" err="1"/>
+              <a:t>i</a:t>
+            </a:r>
+            <a:r>
+              <a:rPr lang="en-GB" dirty="0"/>
+              <a:t>, o} and check whether move would result in H-H connection (with self-avoidance).</a:t>
+            </a:r>
+          </a:p>
+          <a:p>
+            <a:r>
+              <a:rPr lang="en-GB" dirty="0"/>
+              <a:t>If so, use the move. If not, pick random.</a:t>
+            </a:r>
+          </a:p>
+          <a:p>
+            <a:r>
+              <a:rPr lang="en-GB" dirty="0"/>
+              <a:t>Stuck? Start over.</a:t>
+            </a:r>
+          </a:p>
+        </p:txBody>
+      </p:sp>
+      <p:pic>
+        <p:nvPicPr>
+          <p:cNvPr id="4098" name="Picture 2" descr="Afbeeldingsresultaat voor greedy algorithm">
+            <a:extLst>
+              <a:ext uri="{FF2B5EF4-FFF2-40B4-BE49-F238E27FC236}">
+                <a16:creationId xmlns:a16="http://schemas.microsoft.com/office/drawing/2014/main" id="{E2145716-8FD2-4D20-9F53-FFC859D21248}"/>
+              </a:ext>
+            </a:extLst>
+          </p:cNvPr>
+          <p:cNvPicPr>
+            <a:picLocks noGrp="1" noChangeAspect="1" noChangeArrowheads="1" noCrop="1"/>
+          </p:cNvPicPr>
+          <p:nvPr>
+            <p:ph sz="half" idx="2"/>
+          </p:nvPr>
+        </p:nvPicPr>
+        <p:blipFill>
+          <a:blip r:embed="rId2">
+            <a:extLst>
+              <a:ext uri="{28A0092B-C50C-407E-A947-70E740481C1C}">
+                <a14:useLocalDpi xmlns:a14="http://schemas.microsoft.com/office/drawing/2010/main" val="0"/>
+              </a:ext>
+            </a:extLst>
+          </a:blip>
+          <a:srcRect/>
+          <a:stretch>
+            <a:fillRect/>
+          </a:stretch>
+        </p:blipFill>
+        <p:spPr bwMode="auto">
+          <a:xfrm>
+            <a:off x="6908799" y="2457054"/>
+            <a:ext cx="3999177" cy="2399506"/>
+          </a:xfrm>
+          <a:prstGeom prst="rect">
+            <a:avLst/>
+          </a:prstGeom>
+          <a:noFill/>
+          <a:extLst>
+            <a:ext uri="{909E8E84-426E-40DD-AFC4-6F175D3DCCD1}">
+              <a14:hiddenFill xmlns:a14="http://schemas.microsoft.com/office/drawing/2010/main">
+                <a:solidFill>
+                  <a:srgbClr val="FFFFFF"/>
+                </a:solidFill>
+              </a14:hiddenFill>
+            </a:ext>
+          </a:extLst>
+        </p:spPr>
+      </p:pic>
+      <p:sp>
+        <p:nvSpPr>
+          <p:cNvPr id="4" name="Tijdelijke aanduiding voor dianummer 3">
+            <a:extLst>
+              <a:ext uri="{FF2B5EF4-FFF2-40B4-BE49-F238E27FC236}">
+                <a16:creationId xmlns:a16="http://schemas.microsoft.com/office/drawing/2014/main" id="{BD4D1BB4-6ED2-0A44-97B4-82BA6D6CE108}"/>
+              </a:ext>
+            </a:extLst>
+          </p:cNvPr>
+          <p:cNvSpPr>
+            <a:spLocks noGrp="1"/>
+          </p:cNvSpPr>
+          <p:nvPr>
+            <p:ph type="sldNum" sz="quarter" idx="12"/>
+          </p:nvPr>
+        </p:nvSpPr>
+        <p:spPr/>
+        <p:txBody>
+          <a:bodyPr/>
+          <a:lstStyle/>
+          <a:p>
+            <a:fld id="{D1892F8F-5571-E246-B053-E27A62D47BEF}" type="slidenum">
+              <a:rPr lang="en-GB" smtClean="0"/>
+              <a:t>9</a:t>
+            </a:fld>
+            <a:endParaRPr lang="en-GB"/>
+          </a:p>
+        </p:txBody>
+      </p:sp>
+    </p:spTree>
+    <p:extLst>
+      <p:ext uri="{BB962C8B-B14F-4D97-AF65-F5344CB8AC3E}">
+        <p14:creationId xmlns:p14="http://schemas.microsoft.com/office/powerpoint/2010/main" val="3810750948"/>
       </p:ext>
     </p:extLst>
   </p:cSld>

</xml_diff>

<commit_message>
Edits to powerpoint slides Seb
</commit_message>
<xml_diff>
--- a/Documentation/PPP, Week 2, Meeting 1.pptx
+++ b/Documentation/PPP, Week 2, Meeting 1.pptx
@@ -5,7 +5,7 @@
     <p:sldMasterId id="2147483672" r:id="rId1"/>
   </p:sldMasterIdLst>
   <p:notesMasterIdLst>
-    <p:notesMasterId r:id="rId17"/>
+    <p:notesMasterId r:id="rId19"/>
   </p:notesMasterIdLst>
   <p:sldIdLst>
     <p:sldId id="256" r:id="rId2"/>
@@ -19,10 +19,12 @@
     <p:sldId id="280" r:id="rId10"/>
     <p:sldId id="281" r:id="rId11"/>
     <p:sldId id="282" r:id="rId12"/>
-    <p:sldId id="274" r:id="rId13"/>
-    <p:sldId id="275" r:id="rId14"/>
-    <p:sldId id="276" r:id="rId15"/>
-    <p:sldId id="265" r:id="rId16"/>
+    <p:sldId id="286" r:id="rId13"/>
+    <p:sldId id="285" r:id="rId14"/>
+    <p:sldId id="274" r:id="rId15"/>
+    <p:sldId id="275" r:id="rId16"/>
+    <p:sldId id="276" r:id="rId17"/>
+    <p:sldId id="265" r:id="rId18"/>
   </p:sldIdLst>
   <p:sldSz cx="12192000" cy="6858000"/>
   <p:notesSz cx="6858000" cy="9144000"/>
@@ -554,6 +556,174 @@
     <p:extLst>
       <p:ext uri="{BB962C8B-B14F-4D97-AF65-F5344CB8AC3E}">
         <p14:creationId xmlns:p14="http://schemas.microsoft.com/office/powerpoint/2010/main" val="1505287686"/>
+      </p:ext>
+    </p:extLst>
+  </p:cSld>
+  <p:clrMapOvr>
+    <a:masterClrMapping/>
+  </p:clrMapOvr>
+</p:notes>
+</file>
+
+<file path=ppt/notesSlides/notesSlide2.xml><?xml version="1.0" encoding="utf-8"?>
+<p:notes xmlns:a="http://schemas.openxmlformats.org/drawingml/2006/main" xmlns:r="http://schemas.openxmlformats.org/officeDocument/2006/relationships" xmlns:p="http://schemas.openxmlformats.org/presentationml/2006/main">
+  <p:cSld>
+    <p:spTree>
+      <p:nvGrpSpPr>
+        <p:cNvPr id="1" name=""/>
+        <p:cNvGrpSpPr/>
+        <p:nvPr/>
+      </p:nvGrpSpPr>
+      <p:grpSpPr>
+        <a:xfrm>
+          <a:off x="0" y="0"/>
+          <a:ext cx="0" cy="0"/>
+          <a:chOff x="0" y="0"/>
+          <a:chExt cx="0" cy="0"/>
+        </a:xfrm>
+      </p:grpSpPr>
+      <p:sp>
+        <p:nvSpPr>
+          <p:cNvPr id="2" name="Tijdelijke aanduiding voor dia-afbeelding 1"/>
+          <p:cNvSpPr>
+            <a:spLocks noGrp="1" noRot="1" noChangeAspect="1"/>
+          </p:cNvSpPr>
+          <p:nvPr>
+            <p:ph type="sldImg"/>
+          </p:nvPr>
+        </p:nvSpPr>
+        <p:spPr/>
+      </p:sp>
+      <p:sp>
+        <p:nvSpPr>
+          <p:cNvPr id="3" name="Tijdelijke aanduiding voor notities 2"/>
+          <p:cNvSpPr>
+            <a:spLocks noGrp="1"/>
+          </p:cNvSpPr>
+          <p:nvPr>
+            <p:ph type="body" idx="1"/>
+          </p:nvPr>
+        </p:nvSpPr>
+        <p:spPr/>
+        <p:txBody>
+          <a:bodyPr/>
+          <a:lstStyle/>
+          <a:p>
+            <a:endParaRPr lang="en-US" dirty="0"/>
+          </a:p>
+        </p:txBody>
+      </p:sp>
+      <p:sp>
+        <p:nvSpPr>
+          <p:cNvPr id="4" name="Tijdelijke aanduiding voor dianummer 3"/>
+          <p:cNvSpPr>
+            <a:spLocks noGrp="1"/>
+          </p:cNvSpPr>
+          <p:nvPr>
+            <p:ph type="sldNum" sz="quarter" idx="5"/>
+          </p:nvPr>
+        </p:nvSpPr>
+        <p:spPr/>
+        <p:txBody>
+          <a:bodyPr/>
+          <a:lstStyle/>
+          <a:p>
+            <a:fld id="{2831AEBB-41E9-A04A-9C64-38B7EC6FB69A}" type="slidenum">
+              <a:rPr lang="en-GB" smtClean="0"/>
+              <a:t>6</a:t>
+            </a:fld>
+            <a:endParaRPr lang="en-GB"/>
+          </a:p>
+        </p:txBody>
+      </p:sp>
+    </p:spTree>
+    <p:extLst>
+      <p:ext uri="{BB962C8B-B14F-4D97-AF65-F5344CB8AC3E}">
+        <p14:creationId xmlns:p14="http://schemas.microsoft.com/office/powerpoint/2010/main" val="1041384391"/>
+      </p:ext>
+    </p:extLst>
+  </p:cSld>
+  <p:clrMapOvr>
+    <a:masterClrMapping/>
+  </p:clrMapOvr>
+</p:notes>
+</file>
+
+<file path=ppt/notesSlides/notesSlide3.xml><?xml version="1.0" encoding="utf-8"?>
+<p:notes xmlns:a="http://schemas.openxmlformats.org/drawingml/2006/main" xmlns:r="http://schemas.openxmlformats.org/officeDocument/2006/relationships" xmlns:p="http://schemas.openxmlformats.org/presentationml/2006/main">
+  <p:cSld>
+    <p:spTree>
+      <p:nvGrpSpPr>
+        <p:cNvPr id="1" name=""/>
+        <p:cNvGrpSpPr/>
+        <p:nvPr/>
+      </p:nvGrpSpPr>
+      <p:grpSpPr>
+        <a:xfrm>
+          <a:off x="0" y="0"/>
+          <a:ext cx="0" cy="0"/>
+          <a:chOff x="0" y="0"/>
+          <a:chExt cx="0" cy="0"/>
+        </a:xfrm>
+      </p:grpSpPr>
+      <p:sp>
+        <p:nvSpPr>
+          <p:cNvPr id="2" name="Tijdelijke aanduiding voor dia-afbeelding 1"/>
+          <p:cNvSpPr>
+            <a:spLocks noGrp="1" noRot="1" noChangeAspect="1"/>
+          </p:cNvSpPr>
+          <p:nvPr>
+            <p:ph type="sldImg"/>
+          </p:nvPr>
+        </p:nvSpPr>
+        <p:spPr/>
+      </p:sp>
+      <p:sp>
+        <p:nvSpPr>
+          <p:cNvPr id="3" name="Tijdelijke aanduiding voor notities 2"/>
+          <p:cNvSpPr>
+            <a:spLocks noGrp="1"/>
+          </p:cNvSpPr>
+          <p:nvPr>
+            <p:ph type="body" idx="1"/>
+          </p:nvPr>
+        </p:nvSpPr>
+        <p:spPr/>
+        <p:txBody>
+          <a:bodyPr/>
+          <a:lstStyle/>
+          <a:p>
+            <a:endParaRPr lang="en-US" dirty="0"/>
+          </a:p>
+        </p:txBody>
+      </p:sp>
+      <p:sp>
+        <p:nvSpPr>
+          <p:cNvPr id="4" name="Tijdelijke aanduiding voor dianummer 3"/>
+          <p:cNvSpPr>
+            <a:spLocks noGrp="1"/>
+          </p:cNvSpPr>
+          <p:nvPr>
+            <p:ph type="sldNum" sz="quarter" idx="5"/>
+          </p:nvPr>
+        </p:nvSpPr>
+        <p:spPr/>
+        <p:txBody>
+          <a:bodyPr/>
+          <a:lstStyle/>
+          <a:p>
+            <a:fld id="{2831AEBB-41E9-A04A-9C64-38B7EC6FB69A}" type="slidenum">
+              <a:rPr lang="en-GB" smtClean="0"/>
+              <a:t>12</a:t>
+            </a:fld>
+            <a:endParaRPr lang="en-GB"/>
+          </a:p>
+        </p:txBody>
+      </p:sp>
+    </p:spTree>
+    <p:extLst>
+      <p:ext uri="{BB962C8B-B14F-4D97-AF65-F5344CB8AC3E}">
+        <p14:creationId xmlns:p14="http://schemas.microsoft.com/office/powerpoint/2010/main" val="1848860920"/>
       </p:ext>
     </p:extLst>
   </p:cSld>
@@ -4065,6 +4235,503 @@
           <p:cNvPr id="2" name="Titel 1">
             <a:extLst>
               <a:ext uri="{FF2B5EF4-FFF2-40B4-BE49-F238E27FC236}">
+                <a16:creationId xmlns:a16="http://schemas.microsoft.com/office/drawing/2014/main" id="{BDECAEB1-542A-F848-9D2C-B10DFE956AB7}"/>
+              </a:ext>
+            </a:extLst>
+          </p:cNvPr>
+          <p:cNvSpPr>
+            <a:spLocks noGrp="1"/>
+          </p:cNvSpPr>
+          <p:nvPr>
+            <p:ph type="title"/>
+          </p:nvPr>
+        </p:nvSpPr>
+        <p:spPr/>
+        <p:txBody>
+          <a:bodyPr/>
+          <a:lstStyle/>
+          <a:p>
+            <a:r>
+              <a:rPr lang="en-GB" dirty="0"/>
+              <a:t>Hill Climber (Pull moves)</a:t>
+            </a:r>
+          </a:p>
+        </p:txBody>
+      </p:sp>
+      <p:sp>
+        <p:nvSpPr>
+          <p:cNvPr id="3" name="Tijdelijke aanduiding voor inhoud 2">
+            <a:extLst>
+              <a:ext uri="{FF2B5EF4-FFF2-40B4-BE49-F238E27FC236}">
+                <a16:creationId xmlns:a16="http://schemas.microsoft.com/office/drawing/2014/main" id="{6B57B016-94D5-F646-9976-362E7188E1F0}"/>
+              </a:ext>
+            </a:extLst>
+          </p:cNvPr>
+          <p:cNvSpPr>
+            <a:spLocks noGrp="1"/>
+          </p:cNvSpPr>
+          <p:nvPr>
+            <p:ph sz="half" idx="1"/>
+          </p:nvPr>
+        </p:nvSpPr>
+        <p:spPr/>
+        <p:txBody>
+          <a:bodyPr/>
+          <a:lstStyle/>
+          <a:p>
+            <a:r>
+              <a:rPr lang="en-GB" dirty="0"/>
+              <a:t>Iterative algorithm.</a:t>
+            </a:r>
+          </a:p>
+          <a:p>
+            <a:r>
+              <a:rPr lang="en-GB" dirty="0"/>
+              <a:t>Starts with a solution.</a:t>
+            </a:r>
+          </a:p>
+          <a:p>
+            <a:r>
+              <a:rPr lang="en-GB" dirty="0"/>
+              <a:t>Goes through the solution and tries to pull an elements diagonally to increase stability.</a:t>
+            </a:r>
+          </a:p>
+          <a:p>
+            <a:r>
+              <a:rPr lang="en-GB" dirty="0"/>
+              <a:t>Better stability -&gt; new solution.</a:t>
+            </a:r>
+          </a:p>
+          <a:p>
+            <a:r>
+              <a:rPr lang="en-GB" dirty="0"/>
+              <a:t>Worse stability -&gt; old solution.</a:t>
+            </a:r>
+          </a:p>
+          <a:p>
+            <a:r>
+              <a:rPr lang="en-GB" dirty="0"/>
+              <a:t>Repeat until stability converges.</a:t>
+            </a:r>
+          </a:p>
+        </p:txBody>
+      </p:sp>
+      <p:sp>
+        <p:nvSpPr>
+          <p:cNvPr id="4" name="Tijdelijke aanduiding voor dianummer 3">
+            <a:extLst>
+              <a:ext uri="{FF2B5EF4-FFF2-40B4-BE49-F238E27FC236}">
+                <a16:creationId xmlns:a16="http://schemas.microsoft.com/office/drawing/2014/main" id="{B78FA2CF-309C-7741-B78B-29A8D3C4359F}"/>
+              </a:ext>
+            </a:extLst>
+          </p:cNvPr>
+          <p:cNvSpPr>
+            <a:spLocks noGrp="1"/>
+          </p:cNvSpPr>
+          <p:nvPr>
+            <p:ph type="sldNum" sz="quarter" idx="12"/>
+          </p:nvPr>
+        </p:nvSpPr>
+        <p:spPr/>
+        <p:txBody>
+          <a:bodyPr/>
+          <a:lstStyle/>
+          <a:p>
+            <a:fld id="{D1892F8F-5571-E246-B053-E27A62D47BEF}" type="slidenum">
+              <a:rPr lang="en-GB" smtClean="0"/>
+              <a:t>12</a:t>
+            </a:fld>
+            <a:endParaRPr lang="en-GB"/>
+          </a:p>
+        </p:txBody>
+      </p:sp>
+      <p:pic>
+        <p:nvPicPr>
+          <p:cNvPr id="1026" name="Picture 2" descr="Pull move transformation for HP sequence HHHP HP P P P P H at position 3">
+            <a:extLst>
+              <a:ext uri="{FF2B5EF4-FFF2-40B4-BE49-F238E27FC236}">
+                <a16:creationId xmlns:a16="http://schemas.microsoft.com/office/drawing/2014/main" id="{212985C8-7720-450F-82AE-5163C9E5109D}"/>
+              </a:ext>
+            </a:extLst>
+          </p:cNvPr>
+          <p:cNvPicPr>
+            <a:picLocks noGrp="1" noChangeAspect="1" noChangeArrowheads="1"/>
+          </p:cNvPicPr>
+          <p:nvPr>
+            <p:ph sz="half" idx="2"/>
+          </p:nvPr>
+        </p:nvPicPr>
+        <p:blipFill>
+          <a:blip r:embed="rId3">
+            <a:extLst>
+              <a:ext uri="{28A0092B-C50C-407E-A947-70E740481C1C}">
+                <a14:useLocalDpi xmlns:a14="http://schemas.microsoft.com/office/drawing/2010/main" val="0"/>
+              </a:ext>
+            </a:extLst>
+          </a:blip>
+          <a:srcRect/>
+          <a:stretch>
+            <a:fillRect/>
+          </a:stretch>
+        </p:blipFill>
+        <p:spPr bwMode="auto">
+          <a:xfrm>
+            <a:off x="6381750" y="2431978"/>
+            <a:ext cx="4762500" cy="2381250"/>
+          </a:xfrm>
+          <a:prstGeom prst="rect">
+            <a:avLst/>
+          </a:prstGeom>
+          <a:noFill/>
+          <a:extLst>
+            <a:ext uri="{909E8E84-426E-40DD-AFC4-6F175D3DCCD1}">
+              <a14:hiddenFill xmlns:a14="http://schemas.microsoft.com/office/drawing/2010/main">
+                <a:solidFill>
+                  <a:srgbClr val="FFFFFF"/>
+                </a:solidFill>
+              </a14:hiddenFill>
+            </a:ext>
+          </a:extLst>
+        </p:spPr>
+      </p:pic>
+      <p:sp>
+        <p:nvSpPr>
+          <p:cNvPr id="8" name="Tekstvak 7">
+            <a:extLst>
+              <a:ext uri="{FF2B5EF4-FFF2-40B4-BE49-F238E27FC236}">
+                <a16:creationId xmlns:a16="http://schemas.microsoft.com/office/drawing/2014/main" id="{D16F468E-B7DB-480A-896A-9213A792B403}"/>
+              </a:ext>
+            </a:extLst>
+          </p:cNvPr>
+          <p:cNvSpPr txBox="1"/>
+          <p:nvPr/>
+        </p:nvSpPr>
+        <p:spPr>
+          <a:xfrm>
+            <a:off x="1098550" y="6032500"/>
+            <a:ext cx="10185400" cy="646331"/>
+          </a:xfrm>
+          <a:prstGeom prst="rect">
+            <a:avLst/>
+          </a:prstGeom>
+          <a:noFill/>
+        </p:spPr>
+        <p:txBody>
+          <a:bodyPr wrap="square" rtlCol="0">
+            <a:spAutoFit/>
+          </a:bodyPr>
+          <a:lstStyle/>
+          <a:p>
+            <a:r>
+              <a:rPr lang="en-US" dirty="0"/>
+              <a:t>Source: </a:t>
+            </a:r>
+            <a:r>
+              <a:rPr lang="en-US" dirty="0" err="1"/>
+              <a:t>Chira</a:t>
+            </a:r>
+            <a:r>
+              <a:rPr lang="en-US" dirty="0"/>
+              <a:t>, Camelia. "Hill-climbing search in evolutionary models for protein folding simulations." </a:t>
+            </a:r>
+            <a:r>
+              <a:rPr lang="en-US" i="1" dirty="0"/>
+              <a:t>Stud Univ Babe\c s-</a:t>
+            </a:r>
+            <a:r>
+              <a:rPr lang="en-US" i="1" dirty="0" err="1"/>
+              <a:t>Bolyai</a:t>
+            </a:r>
+            <a:r>
+              <a:rPr lang="en-US" i="1" dirty="0"/>
+              <a:t> Inform</a:t>
+            </a:r>
+            <a:r>
+              <a:rPr lang="en-US" dirty="0"/>
+              <a:t> 55 (2010): 29-40.</a:t>
+            </a:r>
+          </a:p>
+        </p:txBody>
+      </p:sp>
+    </p:spTree>
+    <p:extLst>
+      <p:ext uri="{BB962C8B-B14F-4D97-AF65-F5344CB8AC3E}">
+        <p14:creationId xmlns:p14="http://schemas.microsoft.com/office/powerpoint/2010/main" val="2815858668"/>
+      </p:ext>
+    </p:extLst>
+  </p:cSld>
+  <p:clrMapOvr>
+    <a:masterClrMapping/>
+  </p:clrMapOvr>
+</p:sld>
+</file>
+
+<file path=ppt/slides/slide13.xml><?xml version="1.0" encoding="utf-8"?>
+<p:sld xmlns:a="http://schemas.openxmlformats.org/drawingml/2006/main" xmlns:r="http://schemas.openxmlformats.org/officeDocument/2006/relationships" xmlns:p="http://schemas.openxmlformats.org/presentationml/2006/main">
+  <p:cSld>
+    <p:bg>
+      <p:bgPr>
+        <a:solidFill>
+          <a:schemeClr val="bg1"/>
+        </a:solidFill>
+        <a:effectLst/>
+      </p:bgPr>
+    </p:bg>
+    <p:spTree>
+      <p:nvGrpSpPr>
+        <p:cNvPr id="1" name=""/>
+        <p:cNvGrpSpPr/>
+        <p:nvPr/>
+      </p:nvGrpSpPr>
+      <p:grpSpPr>
+        <a:xfrm>
+          <a:off x="0" y="0"/>
+          <a:ext cx="0" cy="0"/>
+          <a:chOff x="0" y="0"/>
+          <a:chExt cx="0" cy="0"/>
+        </a:xfrm>
+      </p:grpSpPr>
+      <p:sp>
+        <p:nvSpPr>
+          <p:cNvPr id="2" name="Titel 1">
+            <a:extLst>
+              <a:ext uri="{FF2B5EF4-FFF2-40B4-BE49-F238E27FC236}">
+                <a16:creationId xmlns:a16="http://schemas.microsoft.com/office/drawing/2014/main" id="{BDECAEB1-542A-F848-9D2C-B10DFE956AB7}"/>
+              </a:ext>
+            </a:extLst>
+          </p:cNvPr>
+          <p:cNvSpPr>
+            <a:spLocks noGrp="1"/>
+          </p:cNvSpPr>
+          <p:nvPr>
+            <p:ph type="title"/>
+          </p:nvPr>
+        </p:nvSpPr>
+        <p:spPr>
+          <a:xfrm>
+            <a:off x="8444204" y="640081"/>
+            <a:ext cx="3141664" cy="5574451"/>
+          </a:xfrm>
+        </p:spPr>
+        <p:txBody>
+          <a:bodyPr vert="horz" lIns="91440" tIns="45720" rIns="91440" bIns="45720" rtlCol="0" anchor="ctr">
+            <a:normAutofit/>
+          </a:bodyPr>
+          <a:lstStyle/>
+          <a:p>
+            <a:r>
+              <a:rPr lang="en-US" sz="3700" kern="1200">
+                <a:solidFill>
+                  <a:schemeClr val="tx1"/>
+                </a:solidFill>
+                <a:latin typeface="+mj-lt"/>
+                <a:ea typeface="+mj-ea"/>
+                <a:cs typeface="+mj-cs"/>
+              </a:rPr>
+              <a:t>BENCHMARKS + RESULTS EHA+</a:t>
+            </a:r>
+          </a:p>
+        </p:txBody>
+      </p:sp>
+      <p:sp>
+        <p:nvSpPr>
+          <p:cNvPr id="4" name="Tijdelijke aanduiding voor dianummer 3">
+            <a:extLst>
+              <a:ext uri="{FF2B5EF4-FFF2-40B4-BE49-F238E27FC236}">
+                <a16:creationId xmlns:a16="http://schemas.microsoft.com/office/drawing/2014/main" id="{B78FA2CF-309C-7741-B78B-29A8D3C4359F}"/>
+              </a:ext>
+            </a:extLst>
+          </p:cNvPr>
+          <p:cNvSpPr>
+            <a:spLocks noGrp="1"/>
+          </p:cNvSpPr>
+          <p:nvPr>
+            <p:ph type="sldNum" sz="quarter" idx="12"/>
+          </p:nvPr>
+        </p:nvSpPr>
+        <p:spPr>
+          <a:xfrm>
+            <a:off x="10617958" y="6356350"/>
+            <a:ext cx="967910" cy="365125"/>
+          </a:xfrm>
+        </p:spPr>
+        <p:txBody>
+          <a:bodyPr vert="horz" lIns="91440" tIns="45720" rIns="91440" bIns="45720" rtlCol="0" anchor="ctr">
+            <a:normAutofit/>
+          </a:bodyPr>
+          <a:lstStyle/>
+          <a:p>
+            <a:pPr defTabSz="914400">
+              <a:spcAft>
+                <a:spcPts val="600"/>
+              </a:spcAft>
+            </a:pPr>
+            <a:fld id="{D1892F8F-5571-E246-B053-E27A62D47BEF}" type="slidenum">
+              <a:rPr lang="en-US" smtClean="0"/>
+              <a:pPr defTabSz="914400">
+                <a:spcAft>
+                  <a:spcPts val="600"/>
+                </a:spcAft>
+              </a:pPr>
+              <a:t>13</a:t>
+            </a:fld>
+            <a:endParaRPr lang="en-US"/>
+          </a:p>
+        </p:txBody>
+      </p:sp>
+      <p:pic>
+        <p:nvPicPr>
+          <p:cNvPr id="8" name="Tijdelijke aanduiding voor inhoud 7" descr="Afbeelding met tekst, kaart&#10;&#10;Automatisch gegenereerde beschrijving">
+            <a:extLst>
+              <a:ext uri="{FF2B5EF4-FFF2-40B4-BE49-F238E27FC236}">
+                <a16:creationId xmlns:a16="http://schemas.microsoft.com/office/drawing/2014/main" id="{1A7827B2-B526-4ADE-8C96-37EEA803F3C0}"/>
+              </a:ext>
+            </a:extLst>
+          </p:cNvPr>
+          <p:cNvPicPr>
+            <a:picLocks noGrp="1" noChangeAspect="1"/>
+          </p:cNvPicPr>
+          <p:nvPr>
+            <p:ph sz="half" idx="1"/>
+          </p:nvPr>
+        </p:nvPicPr>
+        <p:blipFill>
+          <a:blip r:embed="rId2"/>
+          <a:stretch>
+            <a:fillRect/>
+          </a:stretch>
+        </p:blipFill>
+        <p:spPr>
+          <a:xfrm>
+            <a:off x="4292600" y="3168650"/>
+            <a:ext cx="3794125" cy="2979738"/>
+          </a:xfrm>
+        </p:spPr>
+      </p:pic>
+      <p:pic>
+        <p:nvPicPr>
+          <p:cNvPr id="10" name="Tijdelijke aanduiding voor inhoud 9" descr="Afbeelding met tekst&#10;&#10;Automatisch gegenereerde beschrijving">
+            <a:extLst>
+              <a:ext uri="{FF2B5EF4-FFF2-40B4-BE49-F238E27FC236}">
+                <a16:creationId xmlns:a16="http://schemas.microsoft.com/office/drawing/2014/main" id="{DC6E093C-B2FD-4736-A2D9-98FE7ED8D4DE}"/>
+              </a:ext>
+            </a:extLst>
+          </p:cNvPr>
+          <p:cNvPicPr>
+            <a:picLocks noGrp="1" noChangeAspect="1"/>
+          </p:cNvPicPr>
+          <p:nvPr>
+            <p:ph sz="half" idx="2"/>
+          </p:nvPr>
+        </p:nvPicPr>
+        <p:blipFill>
+          <a:blip r:embed="rId3"/>
+          <a:stretch>
+            <a:fillRect/>
+          </a:stretch>
+        </p:blipFill>
+        <p:spPr>
+          <a:xfrm>
+            <a:off x="684213" y="3641725"/>
+            <a:ext cx="3525838" cy="2506663"/>
+          </a:xfrm>
+        </p:spPr>
+      </p:pic>
+      <p:pic>
+        <p:nvPicPr>
+          <p:cNvPr id="6" name="Afbeelding 5">
+            <a:extLst>
+              <a:ext uri="{FF2B5EF4-FFF2-40B4-BE49-F238E27FC236}">
+                <a16:creationId xmlns:a16="http://schemas.microsoft.com/office/drawing/2014/main" id="{14ACF73F-4FD7-4A15-A204-B7DB08E97EB2}"/>
+              </a:ext>
+            </a:extLst>
+          </p:cNvPr>
+          <p:cNvPicPr>
+            <a:picLocks noChangeAspect="1"/>
+          </p:cNvPicPr>
+          <p:nvPr/>
+        </p:nvPicPr>
+        <p:blipFill>
+          <a:blip r:embed="rId4"/>
+          <a:stretch>
+            <a:fillRect/>
+          </a:stretch>
+        </p:blipFill>
+        <p:spPr>
+          <a:xfrm>
+            <a:off x="4292600" y="703263"/>
+            <a:ext cx="3794125" cy="2382838"/>
+          </a:xfrm>
+          <a:prstGeom prst="rect">
+            <a:avLst/>
+          </a:prstGeom>
+        </p:spPr>
+      </p:pic>
+      <p:pic>
+        <p:nvPicPr>
+          <p:cNvPr id="5" name="Afbeelding 4">
+            <a:extLst>
+              <a:ext uri="{FF2B5EF4-FFF2-40B4-BE49-F238E27FC236}">
+                <a16:creationId xmlns:a16="http://schemas.microsoft.com/office/drawing/2014/main" id="{0B5FABA5-910A-4CCA-AEA1-D980676EECB7}"/>
+              </a:ext>
+            </a:extLst>
+          </p:cNvPr>
+          <p:cNvPicPr>
+            <a:picLocks noChangeAspect="1"/>
+          </p:cNvPicPr>
+          <p:nvPr/>
+        </p:nvPicPr>
+        <p:blipFill>
+          <a:blip r:embed="rId5"/>
+          <a:stretch>
+            <a:fillRect/>
+          </a:stretch>
+        </p:blipFill>
+        <p:spPr>
+          <a:xfrm>
+            <a:off x="684213" y="703263"/>
+            <a:ext cx="3525838" cy="2855913"/>
+          </a:xfrm>
+          <a:prstGeom prst="rect">
+            <a:avLst/>
+          </a:prstGeom>
+        </p:spPr>
+      </p:pic>
+    </p:spTree>
+    <p:extLst>
+      <p:ext uri="{BB962C8B-B14F-4D97-AF65-F5344CB8AC3E}">
+        <p14:creationId xmlns:p14="http://schemas.microsoft.com/office/powerpoint/2010/main" val="3323132485"/>
+      </p:ext>
+    </p:extLst>
+  </p:cSld>
+  <p:clrMapOvr>
+    <a:masterClrMapping/>
+  </p:clrMapOvr>
+</p:sld>
+</file>
+
+<file path=ppt/slides/slide14.xml><?xml version="1.0" encoding="utf-8"?>
+<p:sld xmlns:a="http://schemas.openxmlformats.org/drawingml/2006/main" xmlns:r="http://schemas.openxmlformats.org/officeDocument/2006/relationships" xmlns:p="http://schemas.openxmlformats.org/presentationml/2006/main">
+  <p:cSld>
+    <p:spTree>
+      <p:nvGrpSpPr>
+        <p:cNvPr id="1" name=""/>
+        <p:cNvGrpSpPr/>
+        <p:nvPr/>
+      </p:nvGrpSpPr>
+      <p:grpSpPr>
+        <a:xfrm>
+          <a:off x="0" y="0"/>
+          <a:ext cx="0" cy="0"/>
+          <a:chOff x="0" y="0"/>
+          <a:chExt cx="0" cy="0"/>
+        </a:xfrm>
+      </p:grpSpPr>
+      <p:sp>
+        <p:nvSpPr>
+          <p:cNvPr id="2" name="Titel 1">
+            <a:extLst>
+              <a:ext uri="{FF2B5EF4-FFF2-40B4-BE49-F238E27FC236}">
                 <a16:creationId xmlns:a16="http://schemas.microsoft.com/office/drawing/2014/main" id="{26D56270-1C1B-4B1E-BC4F-ACC759B672F7}"/>
               </a:ext>
             </a:extLst>
@@ -4230,7 +4897,7 @@
           <a:p>
             <a:fld id="{D1892F8F-5571-E246-B053-E27A62D47BEF}" type="slidenum">
               <a:rPr lang="en-GB" smtClean="0"/>
-              <a:t>12</a:t>
+              <a:t>14</a:t>
             </a:fld>
             <a:endParaRPr lang="en-GB"/>
           </a:p>
@@ -4249,7 +4916,7 @@
 </p:sld>
 </file>
 
-<file path=ppt/slides/slide13.xml><?xml version="1.0" encoding="utf-8"?>
+<file path=ppt/slides/slide15.xml><?xml version="1.0" encoding="utf-8"?>
 <p:sld xmlns:a="http://schemas.openxmlformats.org/drawingml/2006/main" xmlns:r="http://schemas.openxmlformats.org/officeDocument/2006/relationships" xmlns:p="http://schemas.openxmlformats.org/presentationml/2006/main">
   <p:cSld>
     <p:spTree>
@@ -4510,7 +5177,7 @@
           <a:p>
             <a:fld id="{D1892F8F-5571-E246-B053-E27A62D47BEF}" type="slidenum">
               <a:rPr lang="en-GB" smtClean="0"/>
-              <a:t>13</a:t>
+              <a:t>15</a:t>
             </a:fld>
             <a:endParaRPr lang="en-GB"/>
           </a:p>
@@ -4529,7 +5196,7 @@
 </p:sld>
 </file>
 
-<file path=ppt/slides/slide14.xml><?xml version="1.0" encoding="utf-8"?>
+<file path=ppt/slides/slide16.xml><?xml version="1.0" encoding="utf-8"?>
 <p:sld xmlns:a="http://schemas.openxmlformats.org/drawingml/2006/main" xmlns:r="http://schemas.openxmlformats.org/officeDocument/2006/relationships" xmlns:p="http://schemas.openxmlformats.org/presentationml/2006/main">
   <p:cSld>
     <p:spTree>
@@ -5807,7 +6474,7 @@
           <a:p>
             <a:fld id="{D1892F8F-5571-E246-B053-E27A62D47BEF}" type="slidenum">
               <a:rPr lang="en-GB" smtClean="0"/>
-              <a:t>14</a:t>
+              <a:t>16</a:t>
             </a:fld>
             <a:endParaRPr lang="en-GB"/>
           </a:p>
@@ -6008,7 +6675,7 @@
 </p:sld>
 </file>
 
-<file path=ppt/slides/slide15.xml><?xml version="1.0" encoding="utf-8"?>
+<file path=ppt/slides/slide17.xml><?xml version="1.0" encoding="utf-8"?>
 <p:sld xmlns:a="http://schemas.openxmlformats.org/drawingml/2006/main" xmlns:r="http://schemas.openxmlformats.org/officeDocument/2006/relationships" xmlns:p="http://schemas.openxmlformats.org/presentationml/2006/main">
   <p:cSld>
     <p:spTree>
@@ -6106,7 +6773,7 @@
           <a:p>
             <a:fld id="{D1892F8F-5571-E246-B053-E27A62D47BEF}" type="slidenum">
               <a:rPr lang="en-GB" smtClean="0"/>
-              <a:t>15</a:t>
+              <a:t>17</a:t>
             </a:fld>
             <a:endParaRPr lang="en-GB"/>
           </a:p>
@@ -7020,6 +7687,24 @@
               <a:t>Greedy</a:t>
             </a:r>
           </a:p>
+          <a:p>
+            <a:pPr lvl="1"/>
+            <a:r>
+              <a:rPr lang="en-GB" dirty="0"/>
+              <a:t>Extended Heuristic Algorithm</a:t>
+            </a:r>
+          </a:p>
+          <a:p>
+            <a:pPr lvl="1"/>
+            <a:r>
+              <a:rPr lang="en-GB" dirty="0"/>
+              <a:t>Breadth-first: Beam Search</a:t>
+            </a:r>
+          </a:p>
+          <a:p>
+            <a:pPr lvl="1"/>
+            <a:endParaRPr lang="en-GB" dirty="0"/>
+          </a:p>
         </p:txBody>
       </p:sp>
       <p:sp>
@@ -7052,14 +7737,7 @@
             <a:pPr lvl="1"/>
             <a:r>
               <a:rPr lang="en-GB" dirty="0"/>
-              <a:t>Extended Heuristic Algorithm</a:t>
-            </a:r>
-          </a:p>
-          <a:p>
-            <a:pPr lvl="1"/>
-            <a:r>
-              <a:rPr lang="en-GB" dirty="0"/>
-              <a:t>Breadth-first: Beam Search</a:t>
+              <a:t>Hill Climber (pull moves)</a:t>
             </a:r>
           </a:p>
           <a:p>

</xml_diff>